<commit_message>
Add code for showing image histogram.
</commit_message>
<xml_diff>
--- a/Reports/Presentation 1.pptx
+++ b/Reports/Presentation 1.pptx
@@ -4,15 +4,18 @@
   <p:sldMasterIdLst>
     <p:sldMasterId id="2147483831" r:id="rId1"/>
   </p:sldMasterIdLst>
+  <p:notesMasterIdLst>
+    <p:notesMasterId r:id="rId10"/>
+  </p:notesMasterIdLst>
   <p:sldIdLst>
     <p:sldId id="256" r:id="rId2"/>
     <p:sldId id="257" r:id="rId3"/>
     <p:sldId id="258" r:id="rId4"/>
     <p:sldId id="259" r:id="rId5"/>
-    <p:sldId id="260" r:id="rId6"/>
-    <p:sldId id="261" r:id="rId7"/>
-    <p:sldId id="263" r:id="rId8"/>
-    <p:sldId id="262" r:id="rId9"/>
+    <p:sldId id="261" r:id="rId6"/>
+    <p:sldId id="263" r:id="rId7"/>
+    <p:sldId id="264" r:id="rId8"/>
+    <p:sldId id="265" r:id="rId9"/>
   </p:sldIdLst>
   <p:sldSz cx="12192000" cy="6858000"/>
   <p:notesSz cx="6858000" cy="9144000"/>
@@ -111,13 +114,30 @@
       </a:defRPr>
     </a:lvl9pPr>
   </p:defaultTextStyle>
+  <p:extLst>
+    <p:ext uri="{EFAFB233-063F-42B5-8137-9DF3F51BA10A}">
+      <p15:sldGuideLst xmlns:p15="http://schemas.microsoft.com/office/powerpoint/2012/main"/>
+    </p:ext>
+  </p:extLst>
 </p:presentation>
+</file>
+
+<file path=ppt/commentAuthors.xml><?xml version="1.0" encoding="utf-8"?>
+<p:cmAuthorLst xmlns:a="http://schemas.openxmlformats.org/drawingml/2006/main" xmlns:r="http://schemas.openxmlformats.org/officeDocument/2006/relationships" xmlns:p="http://schemas.openxmlformats.org/presentationml/2006/main">
+  <p:cmAuthor id="1" name="Liuchuyao Xu" initials="LX" lastIdx="1" clrIdx="0">
+    <p:extLst>
+      <p:ext uri="{19B8F6BF-5375-455C-9EA6-DF929625EA0E}">
+        <p15:presenceInfo xmlns:p15="http://schemas.microsoft.com/office/powerpoint/2012/main" userId="f38a3cf7e821ef0b" providerId="Windows Live"/>
+      </p:ext>
+    </p:extLst>
+  </p:cmAuthor>
+</p:cmAuthorLst>
 </file>
 
 <file path=ppt/revisionInfo.xml><?xml version="1.0" encoding="utf-8"?>
 <p1510:revInfo xmlns:a="http://schemas.openxmlformats.org/drawingml/2006/main" xmlns:r="http://schemas.openxmlformats.org/officeDocument/2006/relationships" xmlns:p1510="http://schemas.microsoft.com/office/powerpoint/2015/10/main">
   <p1510:revLst>
-    <p1510:client id="{BCFF7D6F-B234-4BB0-89F9-5081881F6A3D}" v="30" dt="2019-11-10T20:54:25.319"/>
+    <p1510:client id="{BCFF7D6F-B234-4BB0-89F9-5081881F6A3D}" v="92" dt="2019-11-19T00:54:30.321"/>
   </p1510:revLst>
 </p1510:revInfo>
 </file>
@@ -127,7 +147,7 @@
   <pc:docChgLst>
     <pc:chgData name="Liuchuyao Xu" userId="f38a3cf7e821ef0b" providerId="LiveId" clId="{BCFF7D6F-B234-4BB0-89F9-5081881F6A3D}"/>
     <pc:docChg chg="undo redo custSel mod addSld delSld modSld addMainMaster delMainMaster">
-      <pc:chgData name="Liuchuyao Xu" userId="f38a3cf7e821ef0b" providerId="LiveId" clId="{BCFF7D6F-B234-4BB0-89F9-5081881F6A3D}" dt="2019-11-10T20:55:38.232" v="1544" actId="20577"/>
+      <pc:chgData name="Liuchuyao Xu" userId="f38a3cf7e821ef0b" providerId="LiveId" clId="{BCFF7D6F-B234-4BB0-89F9-5081881F6A3D}" dt="2019-11-19T00:55:17.406" v="5257" actId="121"/>
       <pc:docMkLst>
         <pc:docMk/>
       </pc:docMkLst>
@@ -282,13 +302,13 @@
         </pc:spChg>
       </pc:sldChg>
       <pc:sldChg chg="addSp delSp modSp add">
-        <pc:chgData name="Liuchuyao Xu" userId="f38a3cf7e821ef0b" providerId="LiveId" clId="{BCFF7D6F-B234-4BB0-89F9-5081881F6A3D}" dt="2019-11-10T20:34:00.118" v="472" actId="20577"/>
+        <pc:chgData name="Liuchuyao Xu" userId="f38a3cf7e821ef0b" providerId="LiveId" clId="{BCFF7D6F-B234-4BB0-89F9-5081881F6A3D}" dt="2019-11-19T00:53:40.856" v="5248" actId="255"/>
         <pc:sldMkLst>
           <pc:docMk/>
           <pc:sldMk cId="1699010107" sldId="257"/>
         </pc:sldMkLst>
         <pc:spChg chg="mod">
-          <ac:chgData name="Liuchuyao Xu" userId="f38a3cf7e821ef0b" providerId="LiveId" clId="{BCFF7D6F-B234-4BB0-89F9-5081881F6A3D}" dt="2019-11-10T20:33:52.819" v="466" actId="20577"/>
+          <ac:chgData name="Liuchuyao Xu" userId="f38a3cf7e821ef0b" providerId="LiveId" clId="{BCFF7D6F-B234-4BB0-89F9-5081881F6A3D}" dt="2019-11-15T01:37:15.310" v="2357" actId="20577"/>
           <ac:spMkLst>
             <pc:docMk/>
             <pc:sldMk cId="1699010107" sldId="257"/>
@@ -296,7 +316,7 @@
           </ac:spMkLst>
         </pc:spChg>
         <pc:spChg chg="mod">
-          <ac:chgData name="Liuchuyao Xu" userId="f38a3cf7e821ef0b" providerId="LiveId" clId="{BCFF7D6F-B234-4BB0-89F9-5081881F6A3D}" dt="2019-11-10T20:34:00.118" v="472" actId="20577"/>
+          <ac:chgData name="Liuchuyao Xu" userId="f38a3cf7e821ef0b" providerId="LiveId" clId="{BCFF7D6F-B234-4BB0-89F9-5081881F6A3D}" dt="2019-11-19T00:53:40.856" v="5248" actId="255"/>
           <ac:spMkLst>
             <pc:docMk/>
             <pc:sldMk cId="1699010107" sldId="257"/>
@@ -311,8 +331,8 @@
             <ac:picMk id="5" creationId="{620624E9-6462-4EA8-B843-BBF44334EA43}"/>
           </ac:picMkLst>
         </pc:picChg>
-        <pc:picChg chg="add mod">
-          <ac:chgData name="Liuchuyao Xu" userId="f38a3cf7e821ef0b" providerId="LiveId" clId="{BCFF7D6F-B234-4BB0-89F9-5081881F6A3D}" dt="2019-11-10T20:29:08.983" v="239" actId="1076"/>
+        <pc:picChg chg="add del mod">
+          <ac:chgData name="Liuchuyao Xu" userId="f38a3cf7e821ef0b" providerId="LiveId" clId="{BCFF7D6F-B234-4BB0-89F9-5081881F6A3D}" dt="2019-11-15T01:18:14.196" v="1983" actId="478"/>
           <ac:picMkLst>
             <pc:docMk/>
             <pc:sldMk cId="1699010107" sldId="257"/>
@@ -320,37 +340,53 @@
           </ac:picMkLst>
         </pc:picChg>
       </pc:sldChg>
-      <pc:sldChg chg="modSp add">
-        <pc:chgData name="Liuchuyao Xu" userId="f38a3cf7e821ef0b" providerId="LiveId" clId="{BCFF7D6F-B234-4BB0-89F9-5081881F6A3D}" dt="2019-11-10T20:35:12.183" v="549" actId="20577"/>
+      <pc:sldChg chg="addSp delSp modSp add addCm delCm">
+        <pc:chgData name="Liuchuyao Xu" userId="f38a3cf7e821ef0b" providerId="LiveId" clId="{BCFF7D6F-B234-4BB0-89F9-5081881F6A3D}" dt="2019-11-19T00:55:17.406" v="5257" actId="121"/>
         <pc:sldMkLst>
           <pc:docMk/>
           <pc:sldMk cId="2131198058" sldId="258"/>
         </pc:sldMkLst>
         <pc:spChg chg="mod">
-          <ac:chgData name="Liuchuyao Xu" userId="f38a3cf7e821ef0b" providerId="LiveId" clId="{BCFF7D6F-B234-4BB0-89F9-5081881F6A3D}" dt="2019-11-10T20:35:12.183" v="549" actId="20577"/>
+          <ac:chgData name="Liuchuyao Xu" userId="f38a3cf7e821ef0b" providerId="LiveId" clId="{BCFF7D6F-B234-4BB0-89F9-5081881F6A3D}" dt="2019-11-15T01:28:54.929" v="2350" actId="20577"/>
           <ac:spMkLst>
             <pc:docMk/>
             <pc:sldMk cId="2131198058" sldId="258"/>
             <ac:spMk id="2" creationId="{07B6D26C-EFD0-4363-A87A-B617A67D8988}"/>
           </ac:spMkLst>
         </pc:spChg>
-        <pc:spChg chg="mod">
-          <ac:chgData name="Liuchuyao Xu" userId="f38a3cf7e821ef0b" providerId="LiveId" clId="{BCFF7D6F-B234-4BB0-89F9-5081881F6A3D}" dt="2019-11-10T20:34:36.042" v="522" actId="20577"/>
+        <pc:spChg chg="del mod">
+          <ac:chgData name="Liuchuyao Xu" userId="f38a3cf7e821ef0b" providerId="LiveId" clId="{BCFF7D6F-B234-4BB0-89F9-5081881F6A3D}" dt="2019-11-15T01:30:50.265" v="2351" actId="931"/>
           <ac:spMkLst>
             <pc:docMk/>
             <pc:sldMk cId="2131198058" sldId="258"/>
             <ac:spMk id="3" creationId="{D1FA4906-954D-4D2C-8273-105E01F38BC3}"/>
           </ac:spMkLst>
         </pc:spChg>
+        <pc:spChg chg="mod">
+          <ac:chgData name="Liuchuyao Xu" userId="f38a3cf7e821ef0b" providerId="LiveId" clId="{BCFF7D6F-B234-4BB0-89F9-5081881F6A3D}" dt="2019-11-19T00:55:17.406" v="5257" actId="121"/>
+          <ac:spMkLst>
+            <pc:docMk/>
+            <pc:sldMk cId="2131198058" sldId="258"/>
+            <ac:spMk id="6" creationId="{9FC4E08E-EA51-4D37-BE91-7C3668AAD708}"/>
+          </ac:spMkLst>
+        </pc:spChg>
+        <pc:picChg chg="add mod">
+          <ac:chgData name="Liuchuyao Xu" userId="f38a3cf7e821ef0b" providerId="LiveId" clId="{BCFF7D6F-B234-4BB0-89F9-5081881F6A3D}" dt="2019-11-15T01:30:51.642" v="2352" actId="27614"/>
+          <ac:picMkLst>
+            <pc:docMk/>
+            <pc:sldMk cId="2131198058" sldId="258"/>
+            <ac:picMk id="5" creationId="{8BA1FE8F-4EDD-45BD-B880-076F08542405}"/>
+          </ac:picMkLst>
+        </pc:picChg>
       </pc:sldChg>
       <pc:sldChg chg="modSp add">
-        <pc:chgData name="Liuchuyao Xu" userId="f38a3cf7e821ef0b" providerId="LiveId" clId="{BCFF7D6F-B234-4BB0-89F9-5081881F6A3D}" dt="2019-11-10T20:36:45.689" v="674" actId="20577"/>
+        <pc:chgData name="Liuchuyao Xu" userId="f38a3cf7e821ef0b" providerId="LiveId" clId="{BCFF7D6F-B234-4BB0-89F9-5081881F6A3D}" dt="2019-11-19T00:53:57.770" v="5249" actId="255"/>
         <pc:sldMkLst>
           <pc:docMk/>
           <pc:sldMk cId="3095687714" sldId="259"/>
         </pc:sldMkLst>
         <pc:spChg chg="mod">
-          <ac:chgData name="Liuchuyao Xu" userId="f38a3cf7e821ef0b" providerId="LiveId" clId="{BCFF7D6F-B234-4BB0-89F9-5081881F6A3D}" dt="2019-11-10T20:35:15.903" v="550" actId="20577"/>
+          <ac:chgData name="Liuchuyao Xu" userId="f38a3cf7e821ef0b" providerId="LiveId" clId="{BCFF7D6F-B234-4BB0-89F9-5081881F6A3D}" dt="2019-11-15T01:37:26.368" v="2362" actId="20577"/>
           <ac:spMkLst>
             <pc:docMk/>
             <pc:sldMk cId="3095687714" sldId="259"/>
@@ -358,7 +394,7 @@
           </ac:spMkLst>
         </pc:spChg>
         <pc:spChg chg="mod">
-          <ac:chgData name="Liuchuyao Xu" userId="f38a3cf7e821ef0b" providerId="LiveId" clId="{BCFF7D6F-B234-4BB0-89F9-5081881F6A3D}" dt="2019-11-10T20:36:45.689" v="674" actId="20577"/>
+          <ac:chgData name="Liuchuyao Xu" userId="f38a3cf7e821ef0b" providerId="LiveId" clId="{BCFF7D6F-B234-4BB0-89F9-5081881F6A3D}" dt="2019-11-19T00:53:57.770" v="5249" actId="255"/>
           <ac:spMkLst>
             <pc:docMk/>
             <pc:sldMk cId="3095687714" sldId="259"/>
@@ -366,8 +402,8 @@
           </ac:spMkLst>
         </pc:spChg>
       </pc:sldChg>
-      <pc:sldChg chg="delSp modSp add">
-        <pc:chgData name="Liuchuyao Xu" userId="f38a3cf7e821ef0b" providerId="LiveId" clId="{BCFF7D6F-B234-4BB0-89F9-5081881F6A3D}" dt="2019-11-10T20:50:06.919" v="1312" actId="5793"/>
+      <pc:sldChg chg="delSp modSp add del">
+        <pc:chgData name="Liuchuyao Xu" userId="f38a3cf7e821ef0b" providerId="LiveId" clId="{BCFF7D6F-B234-4BB0-89F9-5081881F6A3D}" dt="2019-11-15T01:43:27.224" v="2653" actId="2696"/>
         <pc:sldMkLst>
           <pc:docMk/>
           <pc:sldMk cId="1320088088" sldId="260"/>
@@ -398,13 +434,13 @@
         </pc:spChg>
       </pc:sldChg>
       <pc:sldChg chg="modSp add">
-        <pc:chgData name="Liuchuyao Xu" userId="f38a3cf7e821ef0b" providerId="LiveId" clId="{BCFF7D6F-B234-4BB0-89F9-5081881F6A3D}" dt="2019-11-10T20:53:21.421" v="1428" actId="20577"/>
+        <pc:chgData name="Liuchuyao Xu" userId="f38a3cf7e821ef0b" providerId="LiveId" clId="{BCFF7D6F-B234-4BB0-89F9-5081881F6A3D}" dt="2019-11-19T00:54:11.284" v="5251" actId="27636"/>
         <pc:sldMkLst>
           <pc:docMk/>
           <pc:sldMk cId="4251501988" sldId="261"/>
         </pc:sldMkLst>
         <pc:spChg chg="mod">
-          <ac:chgData name="Liuchuyao Xu" userId="f38a3cf7e821ef0b" providerId="LiveId" clId="{BCFF7D6F-B234-4BB0-89F9-5081881F6A3D}" dt="2019-11-10T20:51:14.351" v="1382" actId="20577"/>
+          <ac:chgData name="Liuchuyao Xu" userId="f38a3cf7e821ef0b" providerId="LiveId" clId="{BCFF7D6F-B234-4BB0-89F9-5081881F6A3D}" dt="2019-11-15T01:46:47.264" v="2822" actId="20577"/>
           <ac:spMkLst>
             <pc:docMk/>
             <pc:sldMk cId="4251501988" sldId="261"/>
@@ -412,7 +448,7 @@
           </ac:spMkLst>
         </pc:spChg>
         <pc:spChg chg="mod">
-          <ac:chgData name="Liuchuyao Xu" userId="f38a3cf7e821ef0b" providerId="LiveId" clId="{BCFF7D6F-B234-4BB0-89F9-5081881F6A3D}" dt="2019-11-10T20:53:21.421" v="1428" actId="20577"/>
+          <ac:chgData name="Liuchuyao Xu" userId="f38a3cf7e821ef0b" providerId="LiveId" clId="{BCFF7D6F-B234-4BB0-89F9-5081881F6A3D}" dt="2019-11-19T00:54:11.284" v="5251" actId="27636"/>
           <ac:spMkLst>
             <pc:docMk/>
             <pc:sldMk cId="4251501988" sldId="261"/>
@@ -420,37 +456,261 @@
           </ac:spMkLst>
         </pc:spChg>
       </pc:sldChg>
-      <pc:sldChg chg="modSp add">
-        <pc:chgData name="Liuchuyao Xu" userId="f38a3cf7e821ef0b" providerId="LiveId" clId="{BCFF7D6F-B234-4BB0-89F9-5081881F6A3D}" dt="2019-11-10T20:55:00.355" v="1538" actId="20577"/>
+      <pc:sldChg chg="addSp delSp modSp add del">
+        <pc:chgData name="Liuchuyao Xu" userId="f38a3cf7e821ef0b" providerId="LiveId" clId="{BCFF7D6F-B234-4BB0-89F9-5081881F6A3D}" dt="2019-11-19T00:30:55.915" v="5161" actId="2696"/>
         <pc:sldMkLst>
           <pc:docMk/>
           <pc:sldMk cId="113839659" sldId="262"/>
         </pc:sldMkLst>
         <pc:spChg chg="mod">
-          <ac:chgData name="Liuchuyao Xu" userId="f38a3cf7e821ef0b" providerId="LiveId" clId="{BCFF7D6F-B234-4BB0-89F9-5081881F6A3D}" dt="2019-11-10T20:55:00.355" v="1538" actId="20577"/>
+          <ac:chgData name="Liuchuyao Xu" userId="f38a3cf7e821ef0b" providerId="LiveId" clId="{BCFF7D6F-B234-4BB0-89F9-5081881F6A3D}" dt="2019-11-15T02:02:44.314" v="3618" actId="20577"/>
           <ac:spMkLst>
             <pc:docMk/>
             <pc:sldMk cId="113839659" sldId="262"/>
             <ac:spMk id="2" creationId="{F3C8A950-94E2-40F0-A0FD-C9E550F0C4A8}"/>
           </ac:spMkLst>
         </pc:spChg>
-        <pc:spChg chg="mod">
-          <ac:chgData name="Liuchuyao Xu" userId="f38a3cf7e821ef0b" providerId="LiveId" clId="{BCFF7D6F-B234-4BB0-89F9-5081881F6A3D}" dt="2019-11-10T20:54:25.319" v="1508" actId="207"/>
+        <pc:spChg chg="del mod">
+          <ac:chgData name="Liuchuyao Xu" userId="f38a3cf7e821ef0b" providerId="LiveId" clId="{BCFF7D6F-B234-4BB0-89F9-5081881F6A3D}" dt="2019-11-19T00:30:52.053" v="5160" actId="478"/>
           <ac:spMkLst>
             <pc:docMk/>
             <pc:sldMk cId="113839659" sldId="262"/>
             <ac:spMk id="3" creationId="{BDF2D626-3D52-4FDF-A642-C7C0A875F46C}"/>
           </ac:spMkLst>
         </pc:spChg>
+        <pc:spChg chg="mod">
+          <ac:chgData name="Liuchuyao Xu" userId="f38a3cf7e821ef0b" providerId="LiveId" clId="{BCFF7D6F-B234-4BB0-89F9-5081881F6A3D}" dt="2019-11-19T00:30:17.020" v="5157" actId="13822"/>
+          <ac:spMkLst>
+            <pc:docMk/>
+            <pc:sldMk cId="113839659" sldId="262"/>
+            <ac:spMk id="7" creationId="{28EE4222-AD5B-4A82-B870-9EA1EE4782D7}"/>
+          </ac:spMkLst>
+        </pc:spChg>
+        <pc:spChg chg="mod">
+          <ac:chgData name="Liuchuyao Xu" userId="f38a3cf7e821ef0b" providerId="LiveId" clId="{BCFF7D6F-B234-4BB0-89F9-5081881F6A3D}" dt="2019-11-19T00:30:17.020" v="5157" actId="13822"/>
+          <ac:spMkLst>
+            <pc:docMk/>
+            <pc:sldMk cId="113839659" sldId="262"/>
+            <ac:spMk id="8" creationId="{467A85CE-1A7D-4310-8409-26C7369CD0BF}"/>
+          </ac:spMkLst>
+        </pc:spChg>
+        <pc:spChg chg="mod">
+          <ac:chgData name="Liuchuyao Xu" userId="f38a3cf7e821ef0b" providerId="LiveId" clId="{BCFF7D6F-B234-4BB0-89F9-5081881F6A3D}" dt="2019-11-19T00:30:17.020" v="5157" actId="13822"/>
+          <ac:spMkLst>
+            <pc:docMk/>
+            <pc:sldMk cId="113839659" sldId="262"/>
+            <ac:spMk id="10" creationId="{4761975C-27ED-4D86-9437-6F1A198D7E17}"/>
+          </ac:spMkLst>
+        </pc:spChg>
+        <pc:spChg chg="mod">
+          <ac:chgData name="Liuchuyao Xu" userId="f38a3cf7e821ef0b" providerId="LiveId" clId="{BCFF7D6F-B234-4BB0-89F9-5081881F6A3D}" dt="2019-11-19T00:30:17.020" v="5157" actId="13822"/>
+          <ac:spMkLst>
+            <pc:docMk/>
+            <pc:sldMk cId="113839659" sldId="262"/>
+            <ac:spMk id="11" creationId="{E6ACD7BC-81AA-4188-A7E8-987641112E67}"/>
+          </ac:spMkLst>
+        </pc:spChg>
+        <pc:spChg chg="mod">
+          <ac:chgData name="Liuchuyao Xu" userId="f38a3cf7e821ef0b" providerId="LiveId" clId="{BCFF7D6F-B234-4BB0-89F9-5081881F6A3D}" dt="2019-11-19T00:30:17.020" v="5157" actId="13822"/>
+          <ac:spMkLst>
+            <pc:docMk/>
+            <pc:sldMk cId="113839659" sldId="262"/>
+            <ac:spMk id="13" creationId="{2FAF2BAD-9C36-49A0-A49B-798F55BED985}"/>
+          </ac:spMkLst>
+        </pc:spChg>
+        <pc:spChg chg="mod">
+          <ac:chgData name="Liuchuyao Xu" userId="f38a3cf7e821ef0b" providerId="LiveId" clId="{BCFF7D6F-B234-4BB0-89F9-5081881F6A3D}" dt="2019-11-19T00:30:17.020" v="5157" actId="13822"/>
+          <ac:spMkLst>
+            <pc:docMk/>
+            <pc:sldMk cId="113839659" sldId="262"/>
+            <ac:spMk id="14" creationId="{493033CC-2D5A-49E0-A1F3-05D24408DFA9}"/>
+          </ac:spMkLst>
+        </pc:spChg>
+        <pc:spChg chg="mod">
+          <ac:chgData name="Liuchuyao Xu" userId="f38a3cf7e821ef0b" providerId="LiveId" clId="{BCFF7D6F-B234-4BB0-89F9-5081881F6A3D}" dt="2019-11-19T00:30:17.020" v="5157" actId="13822"/>
+          <ac:spMkLst>
+            <pc:docMk/>
+            <pc:sldMk cId="113839659" sldId="262"/>
+            <ac:spMk id="16" creationId="{50121020-D332-438C-AF4C-AA6B44B059E2}"/>
+          </ac:spMkLst>
+        </pc:spChg>
+        <pc:spChg chg="mod">
+          <ac:chgData name="Liuchuyao Xu" userId="f38a3cf7e821ef0b" providerId="LiveId" clId="{BCFF7D6F-B234-4BB0-89F9-5081881F6A3D}" dt="2019-11-19T00:30:17.020" v="5157" actId="13822"/>
+          <ac:spMkLst>
+            <pc:docMk/>
+            <pc:sldMk cId="113839659" sldId="262"/>
+            <ac:spMk id="17" creationId="{BED57D45-38A1-4D32-9665-1BE1DF8A519D}"/>
+          </ac:spMkLst>
+        </pc:spChg>
+        <pc:spChg chg="mod">
+          <ac:chgData name="Liuchuyao Xu" userId="f38a3cf7e821ef0b" providerId="LiveId" clId="{BCFF7D6F-B234-4BB0-89F9-5081881F6A3D}" dt="2019-11-19T00:30:17.020" v="5157" actId="13822"/>
+          <ac:spMkLst>
+            <pc:docMk/>
+            <pc:sldMk cId="113839659" sldId="262"/>
+            <ac:spMk id="19" creationId="{E46113DB-5CC0-46D0-B148-1182B06959D1}"/>
+          </ac:spMkLst>
+        </pc:spChg>
+        <pc:spChg chg="mod">
+          <ac:chgData name="Liuchuyao Xu" userId="f38a3cf7e821ef0b" providerId="LiveId" clId="{BCFF7D6F-B234-4BB0-89F9-5081881F6A3D}" dt="2019-11-19T00:30:17.020" v="5157" actId="13822"/>
+          <ac:spMkLst>
+            <pc:docMk/>
+            <pc:sldMk cId="113839659" sldId="262"/>
+            <ac:spMk id="20" creationId="{6B29DC47-8746-46A6-BDBE-742E9D14056D}"/>
+          </ac:spMkLst>
+        </pc:spChg>
+        <pc:spChg chg="mod">
+          <ac:chgData name="Liuchuyao Xu" userId="f38a3cf7e821ef0b" providerId="LiveId" clId="{BCFF7D6F-B234-4BB0-89F9-5081881F6A3D}" dt="2019-11-19T00:30:17.020" v="5157" actId="13822"/>
+          <ac:spMkLst>
+            <pc:docMk/>
+            <pc:sldMk cId="113839659" sldId="262"/>
+            <ac:spMk id="22" creationId="{9C90C59E-B224-4E2A-9818-6A191027B831}"/>
+          </ac:spMkLst>
+        </pc:spChg>
+        <pc:spChg chg="mod">
+          <ac:chgData name="Liuchuyao Xu" userId="f38a3cf7e821ef0b" providerId="LiveId" clId="{BCFF7D6F-B234-4BB0-89F9-5081881F6A3D}" dt="2019-11-19T00:30:17.020" v="5157" actId="13822"/>
+          <ac:spMkLst>
+            <pc:docMk/>
+            <pc:sldMk cId="113839659" sldId="262"/>
+            <ac:spMk id="23" creationId="{90E320C5-740B-4246-BE90-CE56CE2FE8A5}"/>
+          </ac:spMkLst>
+        </pc:spChg>
+        <pc:spChg chg="mod">
+          <ac:chgData name="Liuchuyao Xu" userId="f38a3cf7e821ef0b" providerId="LiveId" clId="{BCFF7D6F-B234-4BB0-89F9-5081881F6A3D}" dt="2019-11-19T00:30:17.020" v="5157" actId="13822"/>
+          <ac:spMkLst>
+            <pc:docMk/>
+            <pc:sldMk cId="113839659" sldId="262"/>
+            <ac:spMk id="25" creationId="{B9B51574-F8DE-4875-9EF1-A3749A614F08}"/>
+          </ac:spMkLst>
+        </pc:spChg>
+        <pc:spChg chg="mod">
+          <ac:chgData name="Liuchuyao Xu" userId="f38a3cf7e821ef0b" providerId="LiveId" clId="{BCFF7D6F-B234-4BB0-89F9-5081881F6A3D}" dt="2019-11-19T00:30:17.020" v="5157" actId="13822"/>
+          <ac:spMkLst>
+            <pc:docMk/>
+            <pc:sldMk cId="113839659" sldId="262"/>
+            <ac:spMk id="26" creationId="{E624976D-3DA6-43F5-8463-6872DC349ECF}"/>
+          </ac:spMkLst>
+        </pc:spChg>
+        <pc:spChg chg="add del mod">
+          <ac:chgData name="Liuchuyao Xu" userId="f38a3cf7e821ef0b" providerId="LiveId" clId="{BCFF7D6F-B234-4BB0-89F9-5081881F6A3D}" dt="2019-11-19T00:30:52.053" v="5160" actId="478"/>
+          <ac:spMkLst>
+            <pc:docMk/>
+            <pc:sldMk cId="113839659" sldId="262"/>
+            <ac:spMk id="27" creationId="{752AB435-177F-4EE8-B19F-51C772D17D50}"/>
+          </ac:spMkLst>
+        </pc:spChg>
+        <pc:spChg chg="mod">
+          <ac:chgData name="Liuchuyao Xu" userId="f38a3cf7e821ef0b" providerId="LiveId" clId="{BCFF7D6F-B234-4BB0-89F9-5081881F6A3D}" dt="2019-11-19T00:30:17.020" v="5157" actId="13822"/>
+          <ac:spMkLst>
+            <pc:docMk/>
+            <pc:sldMk cId="113839659" sldId="262"/>
+            <ac:spMk id="29" creationId="{3AFF6D7E-A301-4032-A7E1-B7288FE328C7}"/>
+          </ac:spMkLst>
+        </pc:spChg>
+        <pc:spChg chg="mod">
+          <ac:chgData name="Liuchuyao Xu" userId="f38a3cf7e821ef0b" providerId="LiveId" clId="{BCFF7D6F-B234-4BB0-89F9-5081881F6A3D}" dt="2019-11-19T00:30:17.020" v="5157" actId="13822"/>
+          <ac:spMkLst>
+            <pc:docMk/>
+            <pc:sldMk cId="113839659" sldId="262"/>
+            <ac:spMk id="30" creationId="{27F4734E-7683-4D21-A47D-57D51B79BCBB}"/>
+          </ac:spMkLst>
+        </pc:spChg>
+        <pc:spChg chg="add del mod">
+          <ac:chgData name="Liuchuyao Xu" userId="f38a3cf7e821ef0b" providerId="LiveId" clId="{BCFF7D6F-B234-4BB0-89F9-5081881F6A3D}" dt="2019-11-19T00:30:52.053" v="5160" actId="478"/>
+          <ac:spMkLst>
+            <pc:docMk/>
+            <pc:sldMk cId="113839659" sldId="262"/>
+            <ac:spMk id="31" creationId="{CB5A9069-CC9C-4069-AB1F-19DF483BB61D}"/>
+          </ac:spMkLst>
+        </pc:spChg>
+        <pc:grpChg chg="add del">
+          <ac:chgData name="Liuchuyao Xu" userId="f38a3cf7e821ef0b" providerId="LiveId" clId="{BCFF7D6F-B234-4BB0-89F9-5081881F6A3D}" dt="2019-11-19T00:30:52.053" v="5160" actId="478"/>
+          <ac:grpSpMkLst>
+            <pc:docMk/>
+            <pc:sldMk cId="113839659" sldId="262"/>
+            <ac:grpSpMk id="6" creationId="{B76EFEC7-D78B-411B-A64F-66BD5B9DA7ED}"/>
+          </ac:grpSpMkLst>
+        </pc:grpChg>
+        <pc:grpChg chg="add del">
+          <ac:chgData name="Liuchuyao Xu" userId="f38a3cf7e821ef0b" providerId="LiveId" clId="{BCFF7D6F-B234-4BB0-89F9-5081881F6A3D}" dt="2019-11-19T00:30:52.053" v="5160" actId="478"/>
+          <ac:grpSpMkLst>
+            <pc:docMk/>
+            <pc:sldMk cId="113839659" sldId="262"/>
+            <ac:grpSpMk id="9" creationId="{A9EAA524-9C51-4E41-82C6-A60268647F72}"/>
+          </ac:grpSpMkLst>
+        </pc:grpChg>
+        <pc:grpChg chg="add del">
+          <ac:chgData name="Liuchuyao Xu" userId="f38a3cf7e821ef0b" providerId="LiveId" clId="{BCFF7D6F-B234-4BB0-89F9-5081881F6A3D}" dt="2019-11-19T00:30:52.053" v="5160" actId="478"/>
+          <ac:grpSpMkLst>
+            <pc:docMk/>
+            <pc:sldMk cId="113839659" sldId="262"/>
+            <ac:grpSpMk id="12" creationId="{A3159B04-8412-4265-81AB-B389CBB5E860}"/>
+          </ac:grpSpMkLst>
+        </pc:grpChg>
+        <pc:grpChg chg="add del mod">
+          <ac:chgData name="Liuchuyao Xu" userId="f38a3cf7e821ef0b" providerId="LiveId" clId="{BCFF7D6F-B234-4BB0-89F9-5081881F6A3D}" dt="2019-11-19T00:30:52.053" v="5160" actId="478"/>
+          <ac:grpSpMkLst>
+            <pc:docMk/>
+            <pc:sldMk cId="113839659" sldId="262"/>
+            <ac:grpSpMk id="15" creationId="{A01E6734-D76D-4969-8418-5CFC678D0141}"/>
+          </ac:grpSpMkLst>
+        </pc:grpChg>
+        <pc:grpChg chg="add del">
+          <ac:chgData name="Liuchuyao Xu" userId="f38a3cf7e821ef0b" providerId="LiveId" clId="{BCFF7D6F-B234-4BB0-89F9-5081881F6A3D}" dt="2019-11-19T00:30:52.053" v="5160" actId="478"/>
+          <ac:grpSpMkLst>
+            <pc:docMk/>
+            <pc:sldMk cId="113839659" sldId="262"/>
+            <ac:grpSpMk id="18" creationId="{D6370250-AE27-4F0E-AD97-080EB6AAB150}"/>
+          </ac:grpSpMkLst>
+        </pc:grpChg>
+        <pc:grpChg chg="add del">
+          <ac:chgData name="Liuchuyao Xu" userId="f38a3cf7e821ef0b" providerId="LiveId" clId="{BCFF7D6F-B234-4BB0-89F9-5081881F6A3D}" dt="2019-11-19T00:30:52.053" v="5160" actId="478"/>
+          <ac:grpSpMkLst>
+            <pc:docMk/>
+            <pc:sldMk cId="113839659" sldId="262"/>
+            <ac:grpSpMk id="21" creationId="{19AD3261-8C33-4B63-87DC-C33B8E01835E}"/>
+          </ac:grpSpMkLst>
+        </pc:grpChg>
+        <pc:grpChg chg="add del">
+          <ac:chgData name="Liuchuyao Xu" userId="f38a3cf7e821ef0b" providerId="LiveId" clId="{BCFF7D6F-B234-4BB0-89F9-5081881F6A3D}" dt="2019-11-19T00:30:52.053" v="5160" actId="478"/>
+          <ac:grpSpMkLst>
+            <pc:docMk/>
+            <pc:sldMk cId="113839659" sldId="262"/>
+            <ac:grpSpMk id="24" creationId="{8B5C5F01-CCA4-46D6-B062-CEC3CC475171}"/>
+          </ac:grpSpMkLst>
+        </pc:grpChg>
+        <pc:grpChg chg="add del">
+          <ac:chgData name="Liuchuyao Xu" userId="f38a3cf7e821ef0b" providerId="LiveId" clId="{BCFF7D6F-B234-4BB0-89F9-5081881F6A3D}" dt="2019-11-19T00:30:52.053" v="5160" actId="478"/>
+          <ac:grpSpMkLst>
+            <pc:docMk/>
+            <pc:sldMk cId="113839659" sldId="262"/>
+            <ac:grpSpMk id="28" creationId="{05FAC5F1-9BB1-41DA-B80C-836F9902FFAE}"/>
+          </ac:grpSpMkLst>
+        </pc:grpChg>
+        <pc:graphicFrameChg chg="add">
+          <ac:chgData name="Liuchuyao Xu" userId="f38a3cf7e821ef0b" providerId="LiveId" clId="{BCFF7D6F-B234-4BB0-89F9-5081881F6A3D}" dt="2019-11-19T00:30:09.957" v="5155"/>
+          <ac:graphicFrameMkLst>
+            <pc:docMk/>
+            <pc:sldMk cId="113839659" sldId="262"/>
+            <ac:graphicFrameMk id="4" creationId="{54C6596F-617F-48F5-8186-C4F7FE522238}"/>
+          </ac:graphicFrameMkLst>
+        </pc:graphicFrameChg>
+        <pc:graphicFrameChg chg="add del">
+          <ac:chgData name="Liuchuyao Xu" userId="f38a3cf7e821ef0b" providerId="LiveId" clId="{BCFF7D6F-B234-4BB0-89F9-5081881F6A3D}" dt="2019-11-19T00:30:52.053" v="5160" actId="478"/>
+          <ac:graphicFrameMkLst>
+            <pc:docMk/>
+            <pc:sldMk cId="113839659" sldId="262"/>
+            <ac:graphicFrameMk id="5" creationId="{61D9A015-DA0F-4342-B253-4898F75CB5CA}"/>
+          </ac:graphicFrameMkLst>
+        </pc:graphicFrameChg>
       </pc:sldChg>
       <pc:sldChg chg="modSp add">
-        <pc:chgData name="Liuchuyao Xu" userId="f38a3cf7e821ef0b" providerId="LiveId" clId="{BCFF7D6F-B234-4BB0-89F9-5081881F6A3D}" dt="2019-11-10T20:54:33.634" v="1520" actId="20577"/>
+        <pc:chgData name="Liuchuyao Xu" userId="f38a3cf7e821ef0b" providerId="LiveId" clId="{BCFF7D6F-B234-4BB0-89F9-5081881F6A3D}" dt="2019-11-19T00:54:18.498" v="5252" actId="255"/>
         <pc:sldMkLst>
           <pc:docMk/>
           <pc:sldMk cId="907779783" sldId="263"/>
         </pc:sldMkLst>
         <pc:spChg chg="mod">
-          <ac:chgData name="Liuchuyao Xu" userId="f38a3cf7e821ef0b" providerId="LiveId" clId="{BCFF7D6F-B234-4BB0-89F9-5081881F6A3D}" dt="2019-11-10T20:50:56.736" v="1315" actId="120"/>
+          <ac:chgData name="Liuchuyao Xu" userId="f38a3cf7e821ef0b" providerId="LiveId" clId="{BCFF7D6F-B234-4BB0-89F9-5081881F6A3D}" dt="2019-11-15T02:01:59.500" v="3597" actId="20577"/>
           <ac:spMkLst>
             <pc:docMk/>
             <pc:sldMk cId="907779783" sldId="263"/>
@@ -458,13 +718,121 @@
           </ac:spMkLst>
         </pc:spChg>
         <pc:spChg chg="mod">
-          <ac:chgData name="Liuchuyao Xu" userId="f38a3cf7e821ef0b" providerId="LiveId" clId="{BCFF7D6F-B234-4BB0-89F9-5081881F6A3D}" dt="2019-11-10T20:54:33.634" v="1520" actId="20577"/>
+          <ac:chgData name="Liuchuyao Xu" userId="f38a3cf7e821ef0b" providerId="LiveId" clId="{BCFF7D6F-B234-4BB0-89F9-5081881F6A3D}" dt="2019-11-19T00:54:18.498" v="5252" actId="255"/>
           <ac:spMkLst>
             <pc:docMk/>
             <pc:sldMk cId="907779783" sldId="263"/>
             <ac:spMk id="3" creationId="{164479EF-3341-4B89-AE26-E6EFEB4F7946}"/>
           </ac:spMkLst>
         </pc:spChg>
+      </pc:sldChg>
+      <pc:sldChg chg="addSp delSp modSp add">
+        <pc:chgData name="Liuchuyao Xu" userId="f38a3cf7e821ef0b" providerId="LiveId" clId="{BCFF7D6F-B234-4BB0-89F9-5081881F6A3D}" dt="2019-11-19T00:27:27.665" v="5152" actId="12788"/>
+        <pc:sldMkLst>
+          <pc:docMk/>
+          <pc:sldMk cId="342202315" sldId="264"/>
+        </pc:sldMkLst>
+        <pc:spChg chg="mod">
+          <ac:chgData name="Liuchuyao Xu" userId="f38a3cf7e821ef0b" providerId="LiveId" clId="{BCFF7D6F-B234-4BB0-89F9-5081881F6A3D}" dt="2019-11-15T02:23:24.738" v="4254" actId="120"/>
+          <ac:spMkLst>
+            <pc:docMk/>
+            <pc:sldMk cId="342202315" sldId="264"/>
+            <ac:spMk id="2" creationId="{ADF1CA83-45C6-4AF9-B286-6137893515FE}"/>
+          </ac:spMkLst>
+        </pc:spChg>
+        <pc:spChg chg="del">
+          <ac:chgData name="Liuchuyao Xu" userId="f38a3cf7e821ef0b" providerId="LiveId" clId="{BCFF7D6F-B234-4BB0-89F9-5081881F6A3D}" dt="2019-11-15T02:25:42.959" v="4255" actId="931"/>
+          <ac:spMkLst>
+            <pc:docMk/>
+            <pc:sldMk cId="342202315" sldId="264"/>
+            <ac:spMk id="3" creationId="{BEECCEFE-FE1F-4A8F-8E21-8873F23FC223}"/>
+          </ac:spMkLst>
+        </pc:spChg>
+        <pc:spChg chg="add del mod">
+          <ac:chgData name="Liuchuyao Xu" userId="f38a3cf7e821ef0b" providerId="LiveId" clId="{BCFF7D6F-B234-4BB0-89F9-5081881F6A3D}" dt="2019-11-19T00:25:15.593" v="5140" actId="931"/>
+          <ac:spMkLst>
+            <pc:docMk/>
+            <pc:sldMk cId="342202315" sldId="264"/>
+            <ac:spMk id="4" creationId="{2DA86CC0-01E4-46D2-A804-27764643BDFD}"/>
+          </ac:spMkLst>
+        </pc:spChg>
+        <pc:spChg chg="add del mod">
+          <ac:chgData name="Liuchuyao Xu" userId="f38a3cf7e821ef0b" providerId="LiveId" clId="{BCFF7D6F-B234-4BB0-89F9-5081881F6A3D}" dt="2019-11-19T00:27:06.354" v="5147" actId="931"/>
+          <ac:spMkLst>
+            <pc:docMk/>
+            <pc:sldMk cId="342202315" sldId="264"/>
+            <ac:spMk id="9" creationId="{E2ECDC06-01A1-4B69-8B42-AC2C239455BA}"/>
+          </ac:spMkLst>
+        </pc:spChg>
+        <pc:picChg chg="add del mod">
+          <ac:chgData name="Liuchuyao Xu" userId="f38a3cf7e821ef0b" providerId="LiveId" clId="{BCFF7D6F-B234-4BB0-89F9-5081881F6A3D}" dt="2019-11-19T00:25:08.105" v="5139" actId="478"/>
+          <ac:picMkLst>
+            <pc:docMk/>
+            <pc:sldMk cId="342202315" sldId="264"/>
+            <ac:picMk id="5" creationId="{AD97A9BF-4C3C-488E-8640-C79F396F93A5}"/>
+          </ac:picMkLst>
+        </pc:picChg>
+        <pc:picChg chg="add del mod">
+          <ac:chgData name="Liuchuyao Xu" userId="f38a3cf7e821ef0b" providerId="LiveId" clId="{BCFF7D6F-B234-4BB0-89F9-5081881F6A3D}" dt="2019-11-19T00:27:00.708" v="5146" actId="478"/>
+          <ac:picMkLst>
+            <pc:docMk/>
+            <pc:sldMk cId="342202315" sldId="264"/>
+            <ac:picMk id="7" creationId="{BDED83EB-6F11-46EE-B445-853EF0FA7922}"/>
+          </ac:picMkLst>
+        </pc:picChg>
+        <pc:picChg chg="add mod">
+          <ac:chgData name="Liuchuyao Xu" userId="f38a3cf7e821ef0b" providerId="LiveId" clId="{BCFF7D6F-B234-4BB0-89F9-5081881F6A3D}" dt="2019-11-19T00:27:27.665" v="5152" actId="12788"/>
+          <ac:picMkLst>
+            <pc:docMk/>
+            <pc:sldMk cId="342202315" sldId="264"/>
+            <ac:picMk id="11" creationId="{365D9495-1CE2-4D06-991D-B17373C6A1AE}"/>
+          </ac:picMkLst>
+        </pc:picChg>
+      </pc:sldChg>
+      <pc:sldChg chg="addSp delSp modSp add mod">
+        <pc:chgData name="Liuchuyao Xu" userId="f38a3cf7e821ef0b" providerId="LiveId" clId="{BCFF7D6F-B234-4BB0-89F9-5081881F6A3D}" dt="2019-11-19T00:54:30.317" v="5253" actId="255"/>
+        <pc:sldMkLst>
+          <pc:docMk/>
+          <pc:sldMk cId="123446897" sldId="265"/>
+        </pc:sldMkLst>
+        <pc:spChg chg="del mod">
+          <ac:chgData name="Liuchuyao Xu" userId="f38a3cf7e821ef0b" providerId="LiveId" clId="{BCFF7D6F-B234-4BB0-89F9-5081881F6A3D}" dt="2019-11-19T00:31:13.049" v="5165" actId="1957"/>
+          <ac:spMkLst>
+            <pc:docMk/>
+            <pc:sldMk cId="123446897" sldId="265"/>
+            <ac:spMk id="3" creationId="{BDF2D626-3D52-4FDF-A642-C7C0A875F46C}"/>
+          </ac:spMkLst>
+        </pc:spChg>
+        <pc:graphicFrameChg chg="add mod">
+          <ac:chgData name="Liuchuyao Xu" userId="f38a3cf7e821ef0b" providerId="LiveId" clId="{BCFF7D6F-B234-4BB0-89F9-5081881F6A3D}" dt="2019-11-19T00:54:30.317" v="5253" actId="255"/>
+          <ac:graphicFrameMkLst>
+            <pc:docMk/>
+            <pc:sldMk cId="123446897" sldId="265"/>
+            <ac:graphicFrameMk id="6" creationId="{4DE19DC6-FA58-4D68-AC15-CEF2E1D8155A}"/>
+          </ac:graphicFrameMkLst>
+        </pc:graphicFrameChg>
+      </pc:sldChg>
+      <pc:sldChg chg="modSp add del">
+        <pc:chgData name="Liuchuyao Xu" userId="f38a3cf7e821ef0b" providerId="LiveId" clId="{BCFF7D6F-B234-4BB0-89F9-5081881F6A3D}" dt="2019-11-19T00:22:22.217" v="5138" actId="2696"/>
+        <pc:sldMkLst>
+          <pc:docMk/>
+          <pc:sldMk cId="1875092150" sldId="265"/>
+        </pc:sldMkLst>
+        <pc:spChg chg="mod">
+          <ac:chgData name="Liuchuyao Xu" userId="f38a3cf7e821ef0b" providerId="LiveId" clId="{BCFF7D6F-B234-4BB0-89F9-5081881F6A3D}" dt="2019-11-18T11:24:59.687" v="4960" actId="20577"/>
+          <ac:spMkLst>
+            <pc:docMk/>
+            <pc:sldMk cId="1875092150" sldId="265"/>
+            <ac:spMk id="3" creationId="{FDB0D914-EF25-4E02-A145-21F87D469AB6}"/>
+          </ac:spMkLst>
+        </pc:spChg>
+      </pc:sldChg>
+      <pc:sldChg chg="add del">
+        <pc:chgData name="Liuchuyao Xu" userId="f38a3cf7e821ef0b" providerId="LiveId" clId="{BCFF7D6F-B234-4BB0-89F9-5081881F6A3D}" dt="2019-11-19T00:52:28.919" v="5247" actId="2696"/>
+        <pc:sldMkLst>
+          <pc:docMk/>
+          <pc:sldMk cId="690608430" sldId="266"/>
+        </pc:sldMkLst>
       </pc:sldChg>
       <pc:sldMasterChg chg="add del addSldLayout delSldLayout">
         <pc:chgData name="Liuchuyao Xu" userId="f38a3cf7e821ef0b" providerId="LiveId" clId="{BCFF7D6F-B234-4BB0-89F9-5081881F6A3D}" dt="2019-11-10T20:16:26.847" v="86" actId="26606"/>
@@ -1040,6 +1408,1514 @@
     </pc:docChg>
   </pc:docChgLst>
 </pc:chgInfo>
+</file>
+
+<file path=ppt/charts/chart1.xml><?xml version="1.0" encoding="utf-8"?>
+<c:chartSpace xmlns:c="http://schemas.openxmlformats.org/drawingml/2006/chart" xmlns:a="http://schemas.openxmlformats.org/drawingml/2006/main" xmlns:r="http://schemas.openxmlformats.org/officeDocument/2006/relationships" xmlns:c16r2="http://schemas.microsoft.com/office/drawing/2015/06/chart">
+  <c:date1904 val="0"/>
+  <c:lang val="en-US"/>
+  <c:roundedCorners val="0"/>
+  <mc:AlternateContent xmlns:mc="http://schemas.openxmlformats.org/markup-compatibility/2006">
+    <mc:Choice xmlns:c14="http://schemas.microsoft.com/office/drawing/2007/8/2/chart" Requires="c14">
+      <c14:style val="102"/>
+    </mc:Choice>
+    <mc:Fallback>
+      <c:style val="2"/>
+    </mc:Fallback>
+  </mc:AlternateContent>
+  <c:chart>
+    <c:autoTitleDeleted val="1"/>
+    <c:plotArea>
+      <c:layout/>
+      <c:barChart>
+        <c:barDir val="bar"/>
+        <c:grouping val="stacked"/>
+        <c:varyColors val="0"/>
+        <c:ser>
+          <c:idx val="0"/>
+          <c:order val="0"/>
+          <c:tx>
+            <c:strRef>
+              <c:f>Sheet1!$B$1</c:f>
+              <c:strCache>
+                <c:ptCount val="1"/>
+                <c:pt idx="0">
+                  <c:v>Begin</c:v>
+                </c:pt>
+              </c:strCache>
+            </c:strRef>
+          </c:tx>
+          <c:spPr>
+            <a:noFill/>
+            <a:ln>
+              <a:noFill/>
+            </a:ln>
+            <a:effectLst/>
+          </c:spPr>
+          <c:invertIfNegative val="0"/>
+          <c:cat>
+            <c:strRef>
+              <c:f>Sheet1!$A$2:$A$8</c:f>
+              <c:strCache>
+                <c:ptCount val="7"/>
+                <c:pt idx="0">
+                  <c:v>Release software</c:v>
+                </c:pt>
+                <c:pt idx="1">
+                  <c:v>Improve GUI</c:v>
+                </c:pt>
+                <c:pt idx="2">
+                  <c:v>Evaluate GUI</c:v>
+                </c:pt>
+                <c:pt idx="3">
+                  <c:v>Complete GUI</c:v>
+                </c:pt>
+                <c:pt idx="4">
+                  <c:v>Improve features</c:v>
+                </c:pt>
+                <c:pt idx="5">
+                  <c:v>Evaluate features</c:v>
+                </c:pt>
+                <c:pt idx="6">
+                  <c:v>Complete features</c:v>
+                </c:pt>
+              </c:strCache>
+            </c:strRef>
+          </c:cat>
+          <c:val>
+            <c:numRef>
+              <c:f>Sheet1!$B$2:$B$8</c:f>
+              <c:numCache>
+                <c:formatCode>[$-809]dd\ mmmm\ yyyy;@</c:formatCode>
+                <c:ptCount val="7"/>
+                <c:pt idx="0">
+                  <c:v>43928</c:v>
+                </c:pt>
+                <c:pt idx="1">
+                  <c:v>43888</c:v>
+                </c:pt>
+                <c:pt idx="2">
+                  <c:v>43888</c:v>
+                </c:pt>
+                <c:pt idx="3">
+                  <c:v>43868</c:v>
+                </c:pt>
+                <c:pt idx="4">
+                  <c:v>43808</c:v>
+                </c:pt>
+                <c:pt idx="5">
+                  <c:v>43808</c:v>
+                </c:pt>
+                <c:pt idx="6">
+                  <c:v>43788</c:v>
+                </c:pt>
+              </c:numCache>
+            </c:numRef>
+          </c:val>
+          <c:extLst>
+            <c:ext xmlns:c16="http://schemas.microsoft.com/office/drawing/2014/chart" uri="{C3380CC4-5D6E-409C-BE32-E72D297353CC}">
+              <c16:uniqueId val="{00000000-54F9-4E89-9160-E1B2E466B756}"/>
+            </c:ext>
+          </c:extLst>
+        </c:ser>
+        <c:ser>
+          <c:idx val="1"/>
+          <c:order val="1"/>
+          <c:tx>
+            <c:strRef>
+              <c:f>Sheet1!$C$1</c:f>
+              <c:strCache>
+                <c:ptCount val="1"/>
+                <c:pt idx="0">
+                  <c:v>Duration</c:v>
+                </c:pt>
+              </c:strCache>
+            </c:strRef>
+          </c:tx>
+          <c:spPr>
+            <a:solidFill>
+              <a:schemeClr val="accent2"/>
+            </a:solidFill>
+            <a:ln>
+              <a:noFill/>
+            </a:ln>
+            <a:effectLst/>
+          </c:spPr>
+          <c:invertIfNegative val="0"/>
+          <c:cat>
+            <c:strRef>
+              <c:f>Sheet1!$A$2:$A$8</c:f>
+              <c:strCache>
+                <c:ptCount val="7"/>
+                <c:pt idx="0">
+                  <c:v>Release software</c:v>
+                </c:pt>
+                <c:pt idx="1">
+                  <c:v>Improve GUI</c:v>
+                </c:pt>
+                <c:pt idx="2">
+                  <c:v>Evaluate GUI</c:v>
+                </c:pt>
+                <c:pt idx="3">
+                  <c:v>Complete GUI</c:v>
+                </c:pt>
+                <c:pt idx="4">
+                  <c:v>Improve features</c:v>
+                </c:pt>
+                <c:pt idx="5">
+                  <c:v>Evaluate features</c:v>
+                </c:pt>
+                <c:pt idx="6">
+                  <c:v>Complete features</c:v>
+                </c:pt>
+              </c:strCache>
+            </c:strRef>
+          </c:cat>
+          <c:val>
+            <c:numRef>
+              <c:f>Sheet1!$C$2:$C$8</c:f>
+              <c:numCache>
+                <c:formatCode>[$-809]dd\ mmmm\ yyyy;@</c:formatCode>
+                <c:ptCount val="7"/>
+                <c:pt idx="0">
+                  <c:v>40</c:v>
+                </c:pt>
+                <c:pt idx="1">
+                  <c:v>60</c:v>
+                </c:pt>
+                <c:pt idx="2">
+                  <c:v>60</c:v>
+                </c:pt>
+                <c:pt idx="3">
+                  <c:v>40</c:v>
+                </c:pt>
+                <c:pt idx="4">
+                  <c:v>80</c:v>
+                </c:pt>
+                <c:pt idx="5">
+                  <c:v>80</c:v>
+                </c:pt>
+                <c:pt idx="6">
+                  <c:v>40</c:v>
+                </c:pt>
+              </c:numCache>
+            </c:numRef>
+          </c:val>
+          <c:extLst>
+            <c:ext xmlns:c16="http://schemas.microsoft.com/office/drawing/2014/chart" uri="{C3380CC4-5D6E-409C-BE32-E72D297353CC}">
+              <c16:uniqueId val="{00000001-54F9-4E89-9160-E1B2E466B756}"/>
+            </c:ext>
+          </c:extLst>
+        </c:ser>
+        <c:dLbls>
+          <c:showLegendKey val="0"/>
+          <c:showVal val="0"/>
+          <c:showCatName val="0"/>
+          <c:showSerName val="0"/>
+          <c:showPercent val="0"/>
+          <c:showBubbleSize val="0"/>
+        </c:dLbls>
+        <c:gapWidth val="150"/>
+        <c:overlap val="100"/>
+        <c:axId val="685160760"/>
+        <c:axId val="685161400"/>
+      </c:barChart>
+      <c:catAx>
+        <c:axId val="685160760"/>
+        <c:scaling>
+          <c:orientation val="minMax"/>
+        </c:scaling>
+        <c:delete val="0"/>
+        <c:axPos val="l"/>
+        <c:numFmt formatCode="General" sourceLinked="1"/>
+        <c:majorTickMark val="none"/>
+        <c:minorTickMark val="none"/>
+        <c:tickLblPos val="nextTo"/>
+        <c:spPr>
+          <a:noFill/>
+          <a:ln w="9525" cap="flat" cmpd="sng" algn="ctr">
+            <a:solidFill>
+              <a:schemeClr val="tx1">
+                <a:lumMod val="15000"/>
+                <a:lumOff val="85000"/>
+              </a:schemeClr>
+            </a:solidFill>
+            <a:round/>
+          </a:ln>
+          <a:effectLst/>
+        </c:spPr>
+        <c:txPr>
+          <a:bodyPr rot="-60000000" spcFirstLastPara="1" vertOverflow="ellipsis" vert="horz" wrap="square" anchor="ctr" anchorCtr="1"/>
+          <a:lstStyle/>
+          <a:p>
+            <a:pPr>
+              <a:defRPr sz="1800" b="0" i="0" u="none" strike="noStrike" kern="1200" baseline="0">
+                <a:solidFill>
+                  <a:schemeClr val="tx1">
+                    <a:lumMod val="65000"/>
+                    <a:lumOff val="35000"/>
+                  </a:schemeClr>
+                </a:solidFill>
+                <a:latin typeface="+mn-lt"/>
+                <a:ea typeface="+mn-ea"/>
+                <a:cs typeface="+mn-cs"/>
+              </a:defRPr>
+            </a:pPr>
+            <a:endParaRPr lang="en-US"/>
+          </a:p>
+        </c:txPr>
+        <c:crossAx val="685161400"/>
+        <c:crosses val="autoZero"/>
+        <c:auto val="1"/>
+        <c:lblAlgn val="ctr"/>
+        <c:lblOffset val="100"/>
+        <c:noMultiLvlLbl val="0"/>
+      </c:catAx>
+      <c:valAx>
+        <c:axId val="685161400"/>
+        <c:scaling>
+          <c:orientation val="minMax"/>
+          <c:max val="43978"/>
+          <c:min val="43788"/>
+        </c:scaling>
+        <c:delete val="0"/>
+        <c:axPos val="b"/>
+        <c:majorGridlines>
+          <c:spPr>
+            <a:ln w="9525" cap="flat" cmpd="sng" algn="ctr">
+              <a:solidFill>
+                <a:schemeClr val="tx1">
+                  <a:lumMod val="15000"/>
+                  <a:lumOff val="85000"/>
+                </a:schemeClr>
+              </a:solidFill>
+              <a:round/>
+            </a:ln>
+            <a:effectLst/>
+          </c:spPr>
+        </c:majorGridlines>
+        <c:numFmt formatCode="[$-809]dd\ mmm;@" sourceLinked="0"/>
+        <c:majorTickMark val="none"/>
+        <c:minorTickMark val="none"/>
+        <c:tickLblPos val="nextTo"/>
+        <c:spPr>
+          <a:noFill/>
+          <a:ln>
+            <a:noFill/>
+          </a:ln>
+          <a:effectLst/>
+        </c:spPr>
+        <c:txPr>
+          <a:bodyPr rot="-60000000" spcFirstLastPara="1" vertOverflow="ellipsis" vert="horz" wrap="square" anchor="ctr" anchorCtr="1"/>
+          <a:lstStyle/>
+          <a:p>
+            <a:pPr>
+              <a:defRPr sz="1197" b="0" i="0" u="none" strike="noStrike" kern="1200" baseline="0">
+                <a:solidFill>
+                  <a:schemeClr val="tx1">
+                    <a:lumMod val="65000"/>
+                    <a:lumOff val="35000"/>
+                  </a:schemeClr>
+                </a:solidFill>
+                <a:latin typeface="+mn-lt"/>
+                <a:ea typeface="+mn-ea"/>
+                <a:cs typeface="+mn-cs"/>
+              </a:defRPr>
+            </a:pPr>
+            <a:endParaRPr lang="en-US"/>
+          </a:p>
+        </c:txPr>
+        <c:crossAx val="685160760"/>
+        <c:crosses val="autoZero"/>
+        <c:crossBetween val="between"/>
+      </c:valAx>
+      <c:spPr>
+        <a:noFill/>
+        <a:ln>
+          <a:noFill/>
+        </a:ln>
+        <a:effectLst/>
+      </c:spPr>
+    </c:plotArea>
+    <c:plotVisOnly val="1"/>
+    <c:dispBlanksAs val="gap"/>
+    <c:extLst>
+      <c:ext xmlns:c16r3="http://schemas.microsoft.com/office/drawing/2017/03/chart" uri="{56B9EC1D-385E-4148-901F-78D8002777C0}">
+        <c16r3:dataDisplayOptions16>
+          <c16r3:dispNaAsBlank val="1"/>
+        </c16r3:dataDisplayOptions16>
+      </c:ext>
+    </c:extLst>
+    <c:showDLblsOverMax val="0"/>
+  </c:chart>
+  <c:spPr>
+    <a:noFill/>
+    <a:ln>
+      <a:noFill/>
+    </a:ln>
+    <a:effectLst/>
+  </c:spPr>
+  <c:txPr>
+    <a:bodyPr/>
+    <a:lstStyle/>
+    <a:p>
+      <a:pPr>
+        <a:defRPr/>
+      </a:pPr>
+      <a:endParaRPr lang="en-US"/>
+    </a:p>
+  </c:txPr>
+  <c:externalData r:id="rId3">
+    <c:autoUpdate val="0"/>
+  </c:externalData>
+</c:chartSpace>
+</file>
+
+<file path=ppt/charts/colors1.xml><?xml version="1.0" encoding="utf-8"?>
+<cs:colorStyle xmlns:cs="http://schemas.microsoft.com/office/drawing/2012/chartStyle" xmlns:a="http://schemas.openxmlformats.org/drawingml/2006/main" meth="cycle" id="10">
+  <a:schemeClr val="accent1"/>
+  <a:schemeClr val="accent2"/>
+  <a:schemeClr val="accent3"/>
+  <a:schemeClr val="accent4"/>
+  <a:schemeClr val="accent5"/>
+  <a:schemeClr val="accent6"/>
+  <cs:variation/>
+  <cs:variation>
+    <a:lumMod val="60000"/>
+  </cs:variation>
+  <cs:variation>
+    <a:lumMod val="80000"/>
+    <a:lumOff val="20000"/>
+  </cs:variation>
+  <cs:variation>
+    <a:lumMod val="80000"/>
+  </cs:variation>
+  <cs:variation>
+    <a:lumMod val="60000"/>
+    <a:lumOff val="40000"/>
+  </cs:variation>
+  <cs:variation>
+    <a:lumMod val="50000"/>
+  </cs:variation>
+  <cs:variation>
+    <a:lumMod val="70000"/>
+    <a:lumOff val="30000"/>
+  </cs:variation>
+  <cs:variation>
+    <a:lumMod val="70000"/>
+  </cs:variation>
+  <cs:variation>
+    <a:lumMod val="50000"/>
+    <a:lumOff val="50000"/>
+  </cs:variation>
+</cs:colorStyle>
+</file>
+
+<file path=ppt/charts/style1.xml><?xml version="1.0" encoding="utf-8"?>
+<cs:chartStyle xmlns:cs="http://schemas.microsoft.com/office/drawing/2012/chartStyle" xmlns:a="http://schemas.openxmlformats.org/drawingml/2006/main" id="297">
+  <cs:axisTitle>
+    <cs:lnRef idx="0"/>
+    <cs:fillRef idx="0"/>
+    <cs:effectRef idx="0"/>
+    <cs:fontRef idx="minor">
+      <a:schemeClr val="tx1">
+        <a:lumMod val="65000"/>
+        <a:lumOff val="35000"/>
+      </a:schemeClr>
+    </cs:fontRef>
+    <cs:defRPr sz="1330" kern="1200"/>
+  </cs:axisTitle>
+  <cs:categoryAxis>
+    <cs:lnRef idx="0"/>
+    <cs:fillRef idx="0"/>
+    <cs:effectRef idx="0"/>
+    <cs:fontRef idx="minor">
+      <a:schemeClr val="tx1">
+        <a:lumMod val="65000"/>
+        <a:lumOff val="35000"/>
+      </a:schemeClr>
+    </cs:fontRef>
+    <cs:spPr>
+      <a:ln w="9525" cap="flat" cmpd="sng" algn="ctr">
+        <a:solidFill>
+          <a:schemeClr val="tx1">
+            <a:lumMod val="15000"/>
+            <a:lumOff val="85000"/>
+          </a:schemeClr>
+        </a:solidFill>
+        <a:round/>
+      </a:ln>
+    </cs:spPr>
+    <cs:defRPr sz="1197" kern="1200"/>
+  </cs:categoryAxis>
+  <cs:chartArea mods="allowNoFillOverride allowNoLineOverride">
+    <cs:lnRef idx="0"/>
+    <cs:fillRef idx="0"/>
+    <cs:effectRef idx="0"/>
+    <cs:fontRef idx="minor">
+      <a:schemeClr val="tx1"/>
+    </cs:fontRef>
+    <cs:spPr>
+      <a:solidFill>
+        <a:schemeClr val="bg1"/>
+      </a:solidFill>
+      <a:ln w="9525" cap="flat" cmpd="sng" algn="ctr">
+        <a:solidFill>
+          <a:schemeClr val="tx1">
+            <a:lumMod val="15000"/>
+            <a:lumOff val="85000"/>
+          </a:schemeClr>
+        </a:solidFill>
+        <a:round/>
+      </a:ln>
+    </cs:spPr>
+    <cs:defRPr sz="1330" kern="1200"/>
+  </cs:chartArea>
+  <cs:dataLabel>
+    <cs:lnRef idx="0"/>
+    <cs:fillRef idx="0"/>
+    <cs:effectRef idx="0"/>
+    <cs:fontRef idx="minor">
+      <a:schemeClr val="tx1">
+        <a:lumMod val="75000"/>
+        <a:lumOff val="25000"/>
+      </a:schemeClr>
+    </cs:fontRef>
+    <cs:defRPr sz="1197" kern="1200"/>
+  </cs:dataLabel>
+  <cs:dataLabelCallout>
+    <cs:lnRef idx="0"/>
+    <cs:fillRef idx="0"/>
+    <cs:effectRef idx="0"/>
+    <cs:fontRef idx="minor">
+      <a:schemeClr val="dk1">
+        <a:lumMod val="65000"/>
+        <a:lumOff val="35000"/>
+      </a:schemeClr>
+    </cs:fontRef>
+    <cs:spPr>
+      <a:solidFill>
+        <a:schemeClr val="lt1"/>
+      </a:solidFill>
+      <a:ln>
+        <a:solidFill>
+          <a:schemeClr val="dk1">
+            <a:lumMod val="25000"/>
+            <a:lumOff val="75000"/>
+          </a:schemeClr>
+        </a:solidFill>
+      </a:ln>
+    </cs:spPr>
+    <cs:defRPr sz="1197" kern="1200"/>
+    <cs:bodyPr rot="0" spcFirstLastPara="1" vertOverflow="clip" horzOverflow="clip" vert="horz" wrap="square" lIns="36576" tIns="18288" rIns="36576" bIns="18288" anchor="ctr" anchorCtr="1">
+      <a:spAutoFit/>
+    </cs:bodyPr>
+  </cs:dataLabelCallout>
+  <cs:dataPoint>
+    <cs:lnRef idx="0"/>
+    <cs:fillRef idx="1">
+      <cs:styleClr val="auto"/>
+    </cs:fillRef>
+    <cs:effectRef idx="0"/>
+    <cs:fontRef idx="minor">
+      <a:schemeClr val="tx1"/>
+    </cs:fontRef>
+  </cs:dataPoint>
+  <cs:dataPoint3D>
+    <cs:lnRef idx="0"/>
+    <cs:fillRef idx="1">
+      <cs:styleClr val="auto"/>
+    </cs:fillRef>
+    <cs:effectRef idx="0"/>
+    <cs:fontRef idx="minor">
+      <a:schemeClr val="tx1"/>
+    </cs:fontRef>
+  </cs:dataPoint3D>
+  <cs:dataPointLine>
+    <cs:lnRef idx="0">
+      <cs:styleClr val="auto"/>
+    </cs:lnRef>
+    <cs:fillRef idx="1"/>
+    <cs:effectRef idx="0"/>
+    <cs:fontRef idx="minor">
+      <a:schemeClr val="tx1"/>
+    </cs:fontRef>
+    <cs:spPr>
+      <a:ln w="28575" cap="rnd">
+        <a:solidFill>
+          <a:schemeClr val="phClr"/>
+        </a:solidFill>
+        <a:round/>
+      </a:ln>
+    </cs:spPr>
+  </cs:dataPointLine>
+  <cs:dataPointMarker>
+    <cs:lnRef idx="0">
+      <cs:styleClr val="auto"/>
+    </cs:lnRef>
+    <cs:fillRef idx="1">
+      <cs:styleClr val="auto"/>
+    </cs:fillRef>
+    <cs:effectRef idx="0"/>
+    <cs:fontRef idx="minor">
+      <a:schemeClr val="tx1"/>
+    </cs:fontRef>
+    <cs:spPr>
+      <a:ln w="9525">
+        <a:solidFill>
+          <a:schemeClr val="phClr"/>
+        </a:solidFill>
+      </a:ln>
+    </cs:spPr>
+  </cs:dataPointMarker>
+  <cs:dataPointMarkerLayout symbol="circle" size="5"/>
+  <cs:dataPointWireframe>
+    <cs:lnRef idx="0">
+      <cs:styleClr val="auto"/>
+    </cs:lnRef>
+    <cs:fillRef idx="1"/>
+    <cs:effectRef idx="0"/>
+    <cs:fontRef idx="minor">
+      <a:schemeClr val="tx1"/>
+    </cs:fontRef>
+    <cs:spPr>
+      <a:ln w="9525" cap="rnd">
+        <a:solidFill>
+          <a:schemeClr val="phClr"/>
+        </a:solidFill>
+        <a:round/>
+      </a:ln>
+    </cs:spPr>
+  </cs:dataPointWireframe>
+  <cs:dataTable>
+    <cs:lnRef idx="0"/>
+    <cs:fillRef idx="0"/>
+    <cs:effectRef idx="0"/>
+    <cs:fontRef idx="minor">
+      <a:schemeClr val="tx1">
+        <a:lumMod val="65000"/>
+        <a:lumOff val="35000"/>
+      </a:schemeClr>
+    </cs:fontRef>
+    <cs:spPr>
+      <a:noFill/>
+      <a:ln w="9525" cap="flat" cmpd="sng" algn="ctr">
+        <a:solidFill>
+          <a:schemeClr val="tx1">
+            <a:lumMod val="15000"/>
+            <a:lumOff val="85000"/>
+          </a:schemeClr>
+        </a:solidFill>
+        <a:round/>
+      </a:ln>
+    </cs:spPr>
+    <cs:defRPr sz="1197" kern="1200"/>
+  </cs:dataTable>
+  <cs:downBar>
+    <cs:lnRef idx="0"/>
+    <cs:fillRef idx="0"/>
+    <cs:effectRef idx="0"/>
+    <cs:fontRef idx="minor">
+      <a:schemeClr val="tx1"/>
+    </cs:fontRef>
+    <cs:spPr>
+      <a:solidFill>
+        <a:schemeClr val="dk1">
+          <a:lumMod val="75000"/>
+          <a:lumOff val="25000"/>
+        </a:schemeClr>
+      </a:solidFill>
+      <a:ln w="9525" cap="flat" cmpd="sng" algn="ctr">
+        <a:solidFill>
+          <a:schemeClr val="tx1">
+            <a:lumMod val="65000"/>
+            <a:lumOff val="35000"/>
+          </a:schemeClr>
+        </a:solidFill>
+        <a:round/>
+      </a:ln>
+    </cs:spPr>
+  </cs:downBar>
+  <cs:dropLine>
+    <cs:lnRef idx="0"/>
+    <cs:fillRef idx="0"/>
+    <cs:effectRef idx="0"/>
+    <cs:fontRef idx="minor">
+      <a:schemeClr val="tx1"/>
+    </cs:fontRef>
+    <cs:spPr>
+      <a:ln w="9525" cap="flat" cmpd="sng" algn="ctr">
+        <a:solidFill>
+          <a:schemeClr val="tx1">
+            <a:lumMod val="35000"/>
+            <a:lumOff val="65000"/>
+          </a:schemeClr>
+        </a:solidFill>
+        <a:round/>
+      </a:ln>
+    </cs:spPr>
+  </cs:dropLine>
+  <cs:errorBar>
+    <cs:lnRef idx="0"/>
+    <cs:fillRef idx="0"/>
+    <cs:effectRef idx="0"/>
+    <cs:fontRef idx="minor">
+      <a:schemeClr val="tx1"/>
+    </cs:fontRef>
+    <cs:spPr>
+      <a:ln w="9525" cap="flat" cmpd="sng" algn="ctr">
+        <a:solidFill>
+          <a:schemeClr val="tx1">
+            <a:lumMod val="65000"/>
+            <a:lumOff val="35000"/>
+          </a:schemeClr>
+        </a:solidFill>
+        <a:round/>
+      </a:ln>
+    </cs:spPr>
+  </cs:errorBar>
+  <cs:floor>
+    <cs:lnRef idx="0"/>
+    <cs:fillRef idx="0"/>
+    <cs:effectRef idx="0"/>
+    <cs:fontRef idx="minor">
+      <a:schemeClr val="tx1"/>
+    </cs:fontRef>
+    <cs:spPr>
+      <a:noFill/>
+      <a:ln>
+        <a:noFill/>
+      </a:ln>
+    </cs:spPr>
+  </cs:floor>
+  <cs:gridlineMajor>
+    <cs:lnRef idx="0"/>
+    <cs:fillRef idx="0"/>
+    <cs:effectRef idx="0"/>
+    <cs:fontRef idx="minor">
+      <a:schemeClr val="tx1"/>
+    </cs:fontRef>
+    <cs:spPr>
+      <a:ln w="9525" cap="flat" cmpd="sng" algn="ctr">
+        <a:solidFill>
+          <a:schemeClr val="tx1">
+            <a:lumMod val="15000"/>
+            <a:lumOff val="85000"/>
+          </a:schemeClr>
+        </a:solidFill>
+        <a:round/>
+      </a:ln>
+    </cs:spPr>
+  </cs:gridlineMajor>
+  <cs:gridlineMinor>
+    <cs:lnRef idx="0"/>
+    <cs:fillRef idx="0"/>
+    <cs:effectRef idx="0"/>
+    <cs:fontRef idx="minor">
+      <a:schemeClr val="tx1"/>
+    </cs:fontRef>
+    <cs:spPr>
+      <a:ln w="9525" cap="flat" cmpd="sng" algn="ctr">
+        <a:solidFill>
+          <a:schemeClr val="tx1">
+            <a:lumMod val="5000"/>
+            <a:lumOff val="95000"/>
+          </a:schemeClr>
+        </a:solidFill>
+        <a:round/>
+      </a:ln>
+    </cs:spPr>
+  </cs:gridlineMinor>
+  <cs:hiLoLine>
+    <cs:lnRef idx="0"/>
+    <cs:fillRef idx="0"/>
+    <cs:effectRef idx="0"/>
+    <cs:fontRef idx="minor">
+      <a:schemeClr val="tx1"/>
+    </cs:fontRef>
+    <cs:spPr>
+      <a:ln w="9525" cap="flat" cmpd="sng" algn="ctr">
+        <a:solidFill>
+          <a:schemeClr val="tx1">
+            <a:lumMod val="50000"/>
+            <a:lumOff val="50000"/>
+          </a:schemeClr>
+        </a:solidFill>
+        <a:round/>
+      </a:ln>
+    </cs:spPr>
+  </cs:hiLoLine>
+  <cs:leaderLine>
+    <cs:lnRef idx="0"/>
+    <cs:fillRef idx="0"/>
+    <cs:effectRef idx="0"/>
+    <cs:fontRef idx="minor">
+      <a:schemeClr val="tx1"/>
+    </cs:fontRef>
+    <cs:spPr>
+      <a:ln w="9525" cap="flat" cmpd="sng" algn="ctr">
+        <a:solidFill>
+          <a:schemeClr val="tx1">
+            <a:lumMod val="35000"/>
+            <a:lumOff val="65000"/>
+          </a:schemeClr>
+        </a:solidFill>
+        <a:round/>
+      </a:ln>
+    </cs:spPr>
+  </cs:leaderLine>
+  <cs:legend>
+    <cs:lnRef idx="0"/>
+    <cs:fillRef idx="0"/>
+    <cs:effectRef idx="0"/>
+    <cs:fontRef idx="minor">
+      <a:schemeClr val="tx1">
+        <a:lumMod val="65000"/>
+        <a:lumOff val="35000"/>
+      </a:schemeClr>
+    </cs:fontRef>
+    <cs:defRPr sz="1197" kern="1200"/>
+  </cs:legend>
+  <cs:plotArea mods="allowNoFillOverride allowNoLineOverride">
+    <cs:lnRef idx="0"/>
+    <cs:fillRef idx="0"/>
+    <cs:effectRef idx="0"/>
+    <cs:fontRef idx="minor">
+      <a:schemeClr val="tx1"/>
+    </cs:fontRef>
+  </cs:plotArea>
+  <cs:plotArea3D mods="allowNoFillOverride allowNoLineOverride">
+    <cs:lnRef idx="0"/>
+    <cs:fillRef idx="0"/>
+    <cs:effectRef idx="0"/>
+    <cs:fontRef idx="minor">
+      <a:schemeClr val="tx1"/>
+    </cs:fontRef>
+  </cs:plotArea3D>
+  <cs:seriesAxis>
+    <cs:lnRef idx="0"/>
+    <cs:fillRef idx="0"/>
+    <cs:effectRef idx="0"/>
+    <cs:fontRef idx="minor">
+      <a:schemeClr val="tx1">
+        <a:lumMod val="65000"/>
+        <a:lumOff val="35000"/>
+      </a:schemeClr>
+    </cs:fontRef>
+    <cs:defRPr sz="1197" kern="1200"/>
+  </cs:seriesAxis>
+  <cs:seriesLine>
+    <cs:lnRef idx="0"/>
+    <cs:fillRef idx="0"/>
+    <cs:effectRef idx="0"/>
+    <cs:fontRef idx="minor">
+      <a:schemeClr val="tx1"/>
+    </cs:fontRef>
+    <cs:spPr>
+      <a:ln w="9525" cap="flat" cmpd="sng" algn="ctr">
+        <a:solidFill>
+          <a:schemeClr val="tx1">
+            <a:lumMod val="35000"/>
+            <a:lumOff val="65000"/>
+          </a:schemeClr>
+        </a:solidFill>
+        <a:round/>
+      </a:ln>
+    </cs:spPr>
+  </cs:seriesLine>
+  <cs:title>
+    <cs:lnRef idx="0"/>
+    <cs:fillRef idx="0"/>
+    <cs:effectRef idx="0"/>
+    <cs:fontRef idx="minor">
+      <a:schemeClr val="tx1">
+        <a:lumMod val="65000"/>
+        <a:lumOff val="35000"/>
+      </a:schemeClr>
+    </cs:fontRef>
+    <cs:defRPr sz="1862" b="0" kern="1200" spc="0" baseline="0"/>
+  </cs:title>
+  <cs:trendline>
+    <cs:lnRef idx="0">
+      <cs:styleClr val="auto"/>
+    </cs:lnRef>
+    <cs:fillRef idx="0"/>
+    <cs:effectRef idx="0"/>
+    <cs:fontRef idx="minor">
+      <a:schemeClr val="tx1"/>
+    </cs:fontRef>
+    <cs:spPr>
+      <a:ln w="19050" cap="rnd">
+        <a:solidFill>
+          <a:schemeClr val="phClr"/>
+        </a:solidFill>
+        <a:prstDash val="sysDot"/>
+      </a:ln>
+    </cs:spPr>
+  </cs:trendline>
+  <cs:trendlineLabel>
+    <cs:lnRef idx="0"/>
+    <cs:fillRef idx="0"/>
+    <cs:effectRef idx="0"/>
+    <cs:fontRef idx="minor">
+      <a:schemeClr val="tx1">
+        <a:lumMod val="65000"/>
+        <a:lumOff val="35000"/>
+      </a:schemeClr>
+    </cs:fontRef>
+    <cs:defRPr sz="1197" kern="1200"/>
+  </cs:trendlineLabel>
+  <cs:upBar>
+    <cs:lnRef idx="0"/>
+    <cs:fillRef idx="0"/>
+    <cs:effectRef idx="0"/>
+    <cs:fontRef idx="minor">
+      <a:schemeClr val="tx1"/>
+    </cs:fontRef>
+    <cs:spPr>
+      <a:solidFill>
+        <a:schemeClr val="lt1"/>
+      </a:solidFill>
+      <a:ln w="9525" cap="flat" cmpd="sng" algn="ctr">
+        <a:solidFill>
+          <a:schemeClr val="tx1">
+            <a:lumMod val="65000"/>
+            <a:lumOff val="35000"/>
+          </a:schemeClr>
+        </a:solidFill>
+        <a:round/>
+      </a:ln>
+    </cs:spPr>
+  </cs:upBar>
+  <cs:valueAxis>
+    <cs:lnRef idx="0"/>
+    <cs:fillRef idx="0"/>
+    <cs:effectRef idx="0"/>
+    <cs:fontRef idx="minor">
+      <a:schemeClr val="tx1">
+        <a:lumMod val="65000"/>
+        <a:lumOff val="35000"/>
+      </a:schemeClr>
+    </cs:fontRef>
+    <cs:defRPr sz="1197" kern="1200"/>
+  </cs:valueAxis>
+  <cs:wall>
+    <cs:lnRef idx="0"/>
+    <cs:fillRef idx="0"/>
+    <cs:effectRef idx="0"/>
+    <cs:fontRef idx="minor">
+      <a:schemeClr val="tx1"/>
+    </cs:fontRef>
+    <cs:spPr>
+      <a:noFill/>
+      <a:ln>
+        <a:noFill/>
+      </a:ln>
+    </cs:spPr>
+  </cs:wall>
+</cs:chartStyle>
+</file>
+
+<file path=ppt/notesMasters/notesMaster1.xml><?xml version="1.0" encoding="utf-8"?>
+<p:notesMaster xmlns:a="http://schemas.openxmlformats.org/drawingml/2006/main" xmlns:r="http://schemas.openxmlformats.org/officeDocument/2006/relationships" xmlns:p="http://schemas.openxmlformats.org/presentationml/2006/main">
+  <p:cSld>
+    <p:bg>
+      <p:bgRef idx="1001">
+        <a:schemeClr val="bg1"/>
+      </p:bgRef>
+    </p:bg>
+    <p:spTree>
+      <p:nvGrpSpPr>
+        <p:cNvPr id="1" name=""/>
+        <p:cNvGrpSpPr/>
+        <p:nvPr/>
+      </p:nvGrpSpPr>
+      <p:grpSpPr>
+        <a:xfrm>
+          <a:off x="0" y="0"/>
+          <a:ext cx="0" cy="0"/>
+          <a:chOff x="0" y="0"/>
+          <a:chExt cx="0" cy="0"/>
+        </a:xfrm>
+      </p:grpSpPr>
+      <p:sp>
+        <p:nvSpPr>
+          <p:cNvPr id="2" name="Header Placeholder 1"/>
+          <p:cNvSpPr>
+            <a:spLocks noGrp="1"/>
+          </p:cNvSpPr>
+          <p:nvPr>
+            <p:ph type="hdr" sz="quarter"/>
+          </p:nvPr>
+        </p:nvSpPr>
+        <p:spPr>
+          <a:xfrm>
+            <a:off x="0" y="0"/>
+            <a:ext cx="2971800" cy="458788"/>
+          </a:xfrm>
+          <a:prstGeom prst="rect">
+            <a:avLst/>
+          </a:prstGeom>
+        </p:spPr>
+        <p:txBody>
+          <a:bodyPr vert="horz" lIns="91440" tIns="45720" rIns="91440" bIns="45720" rtlCol="0"/>
+          <a:lstStyle>
+            <a:lvl1pPr algn="l">
+              <a:defRPr sz="1200"/>
+            </a:lvl1pPr>
+          </a:lstStyle>
+          <a:p>
+            <a:endParaRPr lang="en-GB"/>
+          </a:p>
+        </p:txBody>
+      </p:sp>
+      <p:sp>
+        <p:nvSpPr>
+          <p:cNvPr id="3" name="Date Placeholder 2"/>
+          <p:cNvSpPr>
+            <a:spLocks noGrp="1"/>
+          </p:cNvSpPr>
+          <p:nvPr>
+            <p:ph type="dt" idx="1"/>
+          </p:nvPr>
+        </p:nvSpPr>
+        <p:spPr>
+          <a:xfrm>
+            <a:off x="3884613" y="0"/>
+            <a:ext cx="2971800" cy="458788"/>
+          </a:xfrm>
+          <a:prstGeom prst="rect">
+            <a:avLst/>
+          </a:prstGeom>
+        </p:spPr>
+        <p:txBody>
+          <a:bodyPr vert="horz" lIns="91440" tIns="45720" rIns="91440" bIns="45720" rtlCol="0"/>
+          <a:lstStyle>
+            <a:lvl1pPr algn="r">
+              <a:defRPr sz="1200"/>
+            </a:lvl1pPr>
+          </a:lstStyle>
+          <a:p>
+            <a:fld id="{F8F4EB22-DBE9-4F8D-BC2E-B51AD4020E31}" type="datetimeFigureOut">
+              <a:rPr lang="en-GB" smtClean="0"/>
+              <a:t>19/11/2019</a:t>
+            </a:fld>
+            <a:endParaRPr lang="en-GB"/>
+          </a:p>
+        </p:txBody>
+      </p:sp>
+      <p:sp>
+        <p:nvSpPr>
+          <p:cNvPr id="4" name="Slide Image Placeholder 3"/>
+          <p:cNvSpPr>
+            <a:spLocks noGrp="1" noRot="1" noChangeAspect="1"/>
+          </p:cNvSpPr>
+          <p:nvPr>
+            <p:ph type="sldImg" idx="2"/>
+          </p:nvPr>
+        </p:nvSpPr>
+        <p:spPr>
+          <a:xfrm>
+            <a:off x="685800" y="1143000"/>
+            <a:ext cx="5486400" cy="3086100"/>
+          </a:xfrm>
+          <a:prstGeom prst="rect">
+            <a:avLst/>
+          </a:prstGeom>
+          <a:noFill/>
+          <a:ln w="12700">
+            <a:solidFill>
+              <a:prstClr val="black"/>
+            </a:solidFill>
+          </a:ln>
+        </p:spPr>
+        <p:txBody>
+          <a:bodyPr vert="horz" lIns="91440" tIns="45720" rIns="91440" bIns="45720" rtlCol="0" anchor="ctr"/>
+          <a:lstStyle/>
+          <a:p>
+            <a:endParaRPr lang="en-GB"/>
+          </a:p>
+        </p:txBody>
+      </p:sp>
+      <p:sp>
+        <p:nvSpPr>
+          <p:cNvPr id="5" name="Notes Placeholder 4"/>
+          <p:cNvSpPr>
+            <a:spLocks noGrp="1"/>
+          </p:cNvSpPr>
+          <p:nvPr>
+            <p:ph type="body" sz="quarter" idx="3"/>
+          </p:nvPr>
+        </p:nvSpPr>
+        <p:spPr>
+          <a:xfrm>
+            <a:off x="685800" y="4400550"/>
+            <a:ext cx="5486400" cy="3600450"/>
+          </a:xfrm>
+          <a:prstGeom prst="rect">
+            <a:avLst/>
+          </a:prstGeom>
+        </p:spPr>
+        <p:txBody>
+          <a:bodyPr vert="horz" lIns="91440" tIns="45720" rIns="91440" bIns="45720" rtlCol="0"/>
+          <a:lstStyle/>
+          <a:p>
+            <a:pPr lvl="0"/>
+            <a:r>
+              <a:rPr lang="en-US"/>
+              <a:t>Click to edit Master text styles</a:t>
+            </a:r>
+          </a:p>
+          <a:p>
+            <a:pPr lvl="1"/>
+            <a:r>
+              <a:rPr lang="en-US"/>
+              <a:t>Second level</a:t>
+            </a:r>
+          </a:p>
+          <a:p>
+            <a:pPr lvl="2"/>
+            <a:r>
+              <a:rPr lang="en-US"/>
+              <a:t>Third level</a:t>
+            </a:r>
+          </a:p>
+          <a:p>
+            <a:pPr lvl="3"/>
+            <a:r>
+              <a:rPr lang="en-US"/>
+              <a:t>Fourth level</a:t>
+            </a:r>
+          </a:p>
+          <a:p>
+            <a:pPr lvl="4"/>
+            <a:r>
+              <a:rPr lang="en-US"/>
+              <a:t>Fifth level</a:t>
+            </a:r>
+            <a:endParaRPr lang="en-GB"/>
+          </a:p>
+        </p:txBody>
+      </p:sp>
+      <p:sp>
+        <p:nvSpPr>
+          <p:cNvPr id="6" name="Footer Placeholder 5"/>
+          <p:cNvSpPr>
+            <a:spLocks noGrp="1"/>
+          </p:cNvSpPr>
+          <p:nvPr>
+            <p:ph type="ftr" sz="quarter" idx="4"/>
+          </p:nvPr>
+        </p:nvSpPr>
+        <p:spPr>
+          <a:xfrm>
+            <a:off x="0" y="8685213"/>
+            <a:ext cx="2971800" cy="458787"/>
+          </a:xfrm>
+          <a:prstGeom prst="rect">
+            <a:avLst/>
+          </a:prstGeom>
+        </p:spPr>
+        <p:txBody>
+          <a:bodyPr vert="horz" lIns="91440" tIns="45720" rIns="91440" bIns="45720" rtlCol="0" anchor="b"/>
+          <a:lstStyle>
+            <a:lvl1pPr algn="l">
+              <a:defRPr sz="1200"/>
+            </a:lvl1pPr>
+          </a:lstStyle>
+          <a:p>
+            <a:endParaRPr lang="en-GB"/>
+          </a:p>
+        </p:txBody>
+      </p:sp>
+      <p:sp>
+        <p:nvSpPr>
+          <p:cNvPr id="7" name="Slide Number Placeholder 6"/>
+          <p:cNvSpPr>
+            <a:spLocks noGrp="1"/>
+          </p:cNvSpPr>
+          <p:nvPr>
+            <p:ph type="sldNum" sz="quarter" idx="5"/>
+          </p:nvPr>
+        </p:nvSpPr>
+        <p:spPr>
+          <a:xfrm>
+            <a:off x="3884613" y="8685213"/>
+            <a:ext cx="2971800" cy="458787"/>
+          </a:xfrm>
+          <a:prstGeom prst="rect">
+            <a:avLst/>
+          </a:prstGeom>
+        </p:spPr>
+        <p:txBody>
+          <a:bodyPr vert="horz" lIns="91440" tIns="45720" rIns="91440" bIns="45720" rtlCol="0" anchor="b"/>
+          <a:lstStyle>
+            <a:lvl1pPr algn="r">
+              <a:defRPr sz="1200"/>
+            </a:lvl1pPr>
+          </a:lstStyle>
+          <a:p>
+            <a:fld id="{6607D24C-5C33-42AC-950C-059C52677011}" type="slidenum">
+              <a:rPr lang="en-GB" smtClean="0"/>
+              <a:t>‹#›</a:t>
+            </a:fld>
+            <a:endParaRPr lang="en-GB"/>
+          </a:p>
+        </p:txBody>
+      </p:sp>
+    </p:spTree>
+    <p:extLst>
+      <p:ext uri="{BB962C8B-B14F-4D97-AF65-F5344CB8AC3E}">
+        <p14:creationId xmlns:p14="http://schemas.microsoft.com/office/powerpoint/2010/main" val="1684788101"/>
+      </p:ext>
+    </p:extLst>
+  </p:cSld>
+  <p:clrMap bg1="lt1" tx1="dk1" bg2="lt2" tx2="dk2" accent1="accent1" accent2="accent2" accent3="accent3" accent4="accent4" accent5="accent5" accent6="accent6" hlink="hlink" folHlink="folHlink"/>
+  <p:notesStyle>
+    <a:lvl1pPr marL="0" algn="l" defTabSz="914400" rtl="0" eaLnBrk="1" latinLnBrk="0" hangingPunct="1">
+      <a:defRPr sz="1200" kern="1200">
+        <a:solidFill>
+          <a:schemeClr val="tx1"/>
+        </a:solidFill>
+        <a:latin typeface="+mn-lt"/>
+        <a:ea typeface="+mn-ea"/>
+        <a:cs typeface="+mn-cs"/>
+      </a:defRPr>
+    </a:lvl1pPr>
+    <a:lvl2pPr marL="457200" algn="l" defTabSz="914400" rtl="0" eaLnBrk="1" latinLnBrk="0" hangingPunct="1">
+      <a:defRPr sz="1200" kern="1200">
+        <a:solidFill>
+          <a:schemeClr val="tx1"/>
+        </a:solidFill>
+        <a:latin typeface="+mn-lt"/>
+        <a:ea typeface="+mn-ea"/>
+        <a:cs typeface="+mn-cs"/>
+      </a:defRPr>
+    </a:lvl2pPr>
+    <a:lvl3pPr marL="914400" algn="l" defTabSz="914400" rtl="0" eaLnBrk="1" latinLnBrk="0" hangingPunct="1">
+      <a:defRPr sz="1200" kern="1200">
+        <a:solidFill>
+          <a:schemeClr val="tx1"/>
+        </a:solidFill>
+        <a:latin typeface="+mn-lt"/>
+        <a:ea typeface="+mn-ea"/>
+        <a:cs typeface="+mn-cs"/>
+      </a:defRPr>
+    </a:lvl3pPr>
+    <a:lvl4pPr marL="1371600" algn="l" defTabSz="914400" rtl="0" eaLnBrk="1" latinLnBrk="0" hangingPunct="1">
+      <a:defRPr sz="1200" kern="1200">
+        <a:solidFill>
+          <a:schemeClr val="tx1"/>
+        </a:solidFill>
+        <a:latin typeface="+mn-lt"/>
+        <a:ea typeface="+mn-ea"/>
+        <a:cs typeface="+mn-cs"/>
+      </a:defRPr>
+    </a:lvl4pPr>
+    <a:lvl5pPr marL="1828800" algn="l" defTabSz="914400" rtl="0" eaLnBrk="1" latinLnBrk="0" hangingPunct="1">
+      <a:defRPr sz="1200" kern="1200">
+        <a:solidFill>
+          <a:schemeClr val="tx1"/>
+        </a:solidFill>
+        <a:latin typeface="+mn-lt"/>
+        <a:ea typeface="+mn-ea"/>
+        <a:cs typeface="+mn-cs"/>
+      </a:defRPr>
+    </a:lvl5pPr>
+    <a:lvl6pPr marL="2286000" algn="l" defTabSz="914400" rtl="0" eaLnBrk="1" latinLnBrk="0" hangingPunct="1">
+      <a:defRPr sz="1200" kern="1200">
+        <a:solidFill>
+          <a:schemeClr val="tx1"/>
+        </a:solidFill>
+        <a:latin typeface="+mn-lt"/>
+        <a:ea typeface="+mn-ea"/>
+        <a:cs typeface="+mn-cs"/>
+      </a:defRPr>
+    </a:lvl6pPr>
+    <a:lvl7pPr marL="2743200" algn="l" defTabSz="914400" rtl="0" eaLnBrk="1" latinLnBrk="0" hangingPunct="1">
+      <a:defRPr sz="1200" kern="1200">
+        <a:solidFill>
+          <a:schemeClr val="tx1"/>
+        </a:solidFill>
+        <a:latin typeface="+mn-lt"/>
+        <a:ea typeface="+mn-ea"/>
+        <a:cs typeface="+mn-cs"/>
+      </a:defRPr>
+    </a:lvl7pPr>
+    <a:lvl8pPr marL="3200400" algn="l" defTabSz="914400" rtl="0" eaLnBrk="1" latinLnBrk="0" hangingPunct="1">
+      <a:defRPr sz="1200" kern="1200">
+        <a:solidFill>
+          <a:schemeClr val="tx1"/>
+        </a:solidFill>
+        <a:latin typeface="+mn-lt"/>
+        <a:ea typeface="+mn-ea"/>
+        <a:cs typeface="+mn-cs"/>
+      </a:defRPr>
+    </a:lvl8pPr>
+    <a:lvl9pPr marL="3657600" algn="l" defTabSz="914400" rtl="0" eaLnBrk="1" latinLnBrk="0" hangingPunct="1">
+      <a:defRPr sz="1200" kern="1200">
+        <a:solidFill>
+          <a:schemeClr val="tx1"/>
+        </a:solidFill>
+        <a:latin typeface="+mn-lt"/>
+        <a:ea typeface="+mn-ea"/>
+        <a:cs typeface="+mn-cs"/>
+      </a:defRPr>
+    </a:lvl9pPr>
+  </p:notesStyle>
+</p:notesMaster>
+</file>
+
+<file path=ppt/notesSlides/notesSlide1.xml><?xml version="1.0" encoding="utf-8"?>
+<p:notes xmlns:a="http://schemas.openxmlformats.org/drawingml/2006/main" xmlns:r="http://schemas.openxmlformats.org/officeDocument/2006/relationships" xmlns:p="http://schemas.openxmlformats.org/presentationml/2006/main">
+  <p:cSld>
+    <p:spTree>
+      <p:nvGrpSpPr>
+        <p:cNvPr id="1" name=""/>
+        <p:cNvGrpSpPr/>
+        <p:nvPr/>
+      </p:nvGrpSpPr>
+      <p:grpSpPr>
+        <a:xfrm>
+          <a:off x="0" y="0"/>
+          <a:ext cx="0" cy="0"/>
+          <a:chOff x="0" y="0"/>
+          <a:chExt cx="0" cy="0"/>
+        </a:xfrm>
+      </p:grpSpPr>
+      <p:sp>
+        <p:nvSpPr>
+          <p:cNvPr id="2" name="Slide Image Placeholder 1"/>
+          <p:cNvSpPr>
+            <a:spLocks noGrp="1" noRot="1" noChangeAspect="1"/>
+          </p:cNvSpPr>
+          <p:nvPr>
+            <p:ph type="sldImg"/>
+          </p:nvPr>
+        </p:nvSpPr>
+        <p:spPr/>
+      </p:sp>
+      <p:sp>
+        <p:nvSpPr>
+          <p:cNvPr id="3" name="Notes Placeholder 2"/>
+          <p:cNvSpPr>
+            <a:spLocks noGrp="1"/>
+          </p:cNvSpPr>
+          <p:nvPr>
+            <p:ph type="body" idx="1"/>
+          </p:nvPr>
+        </p:nvSpPr>
+        <p:spPr/>
+        <p:txBody>
+          <a:bodyPr/>
+          <a:lstStyle/>
+          <a:p>
+            <a:endParaRPr lang="en-GB" dirty="0"/>
+          </a:p>
+        </p:txBody>
+      </p:sp>
+      <p:sp>
+        <p:nvSpPr>
+          <p:cNvPr id="4" name="Slide Number Placeholder 3"/>
+          <p:cNvSpPr>
+            <a:spLocks noGrp="1"/>
+          </p:cNvSpPr>
+          <p:nvPr>
+            <p:ph type="sldNum" sz="quarter" idx="5"/>
+          </p:nvPr>
+        </p:nvSpPr>
+        <p:spPr/>
+        <p:txBody>
+          <a:bodyPr/>
+          <a:lstStyle/>
+          <a:p>
+            <a:fld id="{6607D24C-5C33-42AC-950C-059C52677011}" type="slidenum">
+              <a:rPr lang="en-GB" smtClean="0"/>
+              <a:t>5</a:t>
+            </a:fld>
+            <a:endParaRPr lang="en-GB"/>
+          </a:p>
+        </p:txBody>
+      </p:sp>
+    </p:spTree>
+    <p:extLst>
+      <p:ext uri="{BB962C8B-B14F-4D97-AF65-F5344CB8AC3E}">
+        <p14:creationId xmlns:p14="http://schemas.microsoft.com/office/powerpoint/2010/main" val="1056559622"/>
+      </p:ext>
+    </p:extLst>
+  </p:cSld>
+  <p:clrMapOvr>
+    <a:masterClrMapping/>
+  </p:clrMapOvr>
+</p:notes>
+</file>
+
+<file path=ppt/notesSlides/notesSlide2.xml><?xml version="1.0" encoding="utf-8"?>
+<p:notes xmlns:a="http://schemas.openxmlformats.org/drawingml/2006/main" xmlns:r="http://schemas.openxmlformats.org/officeDocument/2006/relationships" xmlns:p="http://schemas.openxmlformats.org/presentationml/2006/main">
+  <p:cSld>
+    <p:spTree>
+      <p:nvGrpSpPr>
+        <p:cNvPr id="1" name=""/>
+        <p:cNvGrpSpPr/>
+        <p:nvPr/>
+      </p:nvGrpSpPr>
+      <p:grpSpPr>
+        <a:xfrm>
+          <a:off x="0" y="0"/>
+          <a:ext cx="0" cy="0"/>
+          <a:chOff x="0" y="0"/>
+          <a:chExt cx="0" cy="0"/>
+        </a:xfrm>
+      </p:grpSpPr>
+      <p:sp>
+        <p:nvSpPr>
+          <p:cNvPr id="2" name="Slide Image Placeholder 1"/>
+          <p:cNvSpPr>
+            <a:spLocks noGrp="1" noRot="1" noChangeAspect="1"/>
+          </p:cNvSpPr>
+          <p:nvPr>
+            <p:ph type="sldImg"/>
+          </p:nvPr>
+        </p:nvSpPr>
+        <p:spPr/>
+      </p:sp>
+      <p:sp>
+        <p:nvSpPr>
+          <p:cNvPr id="3" name="Notes Placeholder 2"/>
+          <p:cNvSpPr>
+            <a:spLocks noGrp="1"/>
+          </p:cNvSpPr>
+          <p:nvPr>
+            <p:ph type="body" idx="1"/>
+          </p:nvPr>
+        </p:nvSpPr>
+        <p:spPr/>
+        <p:txBody>
+          <a:bodyPr/>
+          <a:lstStyle/>
+          <a:p>
+            <a:endParaRPr lang="en-GB" dirty="0"/>
+          </a:p>
+        </p:txBody>
+      </p:sp>
+      <p:sp>
+        <p:nvSpPr>
+          <p:cNvPr id="4" name="Slide Number Placeholder 3"/>
+          <p:cNvSpPr>
+            <a:spLocks noGrp="1"/>
+          </p:cNvSpPr>
+          <p:nvPr>
+            <p:ph type="sldNum" sz="quarter" idx="5"/>
+          </p:nvPr>
+        </p:nvSpPr>
+        <p:spPr/>
+        <p:txBody>
+          <a:bodyPr/>
+          <a:lstStyle/>
+          <a:p>
+            <a:fld id="{6607D24C-5C33-42AC-950C-059C52677011}" type="slidenum">
+              <a:rPr lang="en-GB" smtClean="0"/>
+              <a:t>7</a:t>
+            </a:fld>
+            <a:endParaRPr lang="en-GB"/>
+          </a:p>
+        </p:txBody>
+      </p:sp>
+    </p:spTree>
+    <p:extLst>
+      <p:ext uri="{BB962C8B-B14F-4D97-AF65-F5344CB8AC3E}">
+        <p14:creationId xmlns:p14="http://schemas.microsoft.com/office/powerpoint/2010/main" val="3672053906"/>
+      </p:ext>
+    </p:extLst>
+  </p:cSld>
+  <p:clrMapOvr>
+    <a:masterClrMapping/>
+  </p:clrMapOvr>
+</p:notes>
+</file>
+
+<file path=ppt/notesSlides/notesSlide3.xml><?xml version="1.0" encoding="utf-8"?>
+<p:notes xmlns:a="http://schemas.openxmlformats.org/drawingml/2006/main" xmlns:r="http://schemas.openxmlformats.org/officeDocument/2006/relationships" xmlns:p="http://schemas.openxmlformats.org/presentationml/2006/main">
+  <p:cSld>
+    <p:spTree>
+      <p:nvGrpSpPr>
+        <p:cNvPr id="1" name=""/>
+        <p:cNvGrpSpPr/>
+        <p:nvPr/>
+      </p:nvGrpSpPr>
+      <p:grpSpPr>
+        <a:xfrm>
+          <a:off x="0" y="0"/>
+          <a:ext cx="0" cy="0"/>
+          <a:chOff x="0" y="0"/>
+          <a:chExt cx="0" cy="0"/>
+        </a:xfrm>
+      </p:grpSpPr>
+      <p:sp>
+        <p:nvSpPr>
+          <p:cNvPr id="2" name="Slide Image Placeholder 1"/>
+          <p:cNvSpPr>
+            <a:spLocks noGrp="1" noRot="1" noChangeAspect="1"/>
+          </p:cNvSpPr>
+          <p:nvPr>
+            <p:ph type="sldImg"/>
+          </p:nvPr>
+        </p:nvSpPr>
+        <p:spPr/>
+      </p:sp>
+      <p:sp>
+        <p:nvSpPr>
+          <p:cNvPr id="3" name="Notes Placeholder 2"/>
+          <p:cNvSpPr>
+            <a:spLocks noGrp="1"/>
+          </p:cNvSpPr>
+          <p:nvPr>
+            <p:ph type="body" idx="1"/>
+          </p:nvPr>
+        </p:nvSpPr>
+        <p:spPr/>
+        <p:txBody>
+          <a:bodyPr/>
+          <a:lstStyle/>
+          <a:p>
+            <a:endParaRPr lang="en-GB" dirty="0"/>
+          </a:p>
+        </p:txBody>
+      </p:sp>
+      <p:sp>
+        <p:nvSpPr>
+          <p:cNvPr id="4" name="Slide Number Placeholder 3"/>
+          <p:cNvSpPr>
+            <a:spLocks noGrp="1"/>
+          </p:cNvSpPr>
+          <p:nvPr>
+            <p:ph type="sldNum" sz="quarter" idx="5"/>
+          </p:nvPr>
+        </p:nvSpPr>
+        <p:spPr/>
+        <p:txBody>
+          <a:bodyPr/>
+          <a:lstStyle/>
+          <a:p>
+            <a:fld id="{6607D24C-5C33-42AC-950C-059C52677011}" type="slidenum">
+              <a:rPr lang="en-GB" smtClean="0"/>
+              <a:t>8</a:t>
+            </a:fld>
+            <a:endParaRPr lang="en-GB"/>
+          </a:p>
+        </p:txBody>
+      </p:sp>
+    </p:spTree>
+    <p:extLst>
+      <p:ext uri="{BB962C8B-B14F-4D97-AF65-F5344CB8AC3E}">
+        <p14:creationId xmlns:p14="http://schemas.microsoft.com/office/powerpoint/2010/main" val="3489882690"/>
+      </p:ext>
+    </p:extLst>
+  </p:cSld>
+  <p:clrMapOvr>
+    <a:masterClrMapping/>
+  </p:clrMapOvr>
+</p:notes>
 </file>
 
 <file path=ppt/slideLayouts/slideLayout1.xml><?xml version="1.0" encoding="utf-8"?>
@@ -1227,7 +3103,7 @@
           <a:p>
             <a:fld id="{88D38747-4367-4BD2-8D51-C97E202738E2}" type="datetime1">
               <a:rPr lang="en-US" smtClean="0"/>
-              <a:t>11/10/2019</a:t>
+              <a:t>11/19/2019</a:t>
             </a:fld>
             <a:endParaRPr lang="en-US" dirty="0"/>
           </a:p>
@@ -1526,7 +3402,7 @@
           <a:p>
             <a:fld id="{073ED0CC-082F-4160-86E5-0D6041F12778}" type="datetime1">
               <a:rPr lang="en-US" smtClean="0"/>
-              <a:t>11/10/2019</a:t>
+              <a:t>11/19/2019</a:t>
             </a:fld>
             <a:endParaRPr lang="en-US" dirty="0"/>
           </a:p>
@@ -1719,7 +3595,7 @@
           <a:p>
             <a:fld id="{073ED0CC-082F-4160-86E5-0D6041F12778}" type="datetime1">
               <a:rPr lang="en-US" smtClean="0"/>
-              <a:t>11/10/2019</a:t>
+              <a:t>11/19/2019</a:t>
             </a:fld>
             <a:endParaRPr lang="en-US" dirty="0"/>
           </a:p>
@@ -1981,7 +3857,7 @@
           <a:p>
             <a:fld id="{073ED0CC-082F-4160-86E5-0D6041F12778}" type="datetime1">
               <a:rPr lang="en-US" smtClean="0"/>
-              <a:t>11/10/2019</a:t>
+              <a:t>11/19/2019</a:t>
             </a:fld>
             <a:endParaRPr lang="en-US" dirty="0"/>
           </a:p>
@@ -2406,7 +4282,7 @@
           <a:p>
             <a:fld id="{073ED0CC-082F-4160-86E5-0D6041F12778}" type="datetime1">
               <a:rPr lang="en-US" smtClean="0"/>
-              <a:t>11/10/2019</a:t>
+              <a:t>11/19/2019</a:t>
             </a:fld>
             <a:endParaRPr lang="en-US" dirty="0"/>
           </a:p>
@@ -2944,7 +4820,7 @@
           <a:p>
             <a:fld id="{073ED0CC-082F-4160-86E5-0D6041F12778}" type="datetime1">
               <a:rPr lang="en-US" smtClean="0"/>
-              <a:t>11/10/2019</a:t>
+              <a:t>11/19/2019</a:t>
             </a:fld>
             <a:endParaRPr lang="en-US" dirty="0"/>
           </a:p>
@@ -3809,7 +5685,7 @@
           <a:p>
             <a:fld id="{073ED0CC-082F-4160-86E5-0D6041F12778}" type="datetime1">
               <a:rPr lang="en-US" smtClean="0"/>
-              <a:t>11/10/2019</a:t>
+              <a:t>11/19/2019</a:t>
             </a:fld>
             <a:endParaRPr lang="en-US" dirty="0"/>
           </a:p>
@@ -3980,7 +5856,7 @@
           <a:p>
             <a:fld id="{217E833E-1B6D-415F-AD29-75AE8C43BD0D}" type="datetime1">
               <a:rPr lang="en-US" smtClean="0"/>
-              <a:t>11/10/2019</a:t>
+              <a:t>11/19/2019</a:t>
             </a:fld>
             <a:endParaRPr lang="en-US" dirty="0"/>
           </a:p>
@@ -4164,7 +6040,7 @@
           <a:p>
             <a:fld id="{8452596F-08A7-4B70-989A-F2B1CF31E66B}" type="datetime1">
               <a:rPr lang="en-US" smtClean="0"/>
-              <a:t>11/10/2019</a:t>
+              <a:t>11/19/2019</a:t>
             </a:fld>
             <a:endParaRPr lang="en-US" dirty="0"/>
           </a:p>
@@ -4334,7 +6210,7 @@
           <a:p>
             <a:fld id="{73C55A3C-5767-4844-A0A3-83778C2E5409}" type="datetime1">
               <a:rPr lang="en-US" smtClean="0"/>
-              <a:t>11/10/2019</a:t>
+              <a:t>11/19/2019</a:t>
             </a:fld>
             <a:endParaRPr lang="en-US" dirty="0"/>
           </a:p>
@@ -4578,7 +6454,7 @@
           <a:p>
             <a:fld id="{CAE507A8-A5CF-4D38-AB86-7EDDA87A85D4}" type="datetime1">
               <a:rPr lang="en-US" smtClean="0"/>
-              <a:t>11/10/2019</a:t>
+              <a:t>11/19/2019</a:t>
             </a:fld>
             <a:endParaRPr lang="en-US" dirty="0"/>
           </a:p>
@@ -4815,7 +6691,7 @@
           <a:p>
             <a:fld id="{BDFCD27C-8599-43EF-BA1D-14DDC1946E06}" type="datetime1">
               <a:rPr lang="en-US" smtClean="0"/>
-              <a:t>11/10/2019</a:t>
+              <a:t>11/19/2019</a:t>
             </a:fld>
             <a:endParaRPr lang="en-US" dirty="0"/>
           </a:p>
@@ -5281,7 +7157,7 @@
           <a:p>
             <a:fld id="{49343D99-809A-49C0-96E5-4250D0B498EE}" type="datetime1">
               <a:rPr lang="en-US" smtClean="0"/>
-              <a:t>11/10/2019</a:t>
+              <a:t>11/19/2019</a:t>
             </a:fld>
             <a:endParaRPr lang="en-US" dirty="0"/>
           </a:p>
@@ -5399,7 +7275,7 @@
           <a:p>
             <a:fld id="{A143DE9B-B678-4EFB-BB7D-A4370204A0B0}" type="datetime1">
               <a:rPr lang="en-US" smtClean="0"/>
-              <a:t>11/10/2019</a:t>
+              <a:t>11/19/2019</a:t>
             </a:fld>
             <a:endParaRPr lang="en-US" dirty="0"/>
           </a:p>
@@ -5494,7 +7370,7 @@
           <a:p>
             <a:fld id="{E68812DA-F765-4142-A6A3-A8ED7235E082}" type="datetime1">
               <a:rPr lang="en-US" smtClean="0"/>
-              <a:t>11/10/2019</a:t>
+              <a:t>11/19/2019</a:t>
             </a:fld>
             <a:endParaRPr lang="en-US" dirty="0"/>
           </a:p>
@@ -5749,7 +7625,7 @@
           <a:p>
             <a:fld id="{3E0277FD-7DE6-41D4-930D-AC99F5AFE54E}" type="datetime1">
               <a:rPr lang="en-US" smtClean="0"/>
-              <a:t>11/10/2019</a:t>
+              <a:t>11/19/2019</a:t>
             </a:fld>
             <a:endParaRPr lang="en-US" dirty="0"/>
           </a:p>
@@ -6050,7 +7926,7 @@
           <a:p>
             <a:fld id="{9EA15526-7079-4B7B-987C-1B5FAE11A0FF}" type="datetime1">
               <a:rPr lang="en-US" smtClean="0"/>
-              <a:t>11/10/2019</a:t>
+              <a:t>11/19/2019</a:t>
             </a:fld>
             <a:endParaRPr lang="en-US" dirty="0"/>
           </a:p>
@@ -6285,7 +8161,7 @@
           <a:p>
             <a:fld id="{073ED0CC-082F-4160-86E5-0D6041F12778}" type="datetime1">
               <a:rPr lang="en-US" smtClean="0"/>
-              <a:t>11/10/2019</a:t>
+              <a:t>11/19/2019</a:t>
             </a:fld>
             <a:endParaRPr lang="en-US" dirty="0"/>
           </a:p>
@@ -7075,7 +8951,7 @@
             <a:pPr algn="l"/>
             <a:r>
               <a:rPr lang="en-GB" dirty="0"/>
-              <a:t>Introduction to the SEM</a:t>
+              <a:t>The Problem</a:t>
             </a:r>
           </a:p>
         </p:txBody>
@@ -7102,51 +8978,44 @@
           <a:lstStyle/>
           <a:p>
             <a:r>
-              <a:rPr lang="en-GB" dirty="0"/>
+              <a:rPr lang="en-GB" sz="2800" dirty="0"/>
               <a:t>The SEM takes images.</a:t>
             </a:r>
           </a:p>
           <a:p>
+            <a:r>
+              <a:rPr lang="en-GB" sz="2800" dirty="0"/>
+              <a:t>The images may have disturbances.</a:t>
+            </a:r>
+          </a:p>
+          <a:p>
+            <a:r>
+              <a:rPr lang="en-GB" sz="2800" dirty="0"/>
+              <a:t>The disturbances affect image quality.</a:t>
+            </a:r>
+          </a:p>
+          <a:p>
+            <a:r>
+              <a:rPr lang="en-GB" sz="2800" dirty="0"/>
+              <a:t>Human operators may find it difficult judging how good an image is.</a:t>
+            </a:r>
+          </a:p>
+          <a:p>
+            <a:r>
+              <a:rPr lang="en-GB" sz="2800" dirty="0"/>
+              <a:t>Human operators cannot always take satisfactory images.</a:t>
+            </a:r>
+            <a:endParaRPr lang="en-GB" sz="2800" dirty="0">
+              <a:solidFill>
+                <a:srgbClr val="FF0000"/>
+              </a:solidFill>
+            </a:endParaRPr>
+          </a:p>
+          <a:p>
             <a:endParaRPr lang="en-GB" dirty="0"/>
           </a:p>
         </p:txBody>
       </p:sp>
-      <p:pic>
-        <p:nvPicPr>
-          <p:cNvPr id="7" name="Picture 6" descr="A close up of a logo&#10;&#10;Description automatically generated">
-            <a:extLst>
-              <a:ext uri="{FF2B5EF4-FFF2-40B4-BE49-F238E27FC236}">
-                <a16:creationId xmlns:a16="http://schemas.microsoft.com/office/drawing/2014/main" id="{C5C5AAA1-499C-476A-A0C4-576A32457FE4}"/>
-              </a:ext>
-            </a:extLst>
-          </p:cNvPr>
-          <p:cNvPicPr>
-            <a:picLocks noChangeAspect="1"/>
-          </p:cNvPicPr>
-          <p:nvPr/>
-        </p:nvPicPr>
-        <p:blipFill>
-          <a:blip r:embed="rId2">
-            <a:extLst>
-              <a:ext uri="{28A0092B-C50C-407E-A947-70E740481C1C}">
-                <a14:useLocalDpi xmlns:a14="http://schemas.microsoft.com/office/drawing/2010/main" val="0"/>
-              </a:ext>
-            </a:extLst>
-          </a:blip>
-          <a:stretch>
-            <a:fillRect/>
-          </a:stretch>
-        </p:blipFill>
-        <p:spPr>
-          <a:xfrm>
-            <a:off x="6478205" y="1961824"/>
-            <a:ext cx="4800000" cy="3600000"/>
-          </a:xfrm>
-          <a:prstGeom prst="rect">
-            <a:avLst/>
-          </a:prstGeom>
-        </p:spPr>
-      </p:pic>
     </p:spTree>
     <p:extLst>
       <p:ext uri="{BB962C8B-B14F-4D97-AF65-F5344CB8AC3E}">
@@ -7201,25 +9070,60 @@
             <a:pPr algn="l"/>
             <a:r>
               <a:rPr lang="en-GB" dirty="0"/>
-              <a:t>Problems with the SEM</a:t>
-            </a:r>
-          </a:p>
-        </p:txBody>
-      </p:sp>
-      <p:sp>
-        <p:nvSpPr>
-          <p:cNvPr id="3" name="Content Placeholder 2">
+              <a:t>Sample Images</a:t>
+            </a:r>
+          </a:p>
+        </p:txBody>
+      </p:sp>
+      <p:pic>
+        <p:nvPicPr>
+          <p:cNvPr id="5" name="Content Placeholder 4" descr="A close up of a rock&#10;&#10;Description automatically generated">
             <a:extLst>
               <a:ext uri="{FF2B5EF4-FFF2-40B4-BE49-F238E27FC236}">
-                <a16:creationId xmlns:a16="http://schemas.microsoft.com/office/drawing/2014/main" id="{D1FA4906-954D-4D2C-8273-105E01F38BC3}"/>
+                <a16:creationId xmlns:a16="http://schemas.microsoft.com/office/drawing/2014/main" id="{8BA1FE8F-4EDD-45BD-B880-076F08542405}"/>
               </a:ext>
             </a:extLst>
           </p:cNvPr>
-          <p:cNvSpPr>
-            <a:spLocks noGrp="1"/>
-          </p:cNvSpPr>
+          <p:cNvPicPr>
+            <a:picLocks noGrp="1" noChangeAspect="1"/>
+          </p:cNvPicPr>
           <p:nvPr>
             <p:ph idx="1"/>
+          </p:nvPr>
+        </p:nvPicPr>
+        <p:blipFill>
+          <a:blip r:embed="rId2">
+            <a:extLst>
+              <a:ext uri="{28A0092B-C50C-407E-A947-70E740481C1C}">
+                <a14:useLocalDpi xmlns:a14="http://schemas.microsoft.com/office/drawing/2010/main" val="0"/>
+              </a:ext>
+            </a:extLst>
+          </a:blip>
+          <a:stretch>
+            <a:fillRect/>
+          </a:stretch>
+        </p:blipFill>
+        <p:spPr>
+          <a:xfrm>
+            <a:off x="914400" y="1953464"/>
+            <a:ext cx="10353675" cy="3616234"/>
+          </a:xfrm>
+        </p:spPr>
+      </p:pic>
+      <p:sp>
+        <p:nvSpPr>
+          <p:cNvPr id="6" name="Footer Placeholder 5">
+            <a:extLst>
+              <a:ext uri="{FF2B5EF4-FFF2-40B4-BE49-F238E27FC236}">
+                <a16:creationId xmlns:a16="http://schemas.microsoft.com/office/drawing/2014/main" id="{9FC4E08E-EA51-4D37-BE91-7C3668AAD708}"/>
+              </a:ext>
+            </a:extLst>
+          </p:cNvPr>
+          <p:cNvSpPr>
+            <a:spLocks noGrp="1"/>
+          </p:cNvSpPr>
+          <p:nvPr>
+            <p:ph type="ftr" sz="quarter" idx="11"/>
           </p:nvPr>
         </p:nvSpPr>
         <p:spPr/>
@@ -7228,9 +9132,14 @@
           <a:lstStyle/>
           <a:p>
             <a:r>
-              <a:rPr lang="en-GB" dirty="0"/>
-              <a:t>It can be hard for human operators to recognize features in the images taken by the SEM.</a:t>
-            </a:r>
+              <a:rPr lang="en-GB" sz="1800" dirty="0"/>
+              <a:t>A Guide to Scanning Microscope Observation, JEOL</a:t>
+            </a:r>
+            <a:endParaRPr lang="en-US" sz="1800" dirty="0">
+              <a:solidFill>
+                <a:srgbClr val="FF0000"/>
+              </a:solidFill>
+            </a:endParaRPr>
           </a:p>
         </p:txBody>
       </p:sp>
@@ -7288,7 +9197,7 @@
             <a:pPr algn="l"/>
             <a:r>
               <a:rPr lang="en-GB" dirty="0"/>
-              <a:t>Solution to the Problems</a:t>
+              <a:t>The Solution</a:t>
             </a:r>
           </a:p>
         </p:txBody>
@@ -7311,12 +9220,53 @@
         </p:nvSpPr>
         <p:spPr/>
         <p:txBody>
-          <a:bodyPr/>
+          <a:bodyPr>
+            <a:normAutofit/>
+          </a:bodyPr>
           <a:lstStyle/>
           <a:p>
             <a:r>
-              <a:rPr lang="en-GB" dirty="0"/>
-              <a:t>A GUI-based software that performs real-time FFT on the images and displays the results.</a:t>
+              <a:rPr lang="en-GB" sz="2800" dirty="0"/>
+              <a:t>A GUI-based software that provides diagnostic information from the images.</a:t>
+            </a:r>
+          </a:p>
+          <a:p>
+            <a:r>
+              <a:rPr lang="en-GB" sz="2800" dirty="0"/>
+              <a:t>Diagnostic information that could be useful:</a:t>
+            </a:r>
+          </a:p>
+          <a:p>
+            <a:pPr lvl="1"/>
+            <a:r>
+              <a:rPr lang="en-GB" sz="2800" dirty="0"/>
+              <a:t>A histogram.</a:t>
+            </a:r>
+            <a:endParaRPr lang="en-GB" sz="2800" dirty="0">
+              <a:solidFill>
+                <a:srgbClr val="FF0000"/>
+              </a:solidFill>
+            </a:endParaRPr>
+          </a:p>
+          <a:p>
+            <a:pPr lvl="1"/>
+            <a:r>
+              <a:rPr lang="en-GB" sz="2800" dirty="0"/>
+              <a:t>A measure of brightness.</a:t>
+            </a:r>
+          </a:p>
+          <a:p>
+            <a:pPr lvl="1"/>
+            <a:r>
+              <a:rPr lang="en-GB" sz="2800" dirty="0"/>
+              <a:t>A measure of sharpness of the images (FFT).</a:t>
+            </a:r>
+          </a:p>
+          <a:p>
+            <a:pPr lvl="1"/>
+            <a:r>
+              <a:rPr lang="en-GB" sz="2800" dirty="0"/>
+              <a:t>A measure of contrast of the images (variance).</a:t>
             </a:r>
           </a:p>
         </p:txBody>
@@ -7356,7 +9306,7 @@
           <p:cNvPr id="2" name="Title 1">
             <a:extLst>
               <a:ext uri="{FF2B5EF4-FFF2-40B4-BE49-F238E27FC236}">
-                <a16:creationId xmlns:a16="http://schemas.microsoft.com/office/drawing/2014/main" id="{5DC5E5E8-519A-4B02-A04F-5D404E6487A0}"/>
+                <a16:creationId xmlns:a16="http://schemas.microsoft.com/office/drawing/2014/main" id="{F239A7AA-4FCE-4722-A5C6-405B51A4A8AF}"/>
               </a:ext>
             </a:extLst>
           </p:cNvPr>
@@ -7375,7 +9325,7 @@
             <a:pPr algn="l"/>
             <a:r>
               <a:rPr lang="en-GB" dirty="0"/>
-              <a:t>Features of the Software</a:t>
+              <a:t>The Bottleneck</a:t>
             </a:r>
           </a:p>
         </p:txBody>
@@ -7385,7 +9335,7 @@
           <p:cNvPr id="3" name="Content Placeholder 2">
             <a:extLst>
               <a:ext uri="{FF2B5EF4-FFF2-40B4-BE49-F238E27FC236}">
-                <a16:creationId xmlns:a16="http://schemas.microsoft.com/office/drawing/2014/main" id="{87B580D2-292C-4CCD-A52A-88AFBE86F412}"/>
+                <a16:creationId xmlns:a16="http://schemas.microsoft.com/office/drawing/2014/main" id="{F05E61BD-DE2E-42FC-9DFA-41D4748F7C29}"/>
               </a:ext>
             </a:extLst>
           </p:cNvPr>
@@ -7396,78 +9346,53 @@
             <p:ph idx="1"/>
           </p:nvPr>
         </p:nvSpPr>
-        <p:spPr>
-          <a:xfrm>
-            <a:off x="913795" y="1732449"/>
-            <a:ext cx="10353762" cy="4058751"/>
-          </a:xfrm>
-        </p:spPr>
-        <p:txBody>
-          <a:bodyPr/>
+        <p:spPr/>
+        <p:txBody>
+          <a:bodyPr>
+            <a:normAutofit lnSpcReduction="10000"/>
+          </a:bodyPr>
           <a:lstStyle/>
           <a:p>
             <a:r>
-              <a:rPr lang="en-GB" dirty="0"/>
-              <a:t>Plots:</a:t>
+              <a:rPr lang="en-GB" sz="2800" dirty="0"/>
+              <a:t>The SEM takes images in real-time (10 Hz minimum).</a:t>
+            </a:r>
+          </a:p>
+          <a:p>
+            <a:r>
+              <a:rPr lang="en-GB" sz="2800" dirty="0"/>
+              <a:t>The diagnostic information must be updated in real-time.</a:t>
+            </a:r>
+          </a:p>
+          <a:p>
+            <a:r>
+              <a:rPr lang="en-GB" sz="2800" dirty="0"/>
+              <a:t>Calculation of the diagnostic information takes time.</a:t>
+            </a:r>
+          </a:p>
+          <a:p>
+            <a:r>
+              <a:rPr lang="en-GB" sz="2800" dirty="0"/>
+              <a:t>The software must be easily maintainable, i.e. Python is preferred.</a:t>
+            </a:r>
+          </a:p>
+          <a:p>
+            <a:r>
+              <a:rPr lang="en-GB" sz="2800" dirty="0"/>
+              <a:t>Solution:</a:t>
             </a:r>
           </a:p>
           <a:p>
             <a:pPr lvl="1"/>
             <a:r>
-              <a:rPr lang="en-GB" dirty="0"/>
-              <a:t>the original image from the SEM.</a:t>
-            </a:r>
-          </a:p>
-          <a:p>
-            <a:pPr lvl="1"/>
-            <a:r>
-              <a:rPr lang="en-GB" dirty="0"/>
-              <a:t>the result of 2D FFT on the image.</a:t>
-            </a:r>
-          </a:p>
-          <a:p>
-            <a:pPr lvl="1"/>
-            <a:r>
-              <a:rPr lang="en-GB" dirty="0"/>
-              <a:t>the result of 1D FFT along the x-axis of the image.</a:t>
-            </a:r>
-          </a:p>
-          <a:p>
-            <a:pPr lvl="1"/>
-            <a:r>
-              <a:rPr lang="en-GB" dirty="0"/>
-              <a:t>the result of 1D FFT along the y-axis of the image.</a:t>
-            </a:r>
-          </a:p>
-          <a:p>
-            <a:r>
-              <a:rPr lang="en-GB" dirty="0"/>
-              <a:t>Utilities:</a:t>
-            </a:r>
-          </a:p>
-          <a:p>
-            <a:pPr lvl="1"/>
-            <a:r>
-              <a:rPr lang="en-GB" dirty="0"/>
-              <a:t>zooming for the FFT figures.</a:t>
-            </a:r>
-          </a:p>
-          <a:p>
-            <a:pPr lvl="1"/>
-            <a:r>
-              <a:rPr lang="en-GB" dirty="0"/>
-              <a:t>contrast adjusting for the FFT figures.</a:t>
-            </a:r>
-          </a:p>
-          <a:p>
-            <a:pPr lvl="1"/>
-            <a:r>
-              <a:rPr lang="en-GB" dirty="0"/>
-              <a:t>…</a:t>
-            </a:r>
-          </a:p>
-          <a:p>
-            <a:pPr lvl="1"/>
+              <a:rPr lang="en-GB" sz="2800" dirty="0"/>
+              <a:t>Using the Nvidia CUDA Toolkit to perform the calculations on the GPU.</a:t>
+            </a:r>
+          </a:p>
+          <a:p>
+            <a:pPr marL="36900" indent="0">
+              <a:buNone/>
+            </a:pPr>
             <a:endParaRPr lang="en-GB" dirty="0"/>
           </a:p>
         </p:txBody>
@@ -7475,7 +9400,7 @@
     </p:spTree>
     <p:extLst>
       <p:ext uri="{BB962C8B-B14F-4D97-AF65-F5344CB8AC3E}">
-        <p14:creationId xmlns:p14="http://schemas.microsoft.com/office/powerpoint/2010/main" val="1320088088"/>
+        <p14:creationId xmlns:p14="http://schemas.microsoft.com/office/powerpoint/2010/main" val="4251501988"/>
       </p:ext>
     </p:extLst>
   </p:cSld>
@@ -7507,7 +9432,7 @@
           <p:cNvPr id="2" name="Title 1">
             <a:extLst>
               <a:ext uri="{FF2B5EF4-FFF2-40B4-BE49-F238E27FC236}">
-                <a16:creationId xmlns:a16="http://schemas.microsoft.com/office/drawing/2014/main" id="{F239A7AA-4FCE-4722-A5C6-405B51A4A8AF}"/>
+                <a16:creationId xmlns:a16="http://schemas.microsoft.com/office/drawing/2014/main" id="{BF92FF83-A2B3-4EF0-8383-2B1BF682A4FD}"/>
               </a:ext>
             </a:extLst>
           </p:cNvPr>
@@ -7526,7 +9451,7 @@
             <a:pPr algn="l"/>
             <a:r>
               <a:rPr lang="en-GB" dirty="0"/>
-              <a:t>Bottlenecks of the Performance</a:t>
+              <a:t>The Progress</a:t>
             </a:r>
           </a:p>
         </p:txBody>
@@ -7536,7 +9461,7 @@
           <p:cNvPr id="3" name="Content Placeholder 2">
             <a:extLst>
               <a:ext uri="{FF2B5EF4-FFF2-40B4-BE49-F238E27FC236}">
-                <a16:creationId xmlns:a16="http://schemas.microsoft.com/office/drawing/2014/main" id="{F05E61BD-DE2E-42FC-9DFA-41D4748F7C29}"/>
+                <a16:creationId xmlns:a16="http://schemas.microsoft.com/office/drawing/2014/main" id="{164479EF-3341-4B89-AE26-E6EFEB4F7946}"/>
               </a:ext>
             </a:extLst>
           </p:cNvPr>
@@ -7549,26 +9474,72 @@
         </p:nvSpPr>
         <p:spPr/>
         <p:txBody>
-          <a:bodyPr/>
+          <a:bodyPr>
+            <a:normAutofit/>
+          </a:bodyPr>
           <a:lstStyle/>
           <a:p>
             <a:r>
-              <a:rPr lang="en-GB" dirty="0"/>
-              <a:t>Performing FFT takes time.</a:t>
-            </a:r>
-          </a:p>
-          <a:p>
-            <a:endParaRPr lang="en-GB" dirty="0"/>
-          </a:p>
-          <a:p>
-            <a:endParaRPr lang="en-GB" dirty="0"/>
+              <a:rPr lang="en-GB" sz="2800" dirty="0"/>
+              <a:t>Code has been written to utilise CUDA for calculating the FFT.</a:t>
+            </a:r>
+          </a:p>
+          <a:p>
+            <a:r>
+              <a:rPr lang="en-GB" sz="2800" dirty="0"/>
+              <a:t>Code has been written to utilise Qt for deploying a basic GUI.</a:t>
+            </a:r>
+          </a:p>
+          <a:p>
+            <a:r>
+              <a:rPr lang="en-GB" sz="2800" dirty="0"/>
+              <a:t>Results (1024×768 image, </a:t>
+            </a:r>
+            <a:r>
+              <a:rPr lang="en-GB" sz="2800" dirty="0">
+                <a:solidFill>
+                  <a:schemeClr val="tx1"/>
+                </a:solidFill>
+              </a:rPr>
+              <a:t>Intel i7-7700HQ and Nvidia GTX 1060</a:t>
+            </a:r>
+            <a:r>
+              <a:rPr lang="en-GB" sz="2800" dirty="0"/>
+              <a:t>):</a:t>
+            </a:r>
+          </a:p>
+          <a:p>
+            <a:pPr lvl="1"/>
+            <a:r>
+              <a:rPr lang="en-GB" sz="2800" dirty="0"/>
+              <a:t>CUDA calculates the FFT 3~6 times faster than </a:t>
+            </a:r>
+            <a:r>
+              <a:rPr lang="en-GB" sz="2800" dirty="0" err="1"/>
+              <a:t>Numpy</a:t>
+            </a:r>
+            <a:r>
+              <a:rPr lang="en-GB" sz="2800" dirty="0"/>
+              <a:t>.</a:t>
+            </a:r>
+          </a:p>
+          <a:p>
+            <a:pPr lvl="1"/>
+            <a:r>
+              <a:rPr lang="en-GB" sz="2800" dirty="0">
+                <a:solidFill>
+                  <a:schemeClr val="tx1"/>
+                </a:solidFill>
+              </a:rPr>
+              <a:t>A frame rate of ~20 Hz is achieved.</a:t>
+            </a:r>
           </a:p>
         </p:txBody>
       </p:sp>
     </p:spTree>
     <p:extLst>
       <p:ext uri="{BB962C8B-B14F-4D97-AF65-F5344CB8AC3E}">
-        <p14:creationId xmlns:p14="http://schemas.microsoft.com/office/powerpoint/2010/main" val="4251501988"/>
+        <p14:creationId xmlns:p14="http://schemas.microsoft.com/office/powerpoint/2010/main" val="907779783"/>
       </p:ext>
     </p:extLst>
   </p:cSld>
@@ -7600,7 +9571,7 @@
           <p:cNvPr id="2" name="Title 1">
             <a:extLst>
               <a:ext uri="{FF2B5EF4-FFF2-40B4-BE49-F238E27FC236}">
-                <a16:creationId xmlns:a16="http://schemas.microsoft.com/office/drawing/2014/main" id="{BF92FF83-A2B3-4EF0-8383-2B1BF682A4FD}"/>
+                <a16:creationId xmlns:a16="http://schemas.microsoft.com/office/drawing/2014/main" id="{ADF1CA83-45C6-4AF9-B286-6137893515FE}"/>
               </a:ext>
             </a:extLst>
           </p:cNvPr>
@@ -7619,47 +9590,50 @@
             <a:pPr algn="l"/>
             <a:r>
               <a:rPr lang="en-GB" dirty="0"/>
-              <a:t>Progress of the Development</a:t>
-            </a:r>
-          </a:p>
-        </p:txBody>
-      </p:sp>
-      <p:sp>
-        <p:nvSpPr>
-          <p:cNvPr id="3" name="Content Placeholder 2">
+              <a:t>Sample Screenshot</a:t>
+            </a:r>
+          </a:p>
+        </p:txBody>
+      </p:sp>
+      <p:pic>
+        <p:nvPicPr>
+          <p:cNvPr id="11" name="Content Placeholder 10">
             <a:extLst>
               <a:ext uri="{FF2B5EF4-FFF2-40B4-BE49-F238E27FC236}">
-                <a16:creationId xmlns:a16="http://schemas.microsoft.com/office/drawing/2014/main" id="{164479EF-3341-4B89-AE26-E6EFEB4F7946}"/>
+                <a16:creationId xmlns:a16="http://schemas.microsoft.com/office/drawing/2014/main" id="{365D9495-1CE2-4D06-991D-B17373C6A1AE}"/>
               </a:ext>
             </a:extLst>
           </p:cNvPr>
-          <p:cNvSpPr>
-            <a:spLocks noGrp="1"/>
-          </p:cNvSpPr>
+          <p:cNvPicPr>
+            <a:picLocks noGrp="1" noChangeAspect="1"/>
+          </p:cNvPicPr>
           <p:nvPr>
             <p:ph idx="1"/>
           </p:nvPr>
-        </p:nvSpPr>
-        <p:spPr/>
-        <p:txBody>
-          <a:bodyPr/>
-          <a:lstStyle/>
-          <a:p>
-            <a:r>
-              <a:rPr lang="en-GB" dirty="0">
-                <a:solidFill>
-                  <a:srgbClr val="FF0000"/>
-                </a:solidFill>
-              </a:rPr>
-              <a:t>To be added.</a:t>
-            </a:r>
-          </a:p>
-        </p:txBody>
-      </p:sp>
+        </p:nvPicPr>
+        <p:blipFill>
+          <a:blip r:embed="rId3">
+            <a:extLst>
+              <a:ext uri="{28A0092B-C50C-407E-A947-70E740481C1C}">
+                <a14:useLocalDpi xmlns:a14="http://schemas.microsoft.com/office/drawing/2010/main" val="0"/>
+              </a:ext>
+            </a:extLst>
+          </a:blip>
+          <a:stretch>
+            <a:fillRect/>
+          </a:stretch>
+        </p:blipFill>
+        <p:spPr>
+          <a:xfrm>
+            <a:off x="2956884" y="1417088"/>
+            <a:ext cx="6278233" cy="5040000"/>
+          </a:xfrm>
+        </p:spPr>
+      </p:pic>
     </p:spTree>
     <p:extLst>
       <p:ext uri="{BB962C8B-B14F-4D97-AF65-F5344CB8AC3E}">
-        <p14:creationId xmlns:p14="http://schemas.microsoft.com/office/powerpoint/2010/main" val="907779783"/>
+        <p14:creationId xmlns:p14="http://schemas.microsoft.com/office/powerpoint/2010/main" val="342202315"/>
       </p:ext>
     </p:extLst>
   </p:cSld>
@@ -7710,47 +9684,46 @@
             <a:pPr algn="l"/>
             <a:r>
               <a:rPr lang="en-GB" dirty="0"/>
-              <a:t>Plans for the Next Steps</a:t>
-            </a:r>
-          </a:p>
-        </p:txBody>
-      </p:sp>
-      <p:sp>
-        <p:nvSpPr>
-          <p:cNvPr id="3" name="Content Placeholder 2">
+              <a:t>The Future</a:t>
+            </a:r>
+          </a:p>
+        </p:txBody>
+      </p:sp>
+      <p:graphicFrame>
+        <p:nvGraphicFramePr>
+          <p:cNvPr id="6" name="Content Placeholder 5">
             <a:extLst>
               <a:ext uri="{FF2B5EF4-FFF2-40B4-BE49-F238E27FC236}">
-                <a16:creationId xmlns:a16="http://schemas.microsoft.com/office/drawing/2014/main" id="{BDF2D626-3D52-4FDF-A642-C7C0A875F46C}"/>
+                <a16:creationId xmlns:a16="http://schemas.microsoft.com/office/drawing/2014/main" id="{4DE19DC6-FA58-4D68-AC15-CEF2E1D8155A}"/>
               </a:ext>
             </a:extLst>
           </p:cNvPr>
-          <p:cNvSpPr>
-            <a:spLocks noGrp="1"/>
-          </p:cNvSpPr>
+          <p:cNvGraphicFramePr>
+            <a:graphicFrameLocks noGrp="1"/>
+          </p:cNvGraphicFramePr>
           <p:nvPr>
             <p:ph idx="1"/>
-          </p:nvPr>
-        </p:nvSpPr>
-        <p:spPr/>
-        <p:txBody>
-          <a:bodyPr/>
-          <a:lstStyle/>
-          <a:p>
-            <a:r>
-              <a:rPr lang="en-GB" dirty="0">
-                <a:solidFill>
-                  <a:srgbClr val="FF0000"/>
-                </a:solidFill>
-              </a:rPr>
-              <a:t>To be added.</a:t>
-            </a:r>
-          </a:p>
-        </p:txBody>
-      </p:sp>
+            <p:extLst>
+              <p:ext uri="{D42A27DB-BD31-4B8C-83A1-F6EECF244321}">
+                <p14:modId xmlns:p14="http://schemas.microsoft.com/office/powerpoint/2010/main" val="1556129654"/>
+              </p:ext>
+            </p:extLst>
+          </p:nvPr>
+        </p:nvGraphicFramePr>
+        <p:xfrm>
+          <a:off x="914400" y="1731963"/>
+          <a:ext cx="10353675" cy="4059237"/>
+        </p:xfrm>
+        <a:graphic>
+          <a:graphicData uri="http://schemas.openxmlformats.org/drawingml/2006/chart">
+            <c:chart xmlns:c="http://schemas.openxmlformats.org/drawingml/2006/chart" xmlns:r="http://schemas.openxmlformats.org/officeDocument/2006/relationships" r:id="rId3"/>
+          </a:graphicData>
+        </a:graphic>
+      </p:graphicFrame>
     </p:spTree>
     <p:extLst>
       <p:ext uri="{BB962C8B-B14F-4D97-AF65-F5344CB8AC3E}">
-        <p14:creationId xmlns:p14="http://schemas.microsoft.com/office/powerpoint/2010/main" val="113839659"/>
+        <p14:creationId xmlns:p14="http://schemas.microsoft.com/office/powerpoint/2010/main" val="123446897"/>
       </p:ext>
     </p:extLst>
   </p:cSld>
@@ -8000,4 +9973,299 @@
     </a:ext>
   </a:extLst>
 </a:theme>
+</file>
+
+<file path=ppt/theme/theme2.xml><?xml version="1.0" encoding="utf-8"?>
+<a:theme xmlns:a="http://schemas.openxmlformats.org/drawingml/2006/main" name="Office Theme">
+  <a:themeElements>
+    <a:clrScheme name="Office">
+      <a:dk1>
+        <a:sysClr val="windowText" lastClr="000000"/>
+      </a:dk1>
+      <a:lt1>
+        <a:sysClr val="window" lastClr="FFFFFF"/>
+      </a:lt1>
+      <a:dk2>
+        <a:srgbClr val="44546A"/>
+      </a:dk2>
+      <a:lt2>
+        <a:srgbClr val="E7E6E6"/>
+      </a:lt2>
+      <a:accent1>
+        <a:srgbClr val="4472C4"/>
+      </a:accent1>
+      <a:accent2>
+        <a:srgbClr val="ED7D31"/>
+      </a:accent2>
+      <a:accent3>
+        <a:srgbClr val="A5A5A5"/>
+      </a:accent3>
+      <a:accent4>
+        <a:srgbClr val="FFC000"/>
+      </a:accent4>
+      <a:accent5>
+        <a:srgbClr val="5B9BD5"/>
+      </a:accent5>
+      <a:accent6>
+        <a:srgbClr val="70AD47"/>
+      </a:accent6>
+      <a:hlink>
+        <a:srgbClr val="0563C1"/>
+      </a:hlink>
+      <a:folHlink>
+        <a:srgbClr val="954F72"/>
+      </a:folHlink>
+    </a:clrScheme>
+    <a:fontScheme name="Office">
+      <a:majorFont>
+        <a:latin typeface="Calibri Light" panose="020F0302020204030204"/>
+        <a:ea typeface=""/>
+        <a:cs typeface=""/>
+        <a:font script="Jpan" typeface="游ゴシック Light"/>
+        <a:font script="Hang" typeface="맑은 고딕"/>
+        <a:font script="Hans" typeface="等线 Light"/>
+        <a:font script="Hant" typeface="新細明體"/>
+        <a:font script="Arab" typeface="Times New Roman"/>
+        <a:font script="Hebr" typeface="Times New Roman"/>
+        <a:font script="Thai" typeface="Angsana New"/>
+        <a:font script="Ethi" typeface="Nyala"/>
+        <a:font script="Beng" typeface="Vrinda"/>
+        <a:font script="Gujr" typeface="Shruti"/>
+        <a:font script="Khmr" typeface="MoolBoran"/>
+        <a:font script="Knda" typeface="Tunga"/>
+        <a:font script="Guru" typeface="Raavi"/>
+        <a:font script="Cans" typeface="Euphemia"/>
+        <a:font script="Cher" typeface="Plantagenet Cherokee"/>
+        <a:font script="Yiii" typeface="Microsoft Yi Baiti"/>
+        <a:font script="Tibt" typeface="Microsoft Himalaya"/>
+        <a:font script="Thaa" typeface="MV Boli"/>
+        <a:font script="Deva" typeface="Mangal"/>
+        <a:font script="Telu" typeface="Gautami"/>
+        <a:font script="Taml" typeface="Latha"/>
+        <a:font script="Syrc" typeface="Estrangelo Edessa"/>
+        <a:font script="Orya" typeface="Kalinga"/>
+        <a:font script="Mlym" typeface="Kartika"/>
+        <a:font script="Laoo" typeface="DokChampa"/>
+        <a:font script="Sinh" typeface="Iskoola Pota"/>
+        <a:font script="Mong" typeface="Mongolian Baiti"/>
+        <a:font script="Viet" typeface="Times New Roman"/>
+        <a:font script="Uigh" typeface="Microsoft Uighur"/>
+        <a:font script="Geor" typeface="Sylfaen"/>
+        <a:font script="Armn" typeface="Arial"/>
+        <a:font script="Bugi" typeface="Leelawadee UI"/>
+        <a:font script="Bopo" typeface="Microsoft JhengHei"/>
+        <a:font script="Java" typeface="Javanese Text"/>
+        <a:font script="Lisu" typeface="Segoe UI"/>
+        <a:font script="Mymr" typeface="Myanmar Text"/>
+        <a:font script="Nkoo" typeface="Ebrima"/>
+        <a:font script="Olck" typeface="Nirmala UI"/>
+        <a:font script="Osma" typeface="Ebrima"/>
+        <a:font script="Phag" typeface="Phagspa"/>
+        <a:font script="Syrn" typeface="Estrangelo Edessa"/>
+        <a:font script="Syrj" typeface="Estrangelo Edessa"/>
+        <a:font script="Syre" typeface="Estrangelo Edessa"/>
+        <a:font script="Sora" typeface="Nirmala UI"/>
+        <a:font script="Tale" typeface="Microsoft Tai Le"/>
+        <a:font script="Talu" typeface="Microsoft New Tai Lue"/>
+        <a:font script="Tfng" typeface="Ebrima"/>
+      </a:majorFont>
+      <a:minorFont>
+        <a:latin typeface="Calibri" panose="020F0502020204030204"/>
+        <a:ea typeface=""/>
+        <a:cs typeface=""/>
+        <a:font script="Jpan" typeface="游ゴシック"/>
+        <a:font script="Hang" typeface="맑은 고딕"/>
+        <a:font script="Hans" typeface="等线"/>
+        <a:font script="Hant" typeface="新細明體"/>
+        <a:font script="Arab" typeface="Arial"/>
+        <a:font script="Hebr" typeface="Arial"/>
+        <a:font script="Thai" typeface="Cordia New"/>
+        <a:font script="Ethi" typeface="Nyala"/>
+        <a:font script="Beng" typeface="Vrinda"/>
+        <a:font script="Gujr" typeface="Shruti"/>
+        <a:font script="Khmr" typeface="DaunPenh"/>
+        <a:font script="Knda" typeface="Tunga"/>
+        <a:font script="Guru" typeface="Raavi"/>
+        <a:font script="Cans" typeface="Euphemia"/>
+        <a:font script="Cher" typeface="Plantagenet Cherokee"/>
+        <a:font script="Yiii" typeface="Microsoft Yi Baiti"/>
+        <a:font script="Tibt" typeface="Microsoft Himalaya"/>
+        <a:font script="Thaa" typeface="MV Boli"/>
+        <a:font script="Deva" typeface="Mangal"/>
+        <a:font script="Telu" typeface="Gautami"/>
+        <a:font script="Taml" typeface="Latha"/>
+        <a:font script="Syrc" typeface="Estrangelo Edessa"/>
+        <a:font script="Orya" typeface="Kalinga"/>
+        <a:font script="Mlym" typeface="Kartika"/>
+        <a:font script="Laoo" typeface="DokChampa"/>
+        <a:font script="Sinh" typeface="Iskoola Pota"/>
+        <a:font script="Mong" typeface="Mongolian Baiti"/>
+        <a:font script="Viet" typeface="Arial"/>
+        <a:font script="Uigh" typeface="Microsoft Uighur"/>
+        <a:font script="Geor" typeface="Sylfaen"/>
+        <a:font script="Armn" typeface="Arial"/>
+        <a:font script="Bugi" typeface="Leelawadee UI"/>
+        <a:font script="Bopo" typeface="Microsoft JhengHei"/>
+        <a:font script="Java" typeface="Javanese Text"/>
+        <a:font script="Lisu" typeface="Segoe UI"/>
+        <a:font script="Mymr" typeface="Myanmar Text"/>
+        <a:font script="Nkoo" typeface="Ebrima"/>
+        <a:font script="Olck" typeface="Nirmala UI"/>
+        <a:font script="Osma" typeface="Ebrima"/>
+        <a:font script="Phag" typeface="Phagspa"/>
+        <a:font script="Syrn" typeface="Estrangelo Edessa"/>
+        <a:font script="Syrj" typeface="Estrangelo Edessa"/>
+        <a:font script="Syre" typeface="Estrangelo Edessa"/>
+        <a:font script="Sora" typeface="Nirmala UI"/>
+        <a:font script="Tale" typeface="Microsoft Tai Le"/>
+        <a:font script="Talu" typeface="Microsoft New Tai Lue"/>
+        <a:font script="Tfng" typeface="Ebrima"/>
+      </a:minorFont>
+    </a:fontScheme>
+    <a:fmtScheme name="Office">
+      <a:fillStyleLst>
+        <a:solidFill>
+          <a:schemeClr val="phClr"/>
+        </a:solidFill>
+        <a:gradFill rotWithShape="1">
+          <a:gsLst>
+            <a:gs pos="0">
+              <a:schemeClr val="phClr">
+                <a:lumMod val="110000"/>
+                <a:satMod val="105000"/>
+                <a:tint val="67000"/>
+              </a:schemeClr>
+            </a:gs>
+            <a:gs pos="50000">
+              <a:schemeClr val="phClr">
+                <a:lumMod val="105000"/>
+                <a:satMod val="103000"/>
+                <a:tint val="73000"/>
+              </a:schemeClr>
+            </a:gs>
+            <a:gs pos="100000">
+              <a:schemeClr val="phClr">
+                <a:lumMod val="105000"/>
+                <a:satMod val="109000"/>
+                <a:tint val="81000"/>
+              </a:schemeClr>
+            </a:gs>
+          </a:gsLst>
+          <a:lin ang="5400000" scaled="0"/>
+        </a:gradFill>
+        <a:gradFill rotWithShape="1">
+          <a:gsLst>
+            <a:gs pos="0">
+              <a:schemeClr val="phClr">
+                <a:satMod val="103000"/>
+                <a:lumMod val="102000"/>
+                <a:tint val="94000"/>
+              </a:schemeClr>
+            </a:gs>
+            <a:gs pos="50000">
+              <a:schemeClr val="phClr">
+                <a:satMod val="110000"/>
+                <a:lumMod val="100000"/>
+                <a:shade val="100000"/>
+              </a:schemeClr>
+            </a:gs>
+            <a:gs pos="100000">
+              <a:schemeClr val="phClr">
+                <a:lumMod val="99000"/>
+                <a:satMod val="120000"/>
+                <a:shade val="78000"/>
+              </a:schemeClr>
+            </a:gs>
+          </a:gsLst>
+          <a:lin ang="5400000" scaled="0"/>
+        </a:gradFill>
+      </a:fillStyleLst>
+      <a:lnStyleLst>
+        <a:ln w="6350" cap="flat" cmpd="sng" algn="ctr">
+          <a:solidFill>
+            <a:schemeClr val="phClr"/>
+          </a:solidFill>
+          <a:prstDash val="solid"/>
+          <a:miter lim="800000"/>
+        </a:ln>
+        <a:ln w="12700" cap="flat" cmpd="sng" algn="ctr">
+          <a:solidFill>
+            <a:schemeClr val="phClr"/>
+          </a:solidFill>
+          <a:prstDash val="solid"/>
+          <a:miter lim="800000"/>
+        </a:ln>
+        <a:ln w="19050" cap="flat" cmpd="sng" algn="ctr">
+          <a:solidFill>
+            <a:schemeClr val="phClr"/>
+          </a:solidFill>
+          <a:prstDash val="solid"/>
+          <a:miter lim="800000"/>
+        </a:ln>
+      </a:lnStyleLst>
+      <a:effectStyleLst>
+        <a:effectStyle>
+          <a:effectLst/>
+        </a:effectStyle>
+        <a:effectStyle>
+          <a:effectLst/>
+        </a:effectStyle>
+        <a:effectStyle>
+          <a:effectLst>
+            <a:outerShdw blurRad="57150" dist="19050" dir="5400000" algn="ctr" rotWithShape="0">
+              <a:srgbClr val="000000">
+                <a:alpha val="63000"/>
+              </a:srgbClr>
+            </a:outerShdw>
+          </a:effectLst>
+        </a:effectStyle>
+      </a:effectStyleLst>
+      <a:bgFillStyleLst>
+        <a:solidFill>
+          <a:schemeClr val="phClr"/>
+        </a:solidFill>
+        <a:solidFill>
+          <a:schemeClr val="phClr">
+            <a:tint val="95000"/>
+            <a:satMod val="170000"/>
+          </a:schemeClr>
+        </a:solidFill>
+        <a:gradFill rotWithShape="1">
+          <a:gsLst>
+            <a:gs pos="0">
+              <a:schemeClr val="phClr">
+                <a:tint val="93000"/>
+                <a:satMod val="150000"/>
+                <a:shade val="98000"/>
+                <a:lumMod val="102000"/>
+              </a:schemeClr>
+            </a:gs>
+            <a:gs pos="50000">
+              <a:schemeClr val="phClr">
+                <a:tint val="98000"/>
+                <a:satMod val="130000"/>
+                <a:shade val="90000"/>
+                <a:lumMod val="103000"/>
+              </a:schemeClr>
+            </a:gs>
+            <a:gs pos="100000">
+              <a:schemeClr val="phClr">
+                <a:shade val="63000"/>
+                <a:satMod val="120000"/>
+              </a:schemeClr>
+            </a:gs>
+          </a:gsLst>
+          <a:lin ang="5400000" scaled="0"/>
+        </a:gradFill>
+      </a:bgFillStyleLst>
+    </a:fmtScheme>
+  </a:themeElements>
+  <a:objectDefaults/>
+  <a:extraClrSchemeLst/>
+  <a:extLst>
+    <a:ext uri="{05A4C25C-085E-4340-85A3-A5531E510DB2}">
+      <thm15:themeFamily xmlns:thm15="http://schemas.microsoft.com/office/thememl/2012/main" name="Office Theme" id="{62F939B6-93AF-4DB8-9C6B-D6C7DFDC589F}" vid="{4A3C46E8-61CC-4603-A589-7422A47A8E4A}"/>
+    </a:ext>
+  </a:extLst>
+</a:theme>
 </file>
</xml_diff>

<commit_message>
Finish first draft of project TMR.
</commit_message>
<xml_diff>
--- a/Reports/Presentation 1.pptx
+++ b/Reports/Presentation 1.pptx
@@ -5,7 +5,7 @@
     <p:sldMasterId id="2147483831" r:id="rId1"/>
   </p:sldMasterIdLst>
   <p:notesMasterIdLst>
-    <p:notesMasterId r:id="rId10"/>
+    <p:notesMasterId r:id="rId11"/>
   </p:notesMasterIdLst>
   <p:sldIdLst>
     <p:sldId id="256" r:id="rId2"/>
@@ -16,6 +16,7 @@
     <p:sldId id="263" r:id="rId7"/>
     <p:sldId id="264" r:id="rId8"/>
     <p:sldId id="265" r:id="rId9"/>
+    <p:sldId id="266" r:id="rId10"/>
   </p:sldIdLst>
   <p:sldSz cx="12192000" cy="6858000"/>
   <p:notesSz cx="6858000" cy="9144000"/>
@@ -137,13 +138,29 @@
 <file path=ppt/revisionInfo.xml><?xml version="1.0" encoding="utf-8"?>
 <p1510:revInfo xmlns:a="http://schemas.openxmlformats.org/drawingml/2006/main" xmlns:r="http://schemas.openxmlformats.org/officeDocument/2006/relationships" xmlns:p1510="http://schemas.microsoft.com/office/powerpoint/2015/10/main">
   <p1510:revLst>
-    <p1510:client id="{BCFF7D6F-B234-4BB0-89F9-5081881F6A3D}" v="92" dt="2019-11-19T00:54:30.321"/>
+    <p1510:client id="{95B5DC50-B3A2-403E-BCC5-DC67F7427CA7}" v="2" dt="2020-01-08T20:57:50.794"/>
   </p1510:revLst>
 </p1510:revInfo>
 </file>
 
 <file path=ppt/changesInfos/changesInfo1.xml><?xml version="1.0" encoding="utf-8"?>
 <pc:chgInfo xmlns:a="http://schemas.openxmlformats.org/drawingml/2006/main" xmlns:r="http://schemas.openxmlformats.org/officeDocument/2006/relationships" xmlns:ac="http://schemas.microsoft.com/office/drawing/2013/main/command" xmlns:pc="http://schemas.microsoft.com/office/powerpoint/2013/main/command">
+  <pc:docChgLst>
+    <pc:chgData name="Liuchuyao Xu" userId="f38a3cf7e821ef0b" providerId="LiveId" clId="{95B5DC50-B3A2-403E-BCC5-DC67F7427CA7}"/>
+    <pc:docChg chg="addSld modSld">
+      <pc:chgData name="Liuchuyao Xu" userId="f38a3cf7e821ef0b" providerId="LiveId" clId="{95B5DC50-B3A2-403E-BCC5-DC67F7427CA7}" dt="2020-01-08T20:59:14.581" v="23" actId="27918"/>
+      <pc:docMkLst>
+        <pc:docMk/>
+      </pc:docMkLst>
+      <pc:sldChg chg="add mod">
+        <pc:chgData name="Liuchuyao Xu" userId="f38a3cf7e821ef0b" providerId="LiveId" clId="{95B5DC50-B3A2-403E-BCC5-DC67F7427CA7}" dt="2020-01-08T20:59:14.581" v="23" actId="27918"/>
+        <pc:sldMkLst>
+          <pc:docMk/>
+          <pc:sldMk cId="1722129062" sldId="266"/>
+        </pc:sldMkLst>
+      </pc:sldChg>
+    </pc:docChg>
+  </pc:docChgLst>
   <pc:docChgLst>
     <pc:chgData name="Liuchuyao Xu" userId="f38a3cf7e821ef0b" providerId="LiveId" clId="{BCFF7D6F-B234-4BB0-89F9-5081881F6A3D}"/>
     <pc:docChg chg="undo redo custSel mod addSld delSld modSld addMainMaster delMainMaster">
@@ -1771,7 +1788,396 @@
 </c:chartSpace>
 </file>
 
+<file path=ppt/charts/chart2.xml><?xml version="1.0" encoding="utf-8"?>
+<c:chartSpace xmlns:c="http://schemas.openxmlformats.org/drawingml/2006/chart" xmlns:a="http://schemas.openxmlformats.org/drawingml/2006/main" xmlns:r="http://schemas.openxmlformats.org/officeDocument/2006/relationships" xmlns:c16r2="http://schemas.microsoft.com/office/drawing/2015/06/chart">
+  <c:date1904 val="0"/>
+  <c:lang val="en-US"/>
+  <c:roundedCorners val="0"/>
+  <mc:AlternateContent xmlns:mc="http://schemas.openxmlformats.org/markup-compatibility/2006">
+    <mc:Choice xmlns:c14="http://schemas.microsoft.com/office/drawing/2007/8/2/chart" Requires="c14">
+      <c14:style val="102"/>
+    </mc:Choice>
+    <mc:Fallback>
+      <c:style val="2"/>
+    </mc:Fallback>
+  </mc:AlternateContent>
+  <c:chart>
+    <c:autoTitleDeleted val="1"/>
+    <c:plotArea>
+      <c:layout/>
+      <c:barChart>
+        <c:barDir val="bar"/>
+        <c:grouping val="stacked"/>
+        <c:varyColors val="0"/>
+        <c:ser>
+          <c:idx val="0"/>
+          <c:order val="0"/>
+          <c:tx>
+            <c:strRef>
+              <c:f>Sheet1!$B$1</c:f>
+              <c:strCache>
+                <c:ptCount val="1"/>
+                <c:pt idx="0">
+                  <c:v>Begin</c:v>
+                </c:pt>
+              </c:strCache>
+            </c:strRef>
+          </c:tx>
+          <c:spPr>
+            <a:noFill/>
+            <a:ln>
+              <a:noFill/>
+            </a:ln>
+            <a:effectLst/>
+          </c:spPr>
+          <c:invertIfNegative val="0"/>
+          <c:cat>
+            <c:strRef>
+              <c:f>Sheet1!$A$2:$A$8</c:f>
+              <c:strCache>
+                <c:ptCount val="6"/>
+                <c:pt idx="0">
+                  <c:v>Release software</c:v>
+                </c:pt>
+                <c:pt idx="1">
+                  <c:v>Improve GUI</c:v>
+                </c:pt>
+                <c:pt idx="2">
+                  <c:v>Evaluate GUI</c:v>
+                </c:pt>
+                <c:pt idx="3">
+                  <c:v>Complete GUI</c:v>
+                </c:pt>
+                <c:pt idx="4">
+                  <c:v>Improve features</c:v>
+                </c:pt>
+                <c:pt idx="5">
+                  <c:v>Evaluate features</c:v>
+                </c:pt>
+              </c:strCache>
+            </c:strRef>
+          </c:cat>
+          <c:val>
+            <c:numRef>
+              <c:f>Sheet1!$B$2:$B$8</c:f>
+              <c:numCache>
+                <c:formatCode>[$-809]dd\ mmmm\ yyyy;@</c:formatCode>
+                <c:ptCount val="7"/>
+                <c:pt idx="0">
+                  <c:v>43931</c:v>
+                </c:pt>
+                <c:pt idx="1">
+                  <c:v>43891</c:v>
+                </c:pt>
+                <c:pt idx="2">
+                  <c:v>43891</c:v>
+                </c:pt>
+                <c:pt idx="3">
+                  <c:v>43871</c:v>
+                </c:pt>
+                <c:pt idx="4">
+                  <c:v>43831</c:v>
+                </c:pt>
+                <c:pt idx="5">
+                  <c:v>43831</c:v>
+                </c:pt>
+              </c:numCache>
+            </c:numRef>
+          </c:val>
+          <c:extLst>
+            <c:ext xmlns:c16="http://schemas.microsoft.com/office/drawing/2014/chart" uri="{C3380CC4-5D6E-409C-BE32-E72D297353CC}">
+              <c16:uniqueId val="{00000000-54F9-4E89-9160-E1B2E466B756}"/>
+            </c:ext>
+          </c:extLst>
+        </c:ser>
+        <c:ser>
+          <c:idx val="1"/>
+          <c:order val="1"/>
+          <c:tx>
+            <c:strRef>
+              <c:f>Sheet1!$C$1</c:f>
+              <c:strCache>
+                <c:ptCount val="1"/>
+                <c:pt idx="0">
+                  <c:v>Duration</c:v>
+                </c:pt>
+              </c:strCache>
+            </c:strRef>
+          </c:tx>
+          <c:spPr>
+            <a:solidFill>
+              <a:schemeClr val="accent2"/>
+            </a:solidFill>
+            <a:ln>
+              <a:noFill/>
+            </a:ln>
+            <a:effectLst/>
+          </c:spPr>
+          <c:invertIfNegative val="0"/>
+          <c:cat>
+            <c:strRef>
+              <c:f>Sheet1!$A$2:$A$8</c:f>
+              <c:strCache>
+                <c:ptCount val="6"/>
+                <c:pt idx="0">
+                  <c:v>Release software</c:v>
+                </c:pt>
+                <c:pt idx="1">
+                  <c:v>Improve GUI</c:v>
+                </c:pt>
+                <c:pt idx="2">
+                  <c:v>Evaluate GUI</c:v>
+                </c:pt>
+                <c:pt idx="3">
+                  <c:v>Complete GUI</c:v>
+                </c:pt>
+                <c:pt idx="4">
+                  <c:v>Improve features</c:v>
+                </c:pt>
+                <c:pt idx="5">
+                  <c:v>Evaluate features</c:v>
+                </c:pt>
+              </c:strCache>
+            </c:strRef>
+          </c:cat>
+          <c:val>
+            <c:numRef>
+              <c:f>Sheet1!$C$2:$C$8</c:f>
+              <c:numCache>
+                <c:formatCode>[$-809]dd\ mmmm\ yyyy;@</c:formatCode>
+                <c:ptCount val="7"/>
+                <c:pt idx="0">
+                  <c:v>40</c:v>
+                </c:pt>
+                <c:pt idx="1">
+                  <c:v>60</c:v>
+                </c:pt>
+                <c:pt idx="2">
+                  <c:v>60</c:v>
+                </c:pt>
+                <c:pt idx="3">
+                  <c:v>40</c:v>
+                </c:pt>
+                <c:pt idx="4">
+                  <c:v>60</c:v>
+                </c:pt>
+                <c:pt idx="5">
+                  <c:v>60</c:v>
+                </c:pt>
+              </c:numCache>
+            </c:numRef>
+          </c:val>
+          <c:extLst>
+            <c:ext xmlns:c16="http://schemas.microsoft.com/office/drawing/2014/chart" uri="{C3380CC4-5D6E-409C-BE32-E72D297353CC}">
+              <c16:uniqueId val="{00000001-54F9-4E89-9160-E1B2E466B756}"/>
+            </c:ext>
+          </c:extLst>
+        </c:ser>
+        <c:dLbls>
+          <c:showLegendKey val="0"/>
+          <c:showVal val="0"/>
+          <c:showCatName val="0"/>
+          <c:showSerName val="0"/>
+          <c:showPercent val="0"/>
+          <c:showBubbleSize val="0"/>
+        </c:dLbls>
+        <c:gapWidth val="150"/>
+        <c:overlap val="100"/>
+        <c:axId val="685160760"/>
+        <c:axId val="685161400"/>
+      </c:barChart>
+      <c:catAx>
+        <c:axId val="685160760"/>
+        <c:scaling>
+          <c:orientation val="minMax"/>
+        </c:scaling>
+        <c:delete val="0"/>
+        <c:axPos val="l"/>
+        <c:numFmt formatCode="General" sourceLinked="1"/>
+        <c:majorTickMark val="none"/>
+        <c:minorTickMark val="none"/>
+        <c:tickLblPos val="nextTo"/>
+        <c:spPr>
+          <a:noFill/>
+          <a:ln w="9525" cap="flat" cmpd="sng" algn="ctr">
+            <a:solidFill>
+              <a:schemeClr val="tx1">
+                <a:lumMod val="15000"/>
+                <a:lumOff val="85000"/>
+              </a:schemeClr>
+            </a:solidFill>
+            <a:round/>
+          </a:ln>
+          <a:effectLst/>
+        </c:spPr>
+        <c:txPr>
+          <a:bodyPr rot="-60000000" spcFirstLastPara="1" vertOverflow="ellipsis" vert="horz" wrap="square" anchor="ctr" anchorCtr="1"/>
+          <a:lstStyle/>
+          <a:p>
+            <a:pPr>
+              <a:defRPr sz="1800" b="0" i="0" u="none" strike="noStrike" kern="1200" baseline="0">
+                <a:solidFill>
+                  <a:schemeClr val="tx1">
+                    <a:lumMod val="65000"/>
+                    <a:lumOff val="35000"/>
+                  </a:schemeClr>
+                </a:solidFill>
+                <a:latin typeface="+mn-lt"/>
+                <a:ea typeface="+mn-ea"/>
+                <a:cs typeface="+mn-cs"/>
+              </a:defRPr>
+            </a:pPr>
+            <a:endParaRPr lang="en-US"/>
+          </a:p>
+        </c:txPr>
+        <c:crossAx val="685161400"/>
+        <c:crosses val="autoZero"/>
+        <c:auto val="1"/>
+        <c:lblAlgn val="ctr"/>
+        <c:lblOffset val="100"/>
+        <c:noMultiLvlLbl val="0"/>
+      </c:catAx>
+      <c:valAx>
+        <c:axId val="685161400"/>
+        <c:scaling>
+          <c:orientation val="minMax"/>
+          <c:max val="43978"/>
+          <c:min val="43831"/>
+        </c:scaling>
+        <c:delete val="0"/>
+        <c:axPos val="b"/>
+        <c:majorGridlines>
+          <c:spPr>
+            <a:ln w="9525" cap="flat" cmpd="sng" algn="ctr">
+              <a:solidFill>
+                <a:schemeClr val="tx1">
+                  <a:lumMod val="15000"/>
+                  <a:lumOff val="85000"/>
+                </a:schemeClr>
+              </a:solidFill>
+              <a:round/>
+            </a:ln>
+            <a:effectLst/>
+          </c:spPr>
+        </c:majorGridlines>
+        <c:numFmt formatCode="[$-809]dd\ mmm;@" sourceLinked="0"/>
+        <c:majorTickMark val="none"/>
+        <c:minorTickMark val="none"/>
+        <c:tickLblPos val="nextTo"/>
+        <c:spPr>
+          <a:noFill/>
+          <a:ln>
+            <a:noFill/>
+          </a:ln>
+          <a:effectLst/>
+        </c:spPr>
+        <c:txPr>
+          <a:bodyPr rot="-60000000" spcFirstLastPara="1" vertOverflow="ellipsis" vert="horz" wrap="square" anchor="ctr" anchorCtr="1"/>
+          <a:lstStyle/>
+          <a:p>
+            <a:pPr>
+              <a:defRPr sz="1197" b="0" i="0" u="none" strike="noStrike" kern="1200" baseline="0">
+                <a:solidFill>
+                  <a:schemeClr val="tx1">
+                    <a:lumMod val="65000"/>
+                    <a:lumOff val="35000"/>
+                  </a:schemeClr>
+                </a:solidFill>
+                <a:latin typeface="+mn-lt"/>
+                <a:ea typeface="+mn-ea"/>
+                <a:cs typeface="+mn-cs"/>
+              </a:defRPr>
+            </a:pPr>
+            <a:endParaRPr lang="en-US"/>
+          </a:p>
+        </c:txPr>
+        <c:crossAx val="685160760"/>
+        <c:crosses val="autoZero"/>
+        <c:crossBetween val="between"/>
+      </c:valAx>
+      <c:spPr>
+        <a:noFill/>
+        <a:ln>
+          <a:noFill/>
+        </a:ln>
+        <a:effectLst/>
+      </c:spPr>
+    </c:plotArea>
+    <c:plotVisOnly val="1"/>
+    <c:dispBlanksAs val="gap"/>
+    <c:extLst>
+      <c:ext xmlns:c16r3="http://schemas.microsoft.com/office/drawing/2017/03/chart" uri="{56B9EC1D-385E-4148-901F-78D8002777C0}">
+        <c16r3:dataDisplayOptions16>
+          <c16r3:dispNaAsBlank val="1"/>
+        </c16r3:dataDisplayOptions16>
+      </c:ext>
+    </c:extLst>
+    <c:showDLblsOverMax val="0"/>
+  </c:chart>
+  <c:spPr>
+    <a:noFill/>
+    <a:ln>
+      <a:noFill/>
+    </a:ln>
+    <a:effectLst/>
+  </c:spPr>
+  <c:txPr>
+    <a:bodyPr/>
+    <a:lstStyle/>
+    <a:p>
+      <a:pPr>
+        <a:defRPr/>
+      </a:pPr>
+      <a:endParaRPr lang="en-US"/>
+    </a:p>
+  </c:txPr>
+  <c:externalData r:id="rId3">
+    <c:autoUpdate val="0"/>
+  </c:externalData>
+</c:chartSpace>
+</file>
+
 <file path=ppt/charts/colors1.xml><?xml version="1.0" encoding="utf-8"?>
+<cs:colorStyle xmlns:cs="http://schemas.microsoft.com/office/drawing/2012/chartStyle" xmlns:a="http://schemas.openxmlformats.org/drawingml/2006/main" meth="cycle" id="10">
+  <a:schemeClr val="accent1"/>
+  <a:schemeClr val="accent2"/>
+  <a:schemeClr val="accent3"/>
+  <a:schemeClr val="accent4"/>
+  <a:schemeClr val="accent5"/>
+  <a:schemeClr val="accent6"/>
+  <cs:variation/>
+  <cs:variation>
+    <a:lumMod val="60000"/>
+  </cs:variation>
+  <cs:variation>
+    <a:lumMod val="80000"/>
+    <a:lumOff val="20000"/>
+  </cs:variation>
+  <cs:variation>
+    <a:lumMod val="80000"/>
+  </cs:variation>
+  <cs:variation>
+    <a:lumMod val="60000"/>
+    <a:lumOff val="40000"/>
+  </cs:variation>
+  <cs:variation>
+    <a:lumMod val="50000"/>
+  </cs:variation>
+  <cs:variation>
+    <a:lumMod val="70000"/>
+    <a:lumOff val="30000"/>
+  </cs:variation>
+  <cs:variation>
+    <a:lumMod val="70000"/>
+  </cs:variation>
+  <cs:variation>
+    <a:lumMod val="50000"/>
+    <a:lumOff val="50000"/>
+  </cs:variation>
+</cs:colorStyle>
+</file>
+
+<file path=ppt/charts/colors2.xml><?xml version="1.0" encoding="utf-8"?>
 <cs:colorStyle xmlns:cs="http://schemas.microsoft.com/office/drawing/2012/chartStyle" xmlns:a="http://schemas.openxmlformats.org/drawingml/2006/main" meth="cycle" id="10">
   <a:schemeClr val="accent1"/>
   <a:schemeClr val="accent2"/>
@@ -2316,6 +2722,511 @@
 </cs:chartStyle>
 </file>
 
+<file path=ppt/charts/style2.xml><?xml version="1.0" encoding="utf-8"?>
+<cs:chartStyle xmlns:cs="http://schemas.microsoft.com/office/drawing/2012/chartStyle" xmlns:a="http://schemas.openxmlformats.org/drawingml/2006/main" id="297">
+  <cs:axisTitle>
+    <cs:lnRef idx="0"/>
+    <cs:fillRef idx="0"/>
+    <cs:effectRef idx="0"/>
+    <cs:fontRef idx="minor">
+      <a:schemeClr val="tx1">
+        <a:lumMod val="65000"/>
+        <a:lumOff val="35000"/>
+      </a:schemeClr>
+    </cs:fontRef>
+    <cs:defRPr sz="1330" kern="1200"/>
+  </cs:axisTitle>
+  <cs:categoryAxis>
+    <cs:lnRef idx="0"/>
+    <cs:fillRef idx="0"/>
+    <cs:effectRef idx="0"/>
+    <cs:fontRef idx="minor">
+      <a:schemeClr val="tx1">
+        <a:lumMod val="65000"/>
+        <a:lumOff val="35000"/>
+      </a:schemeClr>
+    </cs:fontRef>
+    <cs:spPr>
+      <a:ln w="9525" cap="flat" cmpd="sng" algn="ctr">
+        <a:solidFill>
+          <a:schemeClr val="tx1">
+            <a:lumMod val="15000"/>
+            <a:lumOff val="85000"/>
+          </a:schemeClr>
+        </a:solidFill>
+        <a:round/>
+      </a:ln>
+    </cs:spPr>
+    <cs:defRPr sz="1197" kern="1200"/>
+  </cs:categoryAxis>
+  <cs:chartArea mods="allowNoFillOverride allowNoLineOverride">
+    <cs:lnRef idx="0"/>
+    <cs:fillRef idx="0"/>
+    <cs:effectRef idx="0"/>
+    <cs:fontRef idx="minor">
+      <a:schemeClr val="tx1"/>
+    </cs:fontRef>
+    <cs:spPr>
+      <a:solidFill>
+        <a:schemeClr val="bg1"/>
+      </a:solidFill>
+      <a:ln w="9525" cap="flat" cmpd="sng" algn="ctr">
+        <a:solidFill>
+          <a:schemeClr val="tx1">
+            <a:lumMod val="15000"/>
+            <a:lumOff val="85000"/>
+          </a:schemeClr>
+        </a:solidFill>
+        <a:round/>
+      </a:ln>
+    </cs:spPr>
+    <cs:defRPr sz="1330" kern="1200"/>
+  </cs:chartArea>
+  <cs:dataLabel>
+    <cs:lnRef idx="0"/>
+    <cs:fillRef idx="0"/>
+    <cs:effectRef idx="0"/>
+    <cs:fontRef idx="minor">
+      <a:schemeClr val="tx1">
+        <a:lumMod val="75000"/>
+        <a:lumOff val="25000"/>
+      </a:schemeClr>
+    </cs:fontRef>
+    <cs:defRPr sz="1197" kern="1200"/>
+  </cs:dataLabel>
+  <cs:dataLabelCallout>
+    <cs:lnRef idx="0"/>
+    <cs:fillRef idx="0"/>
+    <cs:effectRef idx="0"/>
+    <cs:fontRef idx="minor">
+      <a:schemeClr val="dk1">
+        <a:lumMod val="65000"/>
+        <a:lumOff val="35000"/>
+      </a:schemeClr>
+    </cs:fontRef>
+    <cs:spPr>
+      <a:solidFill>
+        <a:schemeClr val="lt1"/>
+      </a:solidFill>
+      <a:ln>
+        <a:solidFill>
+          <a:schemeClr val="dk1">
+            <a:lumMod val="25000"/>
+            <a:lumOff val="75000"/>
+          </a:schemeClr>
+        </a:solidFill>
+      </a:ln>
+    </cs:spPr>
+    <cs:defRPr sz="1197" kern="1200"/>
+    <cs:bodyPr rot="0" spcFirstLastPara="1" vertOverflow="clip" horzOverflow="clip" vert="horz" wrap="square" lIns="36576" tIns="18288" rIns="36576" bIns="18288" anchor="ctr" anchorCtr="1">
+      <a:spAutoFit/>
+    </cs:bodyPr>
+  </cs:dataLabelCallout>
+  <cs:dataPoint>
+    <cs:lnRef idx="0"/>
+    <cs:fillRef idx="1">
+      <cs:styleClr val="auto"/>
+    </cs:fillRef>
+    <cs:effectRef idx="0"/>
+    <cs:fontRef idx="minor">
+      <a:schemeClr val="tx1"/>
+    </cs:fontRef>
+  </cs:dataPoint>
+  <cs:dataPoint3D>
+    <cs:lnRef idx="0"/>
+    <cs:fillRef idx="1">
+      <cs:styleClr val="auto"/>
+    </cs:fillRef>
+    <cs:effectRef idx="0"/>
+    <cs:fontRef idx="minor">
+      <a:schemeClr val="tx1"/>
+    </cs:fontRef>
+  </cs:dataPoint3D>
+  <cs:dataPointLine>
+    <cs:lnRef idx="0">
+      <cs:styleClr val="auto"/>
+    </cs:lnRef>
+    <cs:fillRef idx="1"/>
+    <cs:effectRef idx="0"/>
+    <cs:fontRef idx="minor">
+      <a:schemeClr val="tx1"/>
+    </cs:fontRef>
+    <cs:spPr>
+      <a:ln w="28575" cap="rnd">
+        <a:solidFill>
+          <a:schemeClr val="phClr"/>
+        </a:solidFill>
+        <a:round/>
+      </a:ln>
+    </cs:spPr>
+  </cs:dataPointLine>
+  <cs:dataPointMarker>
+    <cs:lnRef idx="0">
+      <cs:styleClr val="auto"/>
+    </cs:lnRef>
+    <cs:fillRef idx="1">
+      <cs:styleClr val="auto"/>
+    </cs:fillRef>
+    <cs:effectRef idx="0"/>
+    <cs:fontRef idx="minor">
+      <a:schemeClr val="tx1"/>
+    </cs:fontRef>
+    <cs:spPr>
+      <a:ln w="9525">
+        <a:solidFill>
+          <a:schemeClr val="phClr"/>
+        </a:solidFill>
+      </a:ln>
+    </cs:spPr>
+  </cs:dataPointMarker>
+  <cs:dataPointMarkerLayout symbol="circle" size="5"/>
+  <cs:dataPointWireframe>
+    <cs:lnRef idx="0">
+      <cs:styleClr val="auto"/>
+    </cs:lnRef>
+    <cs:fillRef idx="1"/>
+    <cs:effectRef idx="0"/>
+    <cs:fontRef idx="minor">
+      <a:schemeClr val="tx1"/>
+    </cs:fontRef>
+    <cs:spPr>
+      <a:ln w="9525" cap="rnd">
+        <a:solidFill>
+          <a:schemeClr val="phClr"/>
+        </a:solidFill>
+        <a:round/>
+      </a:ln>
+    </cs:spPr>
+  </cs:dataPointWireframe>
+  <cs:dataTable>
+    <cs:lnRef idx="0"/>
+    <cs:fillRef idx="0"/>
+    <cs:effectRef idx="0"/>
+    <cs:fontRef idx="minor">
+      <a:schemeClr val="tx1">
+        <a:lumMod val="65000"/>
+        <a:lumOff val="35000"/>
+      </a:schemeClr>
+    </cs:fontRef>
+    <cs:spPr>
+      <a:noFill/>
+      <a:ln w="9525" cap="flat" cmpd="sng" algn="ctr">
+        <a:solidFill>
+          <a:schemeClr val="tx1">
+            <a:lumMod val="15000"/>
+            <a:lumOff val="85000"/>
+          </a:schemeClr>
+        </a:solidFill>
+        <a:round/>
+      </a:ln>
+    </cs:spPr>
+    <cs:defRPr sz="1197" kern="1200"/>
+  </cs:dataTable>
+  <cs:downBar>
+    <cs:lnRef idx="0"/>
+    <cs:fillRef idx="0"/>
+    <cs:effectRef idx="0"/>
+    <cs:fontRef idx="minor">
+      <a:schemeClr val="tx1"/>
+    </cs:fontRef>
+    <cs:spPr>
+      <a:solidFill>
+        <a:schemeClr val="dk1">
+          <a:lumMod val="75000"/>
+          <a:lumOff val="25000"/>
+        </a:schemeClr>
+      </a:solidFill>
+      <a:ln w="9525" cap="flat" cmpd="sng" algn="ctr">
+        <a:solidFill>
+          <a:schemeClr val="tx1">
+            <a:lumMod val="65000"/>
+            <a:lumOff val="35000"/>
+          </a:schemeClr>
+        </a:solidFill>
+        <a:round/>
+      </a:ln>
+    </cs:spPr>
+  </cs:downBar>
+  <cs:dropLine>
+    <cs:lnRef idx="0"/>
+    <cs:fillRef idx="0"/>
+    <cs:effectRef idx="0"/>
+    <cs:fontRef idx="minor">
+      <a:schemeClr val="tx1"/>
+    </cs:fontRef>
+    <cs:spPr>
+      <a:ln w="9525" cap="flat" cmpd="sng" algn="ctr">
+        <a:solidFill>
+          <a:schemeClr val="tx1">
+            <a:lumMod val="35000"/>
+            <a:lumOff val="65000"/>
+          </a:schemeClr>
+        </a:solidFill>
+        <a:round/>
+      </a:ln>
+    </cs:spPr>
+  </cs:dropLine>
+  <cs:errorBar>
+    <cs:lnRef idx="0"/>
+    <cs:fillRef idx="0"/>
+    <cs:effectRef idx="0"/>
+    <cs:fontRef idx="minor">
+      <a:schemeClr val="tx1"/>
+    </cs:fontRef>
+    <cs:spPr>
+      <a:ln w="9525" cap="flat" cmpd="sng" algn="ctr">
+        <a:solidFill>
+          <a:schemeClr val="tx1">
+            <a:lumMod val="65000"/>
+            <a:lumOff val="35000"/>
+          </a:schemeClr>
+        </a:solidFill>
+        <a:round/>
+      </a:ln>
+    </cs:spPr>
+  </cs:errorBar>
+  <cs:floor>
+    <cs:lnRef idx="0"/>
+    <cs:fillRef idx="0"/>
+    <cs:effectRef idx="0"/>
+    <cs:fontRef idx="minor">
+      <a:schemeClr val="tx1"/>
+    </cs:fontRef>
+    <cs:spPr>
+      <a:noFill/>
+      <a:ln>
+        <a:noFill/>
+      </a:ln>
+    </cs:spPr>
+  </cs:floor>
+  <cs:gridlineMajor>
+    <cs:lnRef idx="0"/>
+    <cs:fillRef idx="0"/>
+    <cs:effectRef idx="0"/>
+    <cs:fontRef idx="minor">
+      <a:schemeClr val="tx1"/>
+    </cs:fontRef>
+    <cs:spPr>
+      <a:ln w="9525" cap="flat" cmpd="sng" algn="ctr">
+        <a:solidFill>
+          <a:schemeClr val="tx1">
+            <a:lumMod val="15000"/>
+            <a:lumOff val="85000"/>
+          </a:schemeClr>
+        </a:solidFill>
+        <a:round/>
+      </a:ln>
+    </cs:spPr>
+  </cs:gridlineMajor>
+  <cs:gridlineMinor>
+    <cs:lnRef idx="0"/>
+    <cs:fillRef idx="0"/>
+    <cs:effectRef idx="0"/>
+    <cs:fontRef idx="minor">
+      <a:schemeClr val="tx1"/>
+    </cs:fontRef>
+    <cs:spPr>
+      <a:ln w="9525" cap="flat" cmpd="sng" algn="ctr">
+        <a:solidFill>
+          <a:schemeClr val="tx1">
+            <a:lumMod val="5000"/>
+            <a:lumOff val="95000"/>
+          </a:schemeClr>
+        </a:solidFill>
+        <a:round/>
+      </a:ln>
+    </cs:spPr>
+  </cs:gridlineMinor>
+  <cs:hiLoLine>
+    <cs:lnRef idx="0"/>
+    <cs:fillRef idx="0"/>
+    <cs:effectRef idx="0"/>
+    <cs:fontRef idx="minor">
+      <a:schemeClr val="tx1"/>
+    </cs:fontRef>
+    <cs:spPr>
+      <a:ln w="9525" cap="flat" cmpd="sng" algn="ctr">
+        <a:solidFill>
+          <a:schemeClr val="tx1">
+            <a:lumMod val="50000"/>
+            <a:lumOff val="50000"/>
+          </a:schemeClr>
+        </a:solidFill>
+        <a:round/>
+      </a:ln>
+    </cs:spPr>
+  </cs:hiLoLine>
+  <cs:leaderLine>
+    <cs:lnRef idx="0"/>
+    <cs:fillRef idx="0"/>
+    <cs:effectRef idx="0"/>
+    <cs:fontRef idx="minor">
+      <a:schemeClr val="tx1"/>
+    </cs:fontRef>
+    <cs:spPr>
+      <a:ln w="9525" cap="flat" cmpd="sng" algn="ctr">
+        <a:solidFill>
+          <a:schemeClr val="tx1">
+            <a:lumMod val="35000"/>
+            <a:lumOff val="65000"/>
+          </a:schemeClr>
+        </a:solidFill>
+        <a:round/>
+      </a:ln>
+    </cs:spPr>
+  </cs:leaderLine>
+  <cs:legend>
+    <cs:lnRef idx="0"/>
+    <cs:fillRef idx="0"/>
+    <cs:effectRef idx="0"/>
+    <cs:fontRef idx="minor">
+      <a:schemeClr val="tx1">
+        <a:lumMod val="65000"/>
+        <a:lumOff val="35000"/>
+      </a:schemeClr>
+    </cs:fontRef>
+    <cs:defRPr sz="1197" kern="1200"/>
+  </cs:legend>
+  <cs:plotArea mods="allowNoFillOverride allowNoLineOverride">
+    <cs:lnRef idx="0"/>
+    <cs:fillRef idx="0"/>
+    <cs:effectRef idx="0"/>
+    <cs:fontRef idx="minor">
+      <a:schemeClr val="tx1"/>
+    </cs:fontRef>
+  </cs:plotArea>
+  <cs:plotArea3D mods="allowNoFillOverride allowNoLineOverride">
+    <cs:lnRef idx="0"/>
+    <cs:fillRef idx="0"/>
+    <cs:effectRef idx="0"/>
+    <cs:fontRef idx="minor">
+      <a:schemeClr val="tx1"/>
+    </cs:fontRef>
+  </cs:plotArea3D>
+  <cs:seriesAxis>
+    <cs:lnRef idx="0"/>
+    <cs:fillRef idx="0"/>
+    <cs:effectRef idx="0"/>
+    <cs:fontRef idx="minor">
+      <a:schemeClr val="tx1">
+        <a:lumMod val="65000"/>
+        <a:lumOff val="35000"/>
+      </a:schemeClr>
+    </cs:fontRef>
+    <cs:defRPr sz="1197" kern="1200"/>
+  </cs:seriesAxis>
+  <cs:seriesLine>
+    <cs:lnRef idx="0"/>
+    <cs:fillRef idx="0"/>
+    <cs:effectRef idx="0"/>
+    <cs:fontRef idx="minor">
+      <a:schemeClr val="tx1"/>
+    </cs:fontRef>
+    <cs:spPr>
+      <a:ln w="9525" cap="flat" cmpd="sng" algn="ctr">
+        <a:solidFill>
+          <a:schemeClr val="tx1">
+            <a:lumMod val="35000"/>
+            <a:lumOff val="65000"/>
+          </a:schemeClr>
+        </a:solidFill>
+        <a:round/>
+      </a:ln>
+    </cs:spPr>
+  </cs:seriesLine>
+  <cs:title>
+    <cs:lnRef idx="0"/>
+    <cs:fillRef idx="0"/>
+    <cs:effectRef idx="0"/>
+    <cs:fontRef idx="minor">
+      <a:schemeClr val="tx1">
+        <a:lumMod val="65000"/>
+        <a:lumOff val="35000"/>
+      </a:schemeClr>
+    </cs:fontRef>
+    <cs:defRPr sz="1862" b="0" kern="1200" spc="0" baseline="0"/>
+  </cs:title>
+  <cs:trendline>
+    <cs:lnRef idx="0">
+      <cs:styleClr val="auto"/>
+    </cs:lnRef>
+    <cs:fillRef idx="0"/>
+    <cs:effectRef idx="0"/>
+    <cs:fontRef idx="minor">
+      <a:schemeClr val="tx1"/>
+    </cs:fontRef>
+    <cs:spPr>
+      <a:ln w="19050" cap="rnd">
+        <a:solidFill>
+          <a:schemeClr val="phClr"/>
+        </a:solidFill>
+        <a:prstDash val="sysDot"/>
+      </a:ln>
+    </cs:spPr>
+  </cs:trendline>
+  <cs:trendlineLabel>
+    <cs:lnRef idx="0"/>
+    <cs:fillRef idx="0"/>
+    <cs:effectRef idx="0"/>
+    <cs:fontRef idx="minor">
+      <a:schemeClr val="tx1">
+        <a:lumMod val="65000"/>
+        <a:lumOff val="35000"/>
+      </a:schemeClr>
+    </cs:fontRef>
+    <cs:defRPr sz="1197" kern="1200"/>
+  </cs:trendlineLabel>
+  <cs:upBar>
+    <cs:lnRef idx="0"/>
+    <cs:fillRef idx="0"/>
+    <cs:effectRef idx="0"/>
+    <cs:fontRef idx="minor">
+      <a:schemeClr val="tx1"/>
+    </cs:fontRef>
+    <cs:spPr>
+      <a:solidFill>
+        <a:schemeClr val="lt1"/>
+      </a:solidFill>
+      <a:ln w="9525" cap="flat" cmpd="sng" algn="ctr">
+        <a:solidFill>
+          <a:schemeClr val="tx1">
+            <a:lumMod val="65000"/>
+            <a:lumOff val="35000"/>
+          </a:schemeClr>
+        </a:solidFill>
+        <a:round/>
+      </a:ln>
+    </cs:spPr>
+  </cs:upBar>
+  <cs:valueAxis>
+    <cs:lnRef idx="0"/>
+    <cs:fillRef idx="0"/>
+    <cs:effectRef idx="0"/>
+    <cs:fontRef idx="minor">
+      <a:schemeClr val="tx1">
+        <a:lumMod val="65000"/>
+        <a:lumOff val="35000"/>
+      </a:schemeClr>
+    </cs:fontRef>
+    <cs:defRPr sz="1197" kern="1200"/>
+  </cs:valueAxis>
+  <cs:wall>
+    <cs:lnRef idx="0"/>
+    <cs:fillRef idx="0"/>
+    <cs:effectRef idx="0"/>
+    <cs:fontRef idx="minor">
+      <a:schemeClr val="tx1"/>
+    </cs:fontRef>
+    <cs:spPr>
+      <a:noFill/>
+      <a:ln>
+        <a:noFill/>
+      </a:ln>
+    </cs:spPr>
+  </cs:wall>
+</cs:chartStyle>
+</file>
+
 <file path=ppt/notesMasters/notesMaster1.xml><?xml version="1.0" encoding="utf-8"?>
 <p:notesMaster xmlns:a="http://schemas.openxmlformats.org/drawingml/2006/main" xmlns:r="http://schemas.openxmlformats.org/officeDocument/2006/relationships" xmlns:p="http://schemas.openxmlformats.org/presentationml/2006/main">
   <p:cSld>
@@ -2398,7 +3309,7 @@
           <a:p>
             <a:fld id="{F8F4EB22-DBE9-4F8D-BC2E-B51AD4020E31}" type="datetimeFigureOut">
               <a:rPr lang="en-GB" smtClean="0"/>
-              <a:t>19/11/2019</a:t>
+              <a:t>08/01/2020</a:t>
             </a:fld>
             <a:endParaRPr lang="en-GB"/>
           </a:p>
@@ -2918,6 +3829,90 @@
 </p:notes>
 </file>
 
+<file path=ppt/notesSlides/notesSlide4.xml><?xml version="1.0" encoding="utf-8"?>
+<p:notes xmlns:a="http://schemas.openxmlformats.org/drawingml/2006/main" xmlns:r="http://schemas.openxmlformats.org/officeDocument/2006/relationships" xmlns:p="http://schemas.openxmlformats.org/presentationml/2006/main">
+  <p:cSld>
+    <p:spTree>
+      <p:nvGrpSpPr>
+        <p:cNvPr id="1" name=""/>
+        <p:cNvGrpSpPr/>
+        <p:nvPr/>
+      </p:nvGrpSpPr>
+      <p:grpSpPr>
+        <a:xfrm>
+          <a:off x="0" y="0"/>
+          <a:ext cx="0" cy="0"/>
+          <a:chOff x="0" y="0"/>
+          <a:chExt cx="0" cy="0"/>
+        </a:xfrm>
+      </p:grpSpPr>
+      <p:sp>
+        <p:nvSpPr>
+          <p:cNvPr id="2" name="Slide Image Placeholder 1"/>
+          <p:cNvSpPr>
+            <a:spLocks noGrp="1" noRot="1" noChangeAspect="1"/>
+          </p:cNvSpPr>
+          <p:nvPr>
+            <p:ph type="sldImg"/>
+          </p:nvPr>
+        </p:nvSpPr>
+        <p:spPr/>
+      </p:sp>
+      <p:sp>
+        <p:nvSpPr>
+          <p:cNvPr id="3" name="Notes Placeholder 2"/>
+          <p:cNvSpPr>
+            <a:spLocks noGrp="1"/>
+          </p:cNvSpPr>
+          <p:nvPr>
+            <p:ph type="body" idx="1"/>
+          </p:nvPr>
+        </p:nvSpPr>
+        <p:spPr/>
+        <p:txBody>
+          <a:bodyPr/>
+          <a:lstStyle/>
+          <a:p>
+            <a:endParaRPr lang="en-GB" dirty="0"/>
+          </a:p>
+        </p:txBody>
+      </p:sp>
+      <p:sp>
+        <p:nvSpPr>
+          <p:cNvPr id="4" name="Slide Number Placeholder 3"/>
+          <p:cNvSpPr>
+            <a:spLocks noGrp="1"/>
+          </p:cNvSpPr>
+          <p:nvPr>
+            <p:ph type="sldNum" sz="quarter" idx="5"/>
+          </p:nvPr>
+        </p:nvSpPr>
+        <p:spPr/>
+        <p:txBody>
+          <a:bodyPr/>
+          <a:lstStyle/>
+          <a:p>
+            <a:fld id="{6607D24C-5C33-42AC-950C-059C52677011}" type="slidenum">
+              <a:rPr lang="en-GB" smtClean="0"/>
+              <a:t>9</a:t>
+            </a:fld>
+            <a:endParaRPr lang="en-GB"/>
+          </a:p>
+        </p:txBody>
+      </p:sp>
+    </p:spTree>
+    <p:extLst>
+      <p:ext uri="{BB962C8B-B14F-4D97-AF65-F5344CB8AC3E}">
+        <p14:creationId xmlns:p14="http://schemas.microsoft.com/office/powerpoint/2010/main" val="2544297002"/>
+      </p:ext>
+    </p:extLst>
+  </p:cSld>
+  <p:clrMapOvr>
+    <a:masterClrMapping/>
+  </p:clrMapOvr>
+</p:notes>
+</file>
+
 <file path=ppt/slideLayouts/slideLayout1.xml><?xml version="1.0" encoding="utf-8"?>
 <p:sldLayout xmlns:a="http://schemas.openxmlformats.org/drawingml/2006/main" xmlns:r="http://schemas.openxmlformats.org/officeDocument/2006/relationships" xmlns:p="http://schemas.openxmlformats.org/presentationml/2006/main" type="title" preserve="1">
   <p:cSld name="Title Slide">
@@ -3103,7 +4098,7 @@
           <a:p>
             <a:fld id="{88D38747-4367-4BD2-8D51-C97E202738E2}" type="datetime1">
               <a:rPr lang="en-US" smtClean="0"/>
-              <a:t>11/19/2019</a:t>
+              <a:t>1/8/2020</a:t>
             </a:fld>
             <a:endParaRPr lang="en-US" dirty="0"/>
           </a:p>
@@ -3402,7 +4397,7 @@
           <a:p>
             <a:fld id="{073ED0CC-082F-4160-86E5-0D6041F12778}" type="datetime1">
               <a:rPr lang="en-US" smtClean="0"/>
-              <a:t>11/19/2019</a:t>
+              <a:t>1/8/2020</a:t>
             </a:fld>
             <a:endParaRPr lang="en-US" dirty="0"/>
           </a:p>
@@ -3595,7 +4590,7 @@
           <a:p>
             <a:fld id="{073ED0CC-082F-4160-86E5-0D6041F12778}" type="datetime1">
               <a:rPr lang="en-US" smtClean="0"/>
-              <a:t>11/19/2019</a:t>
+              <a:t>1/8/2020</a:t>
             </a:fld>
             <a:endParaRPr lang="en-US" dirty="0"/>
           </a:p>
@@ -3857,7 +4852,7 @@
           <a:p>
             <a:fld id="{073ED0CC-082F-4160-86E5-0D6041F12778}" type="datetime1">
               <a:rPr lang="en-US" smtClean="0"/>
-              <a:t>11/19/2019</a:t>
+              <a:t>1/8/2020</a:t>
             </a:fld>
             <a:endParaRPr lang="en-US" dirty="0"/>
           </a:p>
@@ -4282,7 +5277,7 @@
           <a:p>
             <a:fld id="{073ED0CC-082F-4160-86E5-0D6041F12778}" type="datetime1">
               <a:rPr lang="en-US" smtClean="0"/>
-              <a:t>11/19/2019</a:t>
+              <a:t>1/8/2020</a:t>
             </a:fld>
             <a:endParaRPr lang="en-US" dirty="0"/>
           </a:p>
@@ -4820,7 +5815,7 @@
           <a:p>
             <a:fld id="{073ED0CC-082F-4160-86E5-0D6041F12778}" type="datetime1">
               <a:rPr lang="en-US" smtClean="0"/>
-              <a:t>11/19/2019</a:t>
+              <a:t>1/8/2020</a:t>
             </a:fld>
             <a:endParaRPr lang="en-US" dirty="0"/>
           </a:p>
@@ -5685,7 +6680,7 @@
           <a:p>
             <a:fld id="{073ED0CC-082F-4160-86E5-0D6041F12778}" type="datetime1">
               <a:rPr lang="en-US" smtClean="0"/>
-              <a:t>11/19/2019</a:t>
+              <a:t>1/8/2020</a:t>
             </a:fld>
             <a:endParaRPr lang="en-US" dirty="0"/>
           </a:p>
@@ -5856,7 +6851,7 @@
           <a:p>
             <a:fld id="{217E833E-1B6D-415F-AD29-75AE8C43BD0D}" type="datetime1">
               <a:rPr lang="en-US" smtClean="0"/>
-              <a:t>11/19/2019</a:t>
+              <a:t>1/8/2020</a:t>
             </a:fld>
             <a:endParaRPr lang="en-US" dirty="0"/>
           </a:p>
@@ -6040,7 +7035,7 @@
           <a:p>
             <a:fld id="{8452596F-08A7-4B70-989A-F2B1CF31E66B}" type="datetime1">
               <a:rPr lang="en-US" smtClean="0"/>
-              <a:t>11/19/2019</a:t>
+              <a:t>1/8/2020</a:t>
             </a:fld>
             <a:endParaRPr lang="en-US" dirty="0"/>
           </a:p>
@@ -6210,7 +7205,7 @@
           <a:p>
             <a:fld id="{73C55A3C-5767-4844-A0A3-83778C2E5409}" type="datetime1">
               <a:rPr lang="en-US" smtClean="0"/>
-              <a:t>11/19/2019</a:t>
+              <a:t>1/8/2020</a:t>
             </a:fld>
             <a:endParaRPr lang="en-US" dirty="0"/>
           </a:p>
@@ -6454,7 +7449,7 @@
           <a:p>
             <a:fld id="{CAE507A8-A5CF-4D38-AB86-7EDDA87A85D4}" type="datetime1">
               <a:rPr lang="en-US" smtClean="0"/>
-              <a:t>11/19/2019</a:t>
+              <a:t>1/8/2020</a:t>
             </a:fld>
             <a:endParaRPr lang="en-US" dirty="0"/>
           </a:p>
@@ -6691,7 +7686,7 @@
           <a:p>
             <a:fld id="{BDFCD27C-8599-43EF-BA1D-14DDC1946E06}" type="datetime1">
               <a:rPr lang="en-US" smtClean="0"/>
-              <a:t>11/19/2019</a:t>
+              <a:t>1/8/2020</a:t>
             </a:fld>
             <a:endParaRPr lang="en-US" dirty="0"/>
           </a:p>
@@ -7157,7 +8152,7 @@
           <a:p>
             <a:fld id="{49343D99-809A-49C0-96E5-4250D0B498EE}" type="datetime1">
               <a:rPr lang="en-US" smtClean="0"/>
-              <a:t>11/19/2019</a:t>
+              <a:t>1/8/2020</a:t>
             </a:fld>
             <a:endParaRPr lang="en-US" dirty="0"/>
           </a:p>
@@ -7275,7 +8270,7 @@
           <a:p>
             <a:fld id="{A143DE9B-B678-4EFB-BB7D-A4370204A0B0}" type="datetime1">
               <a:rPr lang="en-US" smtClean="0"/>
-              <a:t>11/19/2019</a:t>
+              <a:t>1/8/2020</a:t>
             </a:fld>
             <a:endParaRPr lang="en-US" dirty="0"/>
           </a:p>
@@ -7370,7 +8365,7 @@
           <a:p>
             <a:fld id="{E68812DA-F765-4142-A6A3-A8ED7235E082}" type="datetime1">
               <a:rPr lang="en-US" smtClean="0"/>
-              <a:t>11/19/2019</a:t>
+              <a:t>1/8/2020</a:t>
             </a:fld>
             <a:endParaRPr lang="en-US" dirty="0"/>
           </a:p>
@@ -7625,7 +8620,7 @@
           <a:p>
             <a:fld id="{3E0277FD-7DE6-41D4-930D-AC99F5AFE54E}" type="datetime1">
               <a:rPr lang="en-US" smtClean="0"/>
-              <a:t>11/19/2019</a:t>
+              <a:t>1/8/2020</a:t>
             </a:fld>
             <a:endParaRPr lang="en-US" dirty="0"/>
           </a:p>
@@ -7926,7 +8921,7 @@
           <a:p>
             <a:fld id="{9EA15526-7079-4B7B-987C-1B5FAE11A0FF}" type="datetime1">
               <a:rPr lang="en-US" smtClean="0"/>
-              <a:t>11/19/2019</a:t>
+              <a:t>1/8/2020</a:t>
             </a:fld>
             <a:endParaRPr lang="en-US" dirty="0"/>
           </a:p>
@@ -8161,7 +9156,7 @@
           <a:p>
             <a:fld id="{073ED0CC-082F-4160-86E5-0D6041F12778}" type="datetime1">
               <a:rPr lang="en-US" smtClean="0"/>
-              <a:t>11/19/2019</a:t>
+              <a:t>1/8/2020</a:t>
             </a:fld>
             <a:endParaRPr lang="en-US" dirty="0"/>
           </a:p>
@@ -9733,6 +10728,96 @@
 </p:sld>
 </file>
 
+<file path=ppt/slides/slide9.xml><?xml version="1.0" encoding="utf-8"?>
+<p:sld xmlns:a="http://schemas.openxmlformats.org/drawingml/2006/main" xmlns:r="http://schemas.openxmlformats.org/officeDocument/2006/relationships" xmlns:p="http://schemas.openxmlformats.org/presentationml/2006/main">
+  <p:cSld>
+    <p:spTree>
+      <p:nvGrpSpPr>
+        <p:cNvPr id="1" name=""/>
+        <p:cNvGrpSpPr/>
+        <p:nvPr/>
+      </p:nvGrpSpPr>
+      <p:grpSpPr>
+        <a:xfrm>
+          <a:off x="0" y="0"/>
+          <a:ext cx="0" cy="0"/>
+          <a:chOff x="0" y="0"/>
+          <a:chExt cx="0" cy="0"/>
+        </a:xfrm>
+      </p:grpSpPr>
+      <p:sp>
+        <p:nvSpPr>
+          <p:cNvPr id="2" name="Title 1">
+            <a:extLst>
+              <a:ext uri="{FF2B5EF4-FFF2-40B4-BE49-F238E27FC236}">
+                <a16:creationId xmlns:a16="http://schemas.microsoft.com/office/drawing/2014/main" id="{F3C8A950-94E2-40F0-A0FD-C9E550F0C4A8}"/>
+              </a:ext>
+            </a:extLst>
+          </p:cNvPr>
+          <p:cNvSpPr>
+            <a:spLocks noGrp="1"/>
+          </p:cNvSpPr>
+          <p:nvPr>
+            <p:ph type="title"/>
+          </p:nvPr>
+        </p:nvSpPr>
+        <p:spPr/>
+        <p:txBody>
+          <a:bodyPr/>
+          <a:lstStyle/>
+          <a:p>
+            <a:pPr algn="l"/>
+            <a:r>
+              <a:rPr lang="en-GB" dirty="0"/>
+              <a:t>The Future</a:t>
+            </a:r>
+          </a:p>
+        </p:txBody>
+      </p:sp>
+      <p:graphicFrame>
+        <p:nvGraphicFramePr>
+          <p:cNvPr id="6" name="Content Placeholder 5">
+            <a:extLst>
+              <a:ext uri="{FF2B5EF4-FFF2-40B4-BE49-F238E27FC236}">
+                <a16:creationId xmlns:a16="http://schemas.microsoft.com/office/drawing/2014/main" id="{4DE19DC6-FA58-4D68-AC15-CEF2E1D8155A}"/>
+              </a:ext>
+            </a:extLst>
+          </p:cNvPr>
+          <p:cNvGraphicFramePr>
+            <a:graphicFrameLocks noGrp="1"/>
+          </p:cNvGraphicFramePr>
+          <p:nvPr>
+            <p:ph idx="1"/>
+            <p:extLst>
+              <p:ext uri="{D42A27DB-BD31-4B8C-83A1-F6EECF244321}">
+                <p14:modId xmlns:p14="http://schemas.microsoft.com/office/powerpoint/2010/main" val="3899576010"/>
+              </p:ext>
+            </p:extLst>
+          </p:nvPr>
+        </p:nvGraphicFramePr>
+        <p:xfrm>
+          <a:off x="914400" y="1731963"/>
+          <a:ext cx="10353675" cy="4059237"/>
+        </p:xfrm>
+        <a:graphic>
+          <a:graphicData uri="http://schemas.openxmlformats.org/drawingml/2006/chart">
+            <c:chart xmlns:c="http://schemas.openxmlformats.org/drawingml/2006/chart" xmlns:r="http://schemas.openxmlformats.org/officeDocument/2006/relationships" r:id="rId3"/>
+          </a:graphicData>
+        </a:graphic>
+      </p:graphicFrame>
+    </p:spTree>
+    <p:extLst>
+      <p:ext uri="{BB962C8B-B14F-4D97-AF65-F5344CB8AC3E}">
+        <p14:creationId xmlns:p14="http://schemas.microsoft.com/office/powerpoint/2010/main" val="1722129062"/>
+      </p:ext>
+    </p:extLst>
+  </p:cSld>
+  <p:clrMapOvr>
+    <a:masterClrMapping/>
+  </p:clrMapOvr>
+</p:sld>
+</file>
+
 <file path=ppt/theme/theme1.xml><?xml version="1.0" encoding="utf-8"?>
 <a:theme xmlns:a="http://schemas.openxmlformats.org/drawingml/2006/main" name="Slate">
   <a:themeElements>

</xml_diff>

<commit_message>
Finish redrafting the report.
</commit_message>
<xml_diff>
--- a/Reports/Presentation 1.pptx
+++ b/Reports/Presentation 1.pptx
@@ -5,7 +5,7 @@
     <p:sldMasterId id="2147483831" r:id="rId1"/>
   </p:sldMasterIdLst>
   <p:notesMasterIdLst>
-    <p:notesMasterId r:id="rId11"/>
+    <p:notesMasterId r:id="rId10"/>
   </p:notesMasterIdLst>
   <p:sldIdLst>
     <p:sldId id="256" r:id="rId2"/>
@@ -16,7 +16,6 @@
     <p:sldId id="263" r:id="rId7"/>
     <p:sldId id="264" r:id="rId8"/>
     <p:sldId id="265" r:id="rId9"/>
-    <p:sldId id="266" r:id="rId10"/>
   </p:sldIdLst>
   <p:sldSz cx="12192000" cy="6858000"/>
   <p:notesSz cx="6858000" cy="9144000"/>
@@ -1788,396 +1787,7 @@
 </c:chartSpace>
 </file>
 
-<file path=ppt/charts/chart2.xml><?xml version="1.0" encoding="utf-8"?>
-<c:chartSpace xmlns:c="http://schemas.openxmlformats.org/drawingml/2006/chart" xmlns:a="http://schemas.openxmlformats.org/drawingml/2006/main" xmlns:r="http://schemas.openxmlformats.org/officeDocument/2006/relationships" xmlns:c16r2="http://schemas.microsoft.com/office/drawing/2015/06/chart">
-  <c:date1904 val="0"/>
-  <c:lang val="en-US"/>
-  <c:roundedCorners val="0"/>
-  <mc:AlternateContent xmlns:mc="http://schemas.openxmlformats.org/markup-compatibility/2006">
-    <mc:Choice xmlns:c14="http://schemas.microsoft.com/office/drawing/2007/8/2/chart" Requires="c14">
-      <c14:style val="102"/>
-    </mc:Choice>
-    <mc:Fallback>
-      <c:style val="2"/>
-    </mc:Fallback>
-  </mc:AlternateContent>
-  <c:chart>
-    <c:autoTitleDeleted val="1"/>
-    <c:plotArea>
-      <c:layout/>
-      <c:barChart>
-        <c:barDir val="bar"/>
-        <c:grouping val="stacked"/>
-        <c:varyColors val="0"/>
-        <c:ser>
-          <c:idx val="0"/>
-          <c:order val="0"/>
-          <c:tx>
-            <c:strRef>
-              <c:f>Sheet1!$B$1</c:f>
-              <c:strCache>
-                <c:ptCount val="1"/>
-                <c:pt idx="0">
-                  <c:v>Begin</c:v>
-                </c:pt>
-              </c:strCache>
-            </c:strRef>
-          </c:tx>
-          <c:spPr>
-            <a:noFill/>
-            <a:ln>
-              <a:noFill/>
-            </a:ln>
-            <a:effectLst/>
-          </c:spPr>
-          <c:invertIfNegative val="0"/>
-          <c:cat>
-            <c:strRef>
-              <c:f>Sheet1!$A$2:$A$8</c:f>
-              <c:strCache>
-                <c:ptCount val="6"/>
-                <c:pt idx="0">
-                  <c:v>Release software</c:v>
-                </c:pt>
-                <c:pt idx="1">
-                  <c:v>Improve GUI</c:v>
-                </c:pt>
-                <c:pt idx="2">
-                  <c:v>Evaluate GUI</c:v>
-                </c:pt>
-                <c:pt idx="3">
-                  <c:v>Complete GUI</c:v>
-                </c:pt>
-                <c:pt idx="4">
-                  <c:v>Improve features</c:v>
-                </c:pt>
-                <c:pt idx="5">
-                  <c:v>Evaluate features</c:v>
-                </c:pt>
-              </c:strCache>
-            </c:strRef>
-          </c:cat>
-          <c:val>
-            <c:numRef>
-              <c:f>Sheet1!$B$2:$B$8</c:f>
-              <c:numCache>
-                <c:formatCode>[$-809]dd\ mmmm\ yyyy;@</c:formatCode>
-                <c:ptCount val="7"/>
-                <c:pt idx="0">
-                  <c:v>43931</c:v>
-                </c:pt>
-                <c:pt idx="1">
-                  <c:v>43891</c:v>
-                </c:pt>
-                <c:pt idx="2">
-                  <c:v>43891</c:v>
-                </c:pt>
-                <c:pt idx="3">
-                  <c:v>43871</c:v>
-                </c:pt>
-                <c:pt idx="4">
-                  <c:v>43831</c:v>
-                </c:pt>
-                <c:pt idx="5">
-                  <c:v>43831</c:v>
-                </c:pt>
-              </c:numCache>
-            </c:numRef>
-          </c:val>
-          <c:extLst>
-            <c:ext xmlns:c16="http://schemas.microsoft.com/office/drawing/2014/chart" uri="{C3380CC4-5D6E-409C-BE32-E72D297353CC}">
-              <c16:uniqueId val="{00000000-54F9-4E89-9160-E1B2E466B756}"/>
-            </c:ext>
-          </c:extLst>
-        </c:ser>
-        <c:ser>
-          <c:idx val="1"/>
-          <c:order val="1"/>
-          <c:tx>
-            <c:strRef>
-              <c:f>Sheet1!$C$1</c:f>
-              <c:strCache>
-                <c:ptCount val="1"/>
-                <c:pt idx="0">
-                  <c:v>Duration</c:v>
-                </c:pt>
-              </c:strCache>
-            </c:strRef>
-          </c:tx>
-          <c:spPr>
-            <a:solidFill>
-              <a:schemeClr val="accent2"/>
-            </a:solidFill>
-            <a:ln>
-              <a:noFill/>
-            </a:ln>
-            <a:effectLst/>
-          </c:spPr>
-          <c:invertIfNegative val="0"/>
-          <c:cat>
-            <c:strRef>
-              <c:f>Sheet1!$A$2:$A$8</c:f>
-              <c:strCache>
-                <c:ptCount val="6"/>
-                <c:pt idx="0">
-                  <c:v>Release software</c:v>
-                </c:pt>
-                <c:pt idx="1">
-                  <c:v>Improve GUI</c:v>
-                </c:pt>
-                <c:pt idx="2">
-                  <c:v>Evaluate GUI</c:v>
-                </c:pt>
-                <c:pt idx="3">
-                  <c:v>Complete GUI</c:v>
-                </c:pt>
-                <c:pt idx="4">
-                  <c:v>Improve features</c:v>
-                </c:pt>
-                <c:pt idx="5">
-                  <c:v>Evaluate features</c:v>
-                </c:pt>
-              </c:strCache>
-            </c:strRef>
-          </c:cat>
-          <c:val>
-            <c:numRef>
-              <c:f>Sheet1!$C$2:$C$8</c:f>
-              <c:numCache>
-                <c:formatCode>[$-809]dd\ mmmm\ yyyy;@</c:formatCode>
-                <c:ptCount val="7"/>
-                <c:pt idx="0">
-                  <c:v>40</c:v>
-                </c:pt>
-                <c:pt idx="1">
-                  <c:v>60</c:v>
-                </c:pt>
-                <c:pt idx="2">
-                  <c:v>60</c:v>
-                </c:pt>
-                <c:pt idx="3">
-                  <c:v>40</c:v>
-                </c:pt>
-                <c:pt idx="4">
-                  <c:v>60</c:v>
-                </c:pt>
-                <c:pt idx="5">
-                  <c:v>60</c:v>
-                </c:pt>
-              </c:numCache>
-            </c:numRef>
-          </c:val>
-          <c:extLst>
-            <c:ext xmlns:c16="http://schemas.microsoft.com/office/drawing/2014/chart" uri="{C3380CC4-5D6E-409C-BE32-E72D297353CC}">
-              <c16:uniqueId val="{00000001-54F9-4E89-9160-E1B2E466B756}"/>
-            </c:ext>
-          </c:extLst>
-        </c:ser>
-        <c:dLbls>
-          <c:showLegendKey val="0"/>
-          <c:showVal val="0"/>
-          <c:showCatName val="0"/>
-          <c:showSerName val="0"/>
-          <c:showPercent val="0"/>
-          <c:showBubbleSize val="0"/>
-        </c:dLbls>
-        <c:gapWidth val="150"/>
-        <c:overlap val="100"/>
-        <c:axId val="685160760"/>
-        <c:axId val="685161400"/>
-      </c:barChart>
-      <c:catAx>
-        <c:axId val="685160760"/>
-        <c:scaling>
-          <c:orientation val="minMax"/>
-        </c:scaling>
-        <c:delete val="0"/>
-        <c:axPos val="l"/>
-        <c:numFmt formatCode="General" sourceLinked="1"/>
-        <c:majorTickMark val="none"/>
-        <c:minorTickMark val="none"/>
-        <c:tickLblPos val="nextTo"/>
-        <c:spPr>
-          <a:noFill/>
-          <a:ln w="9525" cap="flat" cmpd="sng" algn="ctr">
-            <a:solidFill>
-              <a:schemeClr val="tx1">
-                <a:lumMod val="15000"/>
-                <a:lumOff val="85000"/>
-              </a:schemeClr>
-            </a:solidFill>
-            <a:round/>
-          </a:ln>
-          <a:effectLst/>
-        </c:spPr>
-        <c:txPr>
-          <a:bodyPr rot="-60000000" spcFirstLastPara="1" vertOverflow="ellipsis" vert="horz" wrap="square" anchor="ctr" anchorCtr="1"/>
-          <a:lstStyle/>
-          <a:p>
-            <a:pPr>
-              <a:defRPr sz="1800" b="0" i="0" u="none" strike="noStrike" kern="1200" baseline="0">
-                <a:solidFill>
-                  <a:schemeClr val="tx1">
-                    <a:lumMod val="65000"/>
-                    <a:lumOff val="35000"/>
-                  </a:schemeClr>
-                </a:solidFill>
-                <a:latin typeface="+mn-lt"/>
-                <a:ea typeface="+mn-ea"/>
-                <a:cs typeface="+mn-cs"/>
-              </a:defRPr>
-            </a:pPr>
-            <a:endParaRPr lang="en-US"/>
-          </a:p>
-        </c:txPr>
-        <c:crossAx val="685161400"/>
-        <c:crosses val="autoZero"/>
-        <c:auto val="1"/>
-        <c:lblAlgn val="ctr"/>
-        <c:lblOffset val="100"/>
-        <c:noMultiLvlLbl val="0"/>
-      </c:catAx>
-      <c:valAx>
-        <c:axId val="685161400"/>
-        <c:scaling>
-          <c:orientation val="minMax"/>
-          <c:max val="43978"/>
-          <c:min val="43831"/>
-        </c:scaling>
-        <c:delete val="0"/>
-        <c:axPos val="b"/>
-        <c:majorGridlines>
-          <c:spPr>
-            <a:ln w="9525" cap="flat" cmpd="sng" algn="ctr">
-              <a:solidFill>
-                <a:schemeClr val="tx1">
-                  <a:lumMod val="15000"/>
-                  <a:lumOff val="85000"/>
-                </a:schemeClr>
-              </a:solidFill>
-              <a:round/>
-            </a:ln>
-            <a:effectLst/>
-          </c:spPr>
-        </c:majorGridlines>
-        <c:numFmt formatCode="[$-809]dd\ mmm;@" sourceLinked="0"/>
-        <c:majorTickMark val="none"/>
-        <c:minorTickMark val="none"/>
-        <c:tickLblPos val="nextTo"/>
-        <c:spPr>
-          <a:noFill/>
-          <a:ln>
-            <a:noFill/>
-          </a:ln>
-          <a:effectLst/>
-        </c:spPr>
-        <c:txPr>
-          <a:bodyPr rot="-60000000" spcFirstLastPara="1" vertOverflow="ellipsis" vert="horz" wrap="square" anchor="ctr" anchorCtr="1"/>
-          <a:lstStyle/>
-          <a:p>
-            <a:pPr>
-              <a:defRPr sz="1197" b="0" i="0" u="none" strike="noStrike" kern="1200" baseline="0">
-                <a:solidFill>
-                  <a:schemeClr val="tx1">
-                    <a:lumMod val="65000"/>
-                    <a:lumOff val="35000"/>
-                  </a:schemeClr>
-                </a:solidFill>
-                <a:latin typeface="+mn-lt"/>
-                <a:ea typeface="+mn-ea"/>
-                <a:cs typeface="+mn-cs"/>
-              </a:defRPr>
-            </a:pPr>
-            <a:endParaRPr lang="en-US"/>
-          </a:p>
-        </c:txPr>
-        <c:crossAx val="685160760"/>
-        <c:crosses val="autoZero"/>
-        <c:crossBetween val="between"/>
-      </c:valAx>
-      <c:spPr>
-        <a:noFill/>
-        <a:ln>
-          <a:noFill/>
-        </a:ln>
-        <a:effectLst/>
-      </c:spPr>
-    </c:plotArea>
-    <c:plotVisOnly val="1"/>
-    <c:dispBlanksAs val="gap"/>
-    <c:extLst>
-      <c:ext xmlns:c16r3="http://schemas.microsoft.com/office/drawing/2017/03/chart" uri="{56B9EC1D-385E-4148-901F-78D8002777C0}">
-        <c16r3:dataDisplayOptions16>
-          <c16r3:dispNaAsBlank val="1"/>
-        </c16r3:dataDisplayOptions16>
-      </c:ext>
-    </c:extLst>
-    <c:showDLblsOverMax val="0"/>
-  </c:chart>
-  <c:spPr>
-    <a:noFill/>
-    <a:ln>
-      <a:noFill/>
-    </a:ln>
-    <a:effectLst/>
-  </c:spPr>
-  <c:txPr>
-    <a:bodyPr/>
-    <a:lstStyle/>
-    <a:p>
-      <a:pPr>
-        <a:defRPr/>
-      </a:pPr>
-      <a:endParaRPr lang="en-US"/>
-    </a:p>
-  </c:txPr>
-  <c:externalData r:id="rId3">
-    <c:autoUpdate val="0"/>
-  </c:externalData>
-</c:chartSpace>
-</file>
-
 <file path=ppt/charts/colors1.xml><?xml version="1.0" encoding="utf-8"?>
-<cs:colorStyle xmlns:cs="http://schemas.microsoft.com/office/drawing/2012/chartStyle" xmlns:a="http://schemas.openxmlformats.org/drawingml/2006/main" meth="cycle" id="10">
-  <a:schemeClr val="accent1"/>
-  <a:schemeClr val="accent2"/>
-  <a:schemeClr val="accent3"/>
-  <a:schemeClr val="accent4"/>
-  <a:schemeClr val="accent5"/>
-  <a:schemeClr val="accent6"/>
-  <cs:variation/>
-  <cs:variation>
-    <a:lumMod val="60000"/>
-  </cs:variation>
-  <cs:variation>
-    <a:lumMod val="80000"/>
-    <a:lumOff val="20000"/>
-  </cs:variation>
-  <cs:variation>
-    <a:lumMod val="80000"/>
-  </cs:variation>
-  <cs:variation>
-    <a:lumMod val="60000"/>
-    <a:lumOff val="40000"/>
-  </cs:variation>
-  <cs:variation>
-    <a:lumMod val="50000"/>
-  </cs:variation>
-  <cs:variation>
-    <a:lumMod val="70000"/>
-    <a:lumOff val="30000"/>
-  </cs:variation>
-  <cs:variation>
-    <a:lumMod val="70000"/>
-  </cs:variation>
-  <cs:variation>
-    <a:lumMod val="50000"/>
-    <a:lumOff val="50000"/>
-  </cs:variation>
-</cs:colorStyle>
-</file>
-
-<file path=ppt/charts/colors2.xml><?xml version="1.0" encoding="utf-8"?>
 <cs:colorStyle xmlns:cs="http://schemas.microsoft.com/office/drawing/2012/chartStyle" xmlns:a="http://schemas.openxmlformats.org/drawingml/2006/main" meth="cycle" id="10">
   <a:schemeClr val="accent1"/>
   <a:schemeClr val="accent2"/>
@@ -2722,511 +2332,6 @@
 </cs:chartStyle>
 </file>
 
-<file path=ppt/charts/style2.xml><?xml version="1.0" encoding="utf-8"?>
-<cs:chartStyle xmlns:cs="http://schemas.microsoft.com/office/drawing/2012/chartStyle" xmlns:a="http://schemas.openxmlformats.org/drawingml/2006/main" id="297">
-  <cs:axisTitle>
-    <cs:lnRef idx="0"/>
-    <cs:fillRef idx="0"/>
-    <cs:effectRef idx="0"/>
-    <cs:fontRef idx="minor">
-      <a:schemeClr val="tx1">
-        <a:lumMod val="65000"/>
-        <a:lumOff val="35000"/>
-      </a:schemeClr>
-    </cs:fontRef>
-    <cs:defRPr sz="1330" kern="1200"/>
-  </cs:axisTitle>
-  <cs:categoryAxis>
-    <cs:lnRef idx="0"/>
-    <cs:fillRef idx="0"/>
-    <cs:effectRef idx="0"/>
-    <cs:fontRef idx="minor">
-      <a:schemeClr val="tx1">
-        <a:lumMod val="65000"/>
-        <a:lumOff val="35000"/>
-      </a:schemeClr>
-    </cs:fontRef>
-    <cs:spPr>
-      <a:ln w="9525" cap="flat" cmpd="sng" algn="ctr">
-        <a:solidFill>
-          <a:schemeClr val="tx1">
-            <a:lumMod val="15000"/>
-            <a:lumOff val="85000"/>
-          </a:schemeClr>
-        </a:solidFill>
-        <a:round/>
-      </a:ln>
-    </cs:spPr>
-    <cs:defRPr sz="1197" kern="1200"/>
-  </cs:categoryAxis>
-  <cs:chartArea mods="allowNoFillOverride allowNoLineOverride">
-    <cs:lnRef idx="0"/>
-    <cs:fillRef idx="0"/>
-    <cs:effectRef idx="0"/>
-    <cs:fontRef idx="minor">
-      <a:schemeClr val="tx1"/>
-    </cs:fontRef>
-    <cs:spPr>
-      <a:solidFill>
-        <a:schemeClr val="bg1"/>
-      </a:solidFill>
-      <a:ln w="9525" cap="flat" cmpd="sng" algn="ctr">
-        <a:solidFill>
-          <a:schemeClr val="tx1">
-            <a:lumMod val="15000"/>
-            <a:lumOff val="85000"/>
-          </a:schemeClr>
-        </a:solidFill>
-        <a:round/>
-      </a:ln>
-    </cs:spPr>
-    <cs:defRPr sz="1330" kern="1200"/>
-  </cs:chartArea>
-  <cs:dataLabel>
-    <cs:lnRef idx="0"/>
-    <cs:fillRef idx="0"/>
-    <cs:effectRef idx="0"/>
-    <cs:fontRef idx="minor">
-      <a:schemeClr val="tx1">
-        <a:lumMod val="75000"/>
-        <a:lumOff val="25000"/>
-      </a:schemeClr>
-    </cs:fontRef>
-    <cs:defRPr sz="1197" kern="1200"/>
-  </cs:dataLabel>
-  <cs:dataLabelCallout>
-    <cs:lnRef idx="0"/>
-    <cs:fillRef idx="0"/>
-    <cs:effectRef idx="0"/>
-    <cs:fontRef idx="minor">
-      <a:schemeClr val="dk1">
-        <a:lumMod val="65000"/>
-        <a:lumOff val="35000"/>
-      </a:schemeClr>
-    </cs:fontRef>
-    <cs:spPr>
-      <a:solidFill>
-        <a:schemeClr val="lt1"/>
-      </a:solidFill>
-      <a:ln>
-        <a:solidFill>
-          <a:schemeClr val="dk1">
-            <a:lumMod val="25000"/>
-            <a:lumOff val="75000"/>
-          </a:schemeClr>
-        </a:solidFill>
-      </a:ln>
-    </cs:spPr>
-    <cs:defRPr sz="1197" kern="1200"/>
-    <cs:bodyPr rot="0" spcFirstLastPara="1" vertOverflow="clip" horzOverflow="clip" vert="horz" wrap="square" lIns="36576" tIns="18288" rIns="36576" bIns="18288" anchor="ctr" anchorCtr="1">
-      <a:spAutoFit/>
-    </cs:bodyPr>
-  </cs:dataLabelCallout>
-  <cs:dataPoint>
-    <cs:lnRef idx="0"/>
-    <cs:fillRef idx="1">
-      <cs:styleClr val="auto"/>
-    </cs:fillRef>
-    <cs:effectRef idx="0"/>
-    <cs:fontRef idx="minor">
-      <a:schemeClr val="tx1"/>
-    </cs:fontRef>
-  </cs:dataPoint>
-  <cs:dataPoint3D>
-    <cs:lnRef idx="0"/>
-    <cs:fillRef idx="1">
-      <cs:styleClr val="auto"/>
-    </cs:fillRef>
-    <cs:effectRef idx="0"/>
-    <cs:fontRef idx="minor">
-      <a:schemeClr val="tx1"/>
-    </cs:fontRef>
-  </cs:dataPoint3D>
-  <cs:dataPointLine>
-    <cs:lnRef idx="0">
-      <cs:styleClr val="auto"/>
-    </cs:lnRef>
-    <cs:fillRef idx="1"/>
-    <cs:effectRef idx="0"/>
-    <cs:fontRef idx="minor">
-      <a:schemeClr val="tx1"/>
-    </cs:fontRef>
-    <cs:spPr>
-      <a:ln w="28575" cap="rnd">
-        <a:solidFill>
-          <a:schemeClr val="phClr"/>
-        </a:solidFill>
-        <a:round/>
-      </a:ln>
-    </cs:spPr>
-  </cs:dataPointLine>
-  <cs:dataPointMarker>
-    <cs:lnRef idx="0">
-      <cs:styleClr val="auto"/>
-    </cs:lnRef>
-    <cs:fillRef idx="1">
-      <cs:styleClr val="auto"/>
-    </cs:fillRef>
-    <cs:effectRef idx="0"/>
-    <cs:fontRef idx="minor">
-      <a:schemeClr val="tx1"/>
-    </cs:fontRef>
-    <cs:spPr>
-      <a:ln w="9525">
-        <a:solidFill>
-          <a:schemeClr val="phClr"/>
-        </a:solidFill>
-      </a:ln>
-    </cs:spPr>
-  </cs:dataPointMarker>
-  <cs:dataPointMarkerLayout symbol="circle" size="5"/>
-  <cs:dataPointWireframe>
-    <cs:lnRef idx="0">
-      <cs:styleClr val="auto"/>
-    </cs:lnRef>
-    <cs:fillRef idx="1"/>
-    <cs:effectRef idx="0"/>
-    <cs:fontRef idx="minor">
-      <a:schemeClr val="tx1"/>
-    </cs:fontRef>
-    <cs:spPr>
-      <a:ln w="9525" cap="rnd">
-        <a:solidFill>
-          <a:schemeClr val="phClr"/>
-        </a:solidFill>
-        <a:round/>
-      </a:ln>
-    </cs:spPr>
-  </cs:dataPointWireframe>
-  <cs:dataTable>
-    <cs:lnRef idx="0"/>
-    <cs:fillRef idx="0"/>
-    <cs:effectRef idx="0"/>
-    <cs:fontRef idx="minor">
-      <a:schemeClr val="tx1">
-        <a:lumMod val="65000"/>
-        <a:lumOff val="35000"/>
-      </a:schemeClr>
-    </cs:fontRef>
-    <cs:spPr>
-      <a:noFill/>
-      <a:ln w="9525" cap="flat" cmpd="sng" algn="ctr">
-        <a:solidFill>
-          <a:schemeClr val="tx1">
-            <a:lumMod val="15000"/>
-            <a:lumOff val="85000"/>
-          </a:schemeClr>
-        </a:solidFill>
-        <a:round/>
-      </a:ln>
-    </cs:spPr>
-    <cs:defRPr sz="1197" kern="1200"/>
-  </cs:dataTable>
-  <cs:downBar>
-    <cs:lnRef idx="0"/>
-    <cs:fillRef idx="0"/>
-    <cs:effectRef idx="0"/>
-    <cs:fontRef idx="minor">
-      <a:schemeClr val="tx1"/>
-    </cs:fontRef>
-    <cs:spPr>
-      <a:solidFill>
-        <a:schemeClr val="dk1">
-          <a:lumMod val="75000"/>
-          <a:lumOff val="25000"/>
-        </a:schemeClr>
-      </a:solidFill>
-      <a:ln w="9525" cap="flat" cmpd="sng" algn="ctr">
-        <a:solidFill>
-          <a:schemeClr val="tx1">
-            <a:lumMod val="65000"/>
-            <a:lumOff val="35000"/>
-          </a:schemeClr>
-        </a:solidFill>
-        <a:round/>
-      </a:ln>
-    </cs:spPr>
-  </cs:downBar>
-  <cs:dropLine>
-    <cs:lnRef idx="0"/>
-    <cs:fillRef idx="0"/>
-    <cs:effectRef idx="0"/>
-    <cs:fontRef idx="minor">
-      <a:schemeClr val="tx1"/>
-    </cs:fontRef>
-    <cs:spPr>
-      <a:ln w="9525" cap="flat" cmpd="sng" algn="ctr">
-        <a:solidFill>
-          <a:schemeClr val="tx1">
-            <a:lumMod val="35000"/>
-            <a:lumOff val="65000"/>
-          </a:schemeClr>
-        </a:solidFill>
-        <a:round/>
-      </a:ln>
-    </cs:spPr>
-  </cs:dropLine>
-  <cs:errorBar>
-    <cs:lnRef idx="0"/>
-    <cs:fillRef idx="0"/>
-    <cs:effectRef idx="0"/>
-    <cs:fontRef idx="minor">
-      <a:schemeClr val="tx1"/>
-    </cs:fontRef>
-    <cs:spPr>
-      <a:ln w="9525" cap="flat" cmpd="sng" algn="ctr">
-        <a:solidFill>
-          <a:schemeClr val="tx1">
-            <a:lumMod val="65000"/>
-            <a:lumOff val="35000"/>
-          </a:schemeClr>
-        </a:solidFill>
-        <a:round/>
-      </a:ln>
-    </cs:spPr>
-  </cs:errorBar>
-  <cs:floor>
-    <cs:lnRef idx="0"/>
-    <cs:fillRef idx="0"/>
-    <cs:effectRef idx="0"/>
-    <cs:fontRef idx="minor">
-      <a:schemeClr val="tx1"/>
-    </cs:fontRef>
-    <cs:spPr>
-      <a:noFill/>
-      <a:ln>
-        <a:noFill/>
-      </a:ln>
-    </cs:spPr>
-  </cs:floor>
-  <cs:gridlineMajor>
-    <cs:lnRef idx="0"/>
-    <cs:fillRef idx="0"/>
-    <cs:effectRef idx="0"/>
-    <cs:fontRef idx="minor">
-      <a:schemeClr val="tx1"/>
-    </cs:fontRef>
-    <cs:spPr>
-      <a:ln w="9525" cap="flat" cmpd="sng" algn="ctr">
-        <a:solidFill>
-          <a:schemeClr val="tx1">
-            <a:lumMod val="15000"/>
-            <a:lumOff val="85000"/>
-          </a:schemeClr>
-        </a:solidFill>
-        <a:round/>
-      </a:ln>
-    </cs:spPr>
-  </cs:gridlineMajor>
-  <cs:gridlineMinor>
-    <cs:lnRef idx="0"/>
-    <cs:fillRef idx="0"/>
-    <cs:effectRef idx="0"/>
-    <cs:fontRef idx="minor">
-      <a:schemeClr val="tx1"/>
-    </cs:fontRef>
-    <cs:spPr>
-      <a:ln w="9525" cap="flat" cmpd="sng" algn="ctr">
-        <a:solidFill>
-          <a:schemeClr val="tx1">
-            <a:lumMod val="5000"/>
-            <a:lumOff val="95000"/>
-          </a:schemeClr>
-        </a:solidFill>
-        <a:round/>
-      </a:ln>
-    </cs:spPr>
-  </cs:gridlineMinor>
-  <cs:hiLoLine>
-    <cs:lnRef idx="0"/>
-    <cs:fillRef idx="0"/>
-    <cs:effectRef idx="0"/>
-    <cs:fontRef idx="minor">
-      <a:schemeClr val="tx1"/>
-    </cs:fontRef>
-    <cs:spPr>
-      <a:ln w="9525" cap="flat" cmpd="sng" algn="ctr">
-        <a:solidFill>
-          <a:schemeClr val="tx1">
-            <a:lumMod val="50000"/>
-            <a:lumOff val="50000"/>
-          </a:schemeClr>
-        </a:solidFill>
-        <a:round/>
-      </a:ln>
-    </cs:spPr>
-  </cs:hiLoLine>
-  <cs:leaderLine>
-    <cs:lnRef idx="0"/>
-    <cs:fillRef idx="0"/>
-    <cs:effectRef idx="0"/>
-    <cs:fontRef idx="minor">
-      <a:schemeClr val="tx1"/>
-    </cs:fontRef>
-    <cs:spPr>
-      <a:ln w="9525" cap="flat" cmpd="sng" algn="ctr">
-        <a:solidFill>
-          <a:schemeClr val="tx1">
-            <a:lumMod val="35000"/>
-            <a:lumOff val="65000"/>
-          </a:schemeClr>
-        </a:solidFill>
-        <a:round/>
-      </a:ln>
-    </cs:spPr>
-  </cs:leaderLine>
-  <cs:legend>
-    <cs:lnRef idx="0"/>
-    <cs:fillRef idx="0"/>
-    <cs:effectRef idx="0"/>
-    <cs:fontRef idx="minor">
-      <a:schemeClr val="tx1">
-        <a:lumMod val="65000"/>
-        <a:lumOff val="35000"/>
-      </a:schemeClr>
-    </cs:fontRef>
-    <cs:defRPr sz="1197" kern="1200"/>
-  </cs:legend>
-  <cs:plotArea mods="allowNoFillOverride allowNoLineOverride">
-    <cs:lnRef idx="0"/>
-    <cs:fillRef idx="0"/>
-    <cs:effectRef idx="0"/>
-    <cs:fontRef idx="minor">
-      <a:schemeClr val="tx1"/>
-    </cs:fontRef>
-  </cs:plotArea>
-  <cs:plotArea3D mods="allowNoFillOverride allowNoLineOverride">
-    <cs:lnRef idx="0"/>
-    <cs:fillRef idx="0"/>
-    <cs:effectRef idx="0"/>
-    <cs:fontRef idx="minor">
-      <a:schemeClr val="tx1"/>
-    </cs:fontRef>
-  </cs:plotArea3D>
-  <cs:seriesAxis>
-    <cs:lnRef idx="0"/>
-    <cs:fillRef idx="0"/>
-    <cs:effectRef idx="0"/>
-    <cs:fontRef idx="minor">
-      <a:schemeClr val="tx1">
-        <a:lumMod val="65000"/>
-        <a:lumOff val="35000"/>
-      </a:schemeClr>
-    </cs:fontRef>
-    <cs:defRPr sz="1197" kern="1200"/>
-  </cs:seriesAxis>
-  <cs:seriesLine>
-    <cs:lnRef idx="0"/>
-    <cs:fillRef idx="0"/>
-    <cs:effectRef idx="0"/>
-    <cs:fontRef idx="minor">
-      <a:schemeClr val="tx1"/>
-    </cs:fontRef>
-    <cs:spPr>
-      <a:ln w="9525" cap="flat" cmpd="sng" algn="ctr">
-        <a:solidFill>
-          <a:schemeClr val="tx1">
-            <a:lumMod val="35000"/>
-            <a:lumOff val="65000"/>
-          </a:schemeClr>
-        </a:solidFill>
-        <a:round/>
-      </a:ln>
-    </cs:spPr>
-  </cs:seriesLine>
-  <cs:title>
-    <cs:lnRef idx="0"/>
-    <cs:fillRef idx="0"/>
-    <cs:effectRef idx="0"/>
-    <cs:fontRef idx="minor">
-      <a:schemeClr val="tx1">
-        <a:lumMod val="65000"/>
-        <a:lumOff val="35000"/>
-      </a:schemeClr>
-    </cs:fontRef>
-    <cs:defRPr sz="1862" b="0" kern="1200" spc="0" baseline="0"/>
-  </cs:title>
-  <cs:trendline>
-    <cs:lnRef idx="0">
-      <cs:styleClr val="auto"/>
-    </cs:lnRef>
-    <cs:fillRef idx="0"/>
-    <cs:effectRef idx="0"/>
-    <cs:fontRef idx="minor">
-      <a:schemeClr val="tx1"/>
-    </cs:fontRef>
-    <cs:spPr>
-      <a:ln w="19050" cap="rnd">
-        <a:solidFill>
-          <a:schemeClr val="phClr"/>
-        </a:solidFill>
-        <a:prstDash val="sysDot"/>
-      </a:ln>
-    </cs:spPr>
-  </cs:trendline>
-  <cs:trendlineLabel>
-    <cs:lnRef idx="0"/>
-    <cs:fillRef idx="0"/>
-    <cs:effectRef idx="0"/>
-    <cs:fontRef idx="minor">
-      <a:schemeClr val="tx1">
-        <a:lumMod val="65000"/>
-        <a:lumOff val="35000"/>
-      </a:schemeClr>
-    </cs:fontRef>
-    <cs:defRPr sz="1197" kern="1200"/>
-  </cs:trendlineLabel>
-  <cs:upBar>
-    <cs:lnRef idx="0"/>
-    <cs:fillRef idx="0"/>
-    <cs:effectRef idx="0"/>
-    <cs:fontRef idx="minor">
-      <a:schemeClr val="tx1"/>
-    </cs:fontRef>
-    <cs:spPr>
-      <a:solidFill>
-        <a:schemeClr val="lt1"/>
-      </a:solidFill>
-      <a:ln w="9525" cap="flat" cmpd="sng" algn="ctr">
-        <a:solidFill>
-          <a:schemeClr val="tx1">
-            <a:lumMod val="65000"/>
-            <a:lumOff val="35000"/>
-          </a:schemeClr>
-        </a:solidFill>
-        <a:round/>
-      </a:ln>
-    </cs:spPr>
-  </cs:upBar>
-  <cs:valueAxis>
-    <cs:lnRef idx="0"/>
-    <cs:fillRef idx="0"/>
-    <cs:effectRef idx="0"/>
-    <cs:fontRef idx="minor">
-      <a:schemeClr val="tx1">
-        <a:lumMod val="65000"/>
-        <a:lumOff val="35000"/>
-      </a:schemeClr>
-    </cs:fontRef>
-    <cs:defRPr sz="1197" kern="1200"/>
-  </cs:valueAxis>
-  <cs:wall>
-    <cs:lnRef idx="0"/>
-    <cs:fillRef idx="0"/>
-    <cs:effectRef idx="0"/>
-    <cs:fontRef idx="minor">
-      <a:schemeClr val="tx1"/>
-    </cs:fontRef>
-    <cs:spPr>
-      <a:noFill/>
-      <a:ln>
-        <a:noFill/>
-      </a:ln>
-    </cs:spPr>
-  </cs:wall>
-</cs:chartStyle>
-</file>
-
 <file path=ppt/notesMasters/notesMaster1.xml><?xml version="1.0" encoding="utf-8"?>
 <p:notesMaster xmlns:a="http://schemas.openxmlformats.org/drawingml/2006/main" xmlns:r="http://schemas.openxmlformats.org/officeDocument/2006/relationships" xmlns:p="http://schemas.openxmlformats.org/presentationml/2006/main">
   <p:cSld>
@@ -3309,7 +2414,7 @@
           <a:p>
             <a:fld id="{F8F4EB22-DBE9-4F8D-BC2E-B51AD4020E31}" type="datetimeFigureOut">
               <a:rPr lang="en-GB" smtClean="0"/>
-              <a:t>08/01/2020</a:t>
+              <a:t>15/01/2020</a:t>
             </a:fld>
             <a:endParaRPr lang="en-GB"/>
           </a:p>
@@ -3829,90 +2934,6 @@
 </p:notes>
 </file>
 
-<file path=ppt/notesSlides/notesSlide4.xml><?xml version="1.0" encoding="utf-8"?>
-<p:notes xmlns:a="http://schemas.openxmlformats.org/drawingml/2006/main" xmlns:r="http://schemas.openxmlformats.org/officeDocument/2006/relationships" xmlns:p="http://schemas.openxmlformats.org/presentationml/2006/main">
-  <p:cSld>
-    <p:spTree>
-      <p:nvGrpSpPr>
-        <p:cNvPr id="1" name=""/>
-        <p:cNvGrpSpPr/>
-        <p:nvPr/>
-      </p:nvGrpSpPr>
-      <p:grpSpPr>
-        <a:xfrm>
-          <a:off x="0" y="0"/>
-          <a:ext cx="0" cy="0"/>
-          <a:chOff x="0" y="0"/>
-          <a:chExt cx="0" cy="0"/>
-        </a:xfrm>
-      </p:grpSpPr>
-      <p:sp>
-        <p:nvSpPr>
-          <p:cNvPr id="2" name="Slide Image Placeholder 1"/>
-          <p:cNvSpPr>
-            <a:spLocks noGrp="1" noRot="1" noChangeAspect="1"/>
-          </p:cNvSpPr>
-          <p:nvPr>
-            <p:ph type="sldImg"/>
-          </p:nvPr>
-        </p:nvSpPr>
-        <p:spPr/>
-      </p:sp>
-      <p:sp>
-        <p:nvSpPr>
-          <p:cNvPr id="3" name="Notes Placeholder 2"/>
-          <p:cNvSpPr>
-            <a:spLocks noGrp="1"/>
-          </p:cNvSpPr>
-          <p:nvPr>
-            <p:ph type="body" idx="1"/>
-          </p:nvPr>
-        </p:nvSpPr>
-        <p:spPr/>
-        <p:txBody>
-          <a:bodyPr/>
-          <a:lstStyle/>
-          <a:p>
-            <a:endParaRPr lang="en-GB" dirty="0"/>
-          </a:p>
-        </p:txBody>
-      </p:sp>
-      <p:sp>
-        <p:nvSpPr>
-          <p:cNvPr id="4" name="Slide Number Placeholder 3"/>
-          <p:cNvSpPr>
-            <a:spLocks noGrp="1"/>
-          </p:cNvSpPr>
-          <p:nvPr>
-            <p:ph type="sldNum" sz="quarter" idx="5"/>
-          </p:nvPr>
-        </p:nvSpPr>
-        <p:spPr/>
-        <p:txBody>
-          <a:bodyPr/>
-          <a:lstStyle/>
-          <a:p>
-            <a:fld id="{6607D24C-5C33-42AC-950C-059C52677011}" type="slidenum">
-              <a:rPr lang="en-GB" smtClean="0"/>
-              <a:t>9</a:t>
-            </a:fld>
-            <a:endParaRPr lang="en-GB"/>
-          </a:p>
-        </p:txBody>
-      </p:sp>
-    </p:spTree>
-    <p:extLst>
-      <p:ext uri="{BB962C8B-B14F-4D97-AF65-F5344CB8AC3E}">
-        <p14:creationId xmlns:p14="http://schemas.microsoft.com/office/powerpoint/2010/main" val="2544297002"/>
-      </p:ext>
-    </p:extLst>
-  </p:cSld>
-  <p:clrMapOvr>
-    <a:masterClrMapping/>
-  </p:clrMapOvr>
-</p:notes>
-</file>
-
 <file path=ppt/slideLayouts/slideLayout1.xml><?xml version="1.0" encoding="utf-8"?>
 <p:sldLayout xmlns:a="http://schemas.openxmlformats.org/drawingml/2006/main" xmlns:r="http://schemas.openxmlformats.org/officeDocument/2006/relationships" xmlns:p="http://schemas.openxmlformats.org/presentationml/2006/main" type="title" preserve="1">
   <p:cSld name="Title Slide">
@@ -4098,7 +3119,7 @@
           <a:p>
             <a:fld id="{88D38747-4367-4BD2-8D51-C97E202738E2}" type="datetime1">
               <a:rPr lang="en-US" smtClean="0"/>
-              <a:t>1/8/2020</a:t>
+              <a:t>1/15/2020</a:t>
             </a:fld>
             <a:endParaRPr lang="en-US" dirty="0"/>
           </a:p>
@@ -4397,7 +3418,7 @@
           <a:p>
             <a:fld id="{073ED0CC-082F-4160-86E5-0D6041F12778}" type="datetime1">
               <a:rPr lang="en-US" smtClean="0"/>
-              <a:t>1/8/2020</a:t>
+              <a:t>1/15/2020</a:t>
             </a:fld>
             <a:endParaRPr lang="en-US" dirty="0"/>
           </a:p>
@@ -4590,7 +3611,7 @@
           <a:p>
             <a:fld id="{073ED0CC-082F-4160-86E5-0D6041F12778}" type="datetime1">
               <a:rPr lang="en-US" smtClean="0"/>
-              <a:t>1/8/2020</a:t>
+              <a:t>1/15/2020</a:t>
             </a:fld>
             <a:endParaRPr lang="en-US" dirty="0"/>
           </a:p>
@@ -4852,7 +3873,7 @@
           <a:p>
             <a:fld id="{073ED0CC-082F-4160-86E5-0D6041F12778}" type="datetime1">
               <a:rPr lang="en-US" smtClean="0"/>
-              <a:t>1/8/2020</a:t>
+              <a:t>1/15/2020</a:t>
             </a:fld>
             <a:endParaRPr lang="en-US" dirty="0"/>
           </a:p>
@@ -5277,7 +4298,7 @@
           <a:p>
             <a:fld id="{073ED0CC-082F-4160-86E5-0D6041F12778}" type="datetime1">
               <a:rPr lang="en-US" smtClean="0"/>
-              <a:t>1/8/2020</a:t>
+              <a:t>1/15/2020</a:t>
             </a:fld>
             <a:endParaRPr lang="en-US" dirty="0"/>
           </a:p>
@@ -5815,7 +4836,7 @@
           <a:p>
             <a:fld id="{073ED0CC-082F-4160-86E5-0D6041F12778}" type="datetime1">
               <a:rPr lang="en-US" smtClean="0"/>
-              <a:t>1/8/2020</a:t>
+              <a:t>1/15/2020</a:t>
             </a:fld>
             <a:endParaRPr lang="en-US" dirty="0"/>
           </a:p>
@@ -6680,7 +5701,7 @@
           <a:p>
             <a:fld id="{073ED0CC-082F-4160-86E5-0D6041F12778}" type="datetime1">
               <a:rPr lang="en-US" smtClean="0"/>
-              <a:t>1/8/2020</a:t>
+              <a:t>1/15/2020</a:t>
             </a:fld>
             <a:endParaRPr lang="en-US" dirty="0"/>
           </a:p>
@@ -6851,7 +5872,7 @@
           <a:p>
             <a:fld id="{217E833E-1B6D-415F-AD29-75AE8C43BD0D}" type="datetime1">
               <a:rPr lang="en-US" smtClean="0"/>
-              <a:t>1/8/2020</a:t>
+              <a:t>1/15/2020</a:t>
             </a:fld>
             <a:endParaRPr lang="en-US" dirty="0"/>
           </a:p>
@@ -7035,7 +6056,7 @@
           <a:p>
             <a:fld id="{8452596F-08A7-4B70-989A-F2B1CF31E66B}" type="datetime1">
               <a:rPr lang="en-US" smtClean="0"/>
-              <a:t>1/8/2020</a:t>
+              <a:t>1/15/2020</a:t>
             </a:fld>
             <a:endParaRPr lang="en-US" dirty="0"/>
           </a:p>
@@ -7205,7 +6226,7 @@
           <a:p>
             <a:fld id="{73C55A3C-5767-4844-A0A3-83778C2E5409}" type="datetime1">
               <a:rPr lang="en-US" smtClean="0"/>
-              <a:t>1/8/2020</a:t>
+              <a:t>1/15/2020</a:t>
             </a:fld>
             <a:endParaRPr lang="en-US" dirty="0"/>
           </a:p>
@@ -7449,7 +6470,7 @@
           <a:p>
             <a:fld id="{CAE507A8-A5CF-4D38-AB86-7EDDA87A85D4}" type="datetime1">
               <a:rPr lang="en-US" smtClean="0"/>
-              <a:t>1/8/2020</a:t>
+              <a:t>1/15/2020</a:t>
             </a:fld>
             <a:endParaRPr lang="en-US" dirty="0"/>
           </a:p>
@@ -7686,7 +6707,7 @@
           <a:p>
             <a:fld id="{BDFCD27C-8599-43EF-BA1D-14DDC1946E06}" type="datetime1">
               <a:rPr lang="en-US" smtClean="0"/>
-              <a:t>1/8/2020</a:t>
+              <a:t>1/15/2020</a:t>
             </a:fld>
             <a:endParaRPr lang="en-US" dirty="0"/>
           </a:p>
@@ -8152,7 +7173,7 @@
           <a:p>
             <a:fld id="{49343D99-809A-49C0-96E5-4250D0B498EE}" type="datetime1">
               <a:rPr lang="en-US" smtClean="0"/>
-              <a:t>1/8/2020</a:t>
+              <a:t>1/15/2020</a:t>
             </a:fld>
             <a:endParaRPr lang="en-US" dirty="0"/>
           </a:p>
@@ -8270,7 +7291,7 @@
           <a:p>
             <a:fld id="{A143DE9B-B678-4EFB-BB7D-A4370204A0B0}" type="datetime1">
               <a:rPr lang="en-US" smtClean="0"/>
-              <a:t>1/8/2020</a:t>
+              <a:t>1/15/2020</a:t>
             </a:fld>
             <a:endParaRPr lang="en-US" dirty="0"/>
           </a:p>
@@ -8365,7 +7386,7 @@
           <a:p>
             <a:fld id="{E68812DA-F765-4142-A6A3-A8ED7235E082}" type="datetime1">
               <a:rPr lang="en-US" smtClean="0"/>
-              <a:t>1/8/2020</a:t>
+              <a:t>1/15/2020</a:t>
             </a:fld>
             <a:endParaRPr lang="en-US" dirty="0"/>
           </a:p>
@@ -8620,7 +7641,7 @@
           <a:p>
             <a:fld id="{3E0277FD-7DE6-41D4-930D-AC99F5AFE54E}" type="datetime1">
               <a:rPr lang="en-US" smtClean="0"/>
-              <a:t>1/8/2020</a:t>
+              <a:t>1/15/2020</a:t>
             </a:fld>
             <a:endParaRPr lang="en-US" dirty="0"/>
           </a:p>
@@ -8921,7 +7942,7 @@
           <a:p>
             <a:fld id="{9EA15526-7079-4B7B-987C-1B5FAE11A0FF}" type="datetime1">
               <a:rPr lang="en-US" smtClean="0"/>
-              <a:t>1/8/2020</a:t>
+              <a:t>1/15/2020</a:t>
             </a:fld>
             <a:endParaRPr lang="en-US" dirty="0"/>
           </a:p>
@@ -9156,7 +8177,7 @@
           <a:p>
             <a:fld id="{073ED0CC-082F-4160-86E5-0D6041F12778}" type="datetime1">
               <a:rPr lang="en-US" smtClean="0"/>
-              <a:t>1/8/2020</a:t>
+              <a:t>1/15/2020</a:t>
             </a:fld>
             <a:endParaRPr lang="en-US" dirty="0"/>
           </a:p>
@@ -10728,96 +9749,6 @@
 </p:sld>
 </file>
 
-<file path=ppt/slides/slide9.xml><?xml version="1.0" encoding="utf-8"?>
-<p:sld xmlns:a="http://schemas.openxmlformats.org/drawingml/2006/main" xmlns:r="http://schemas.openxmlformats.org/officeDocument/2006/relationships" xmlns:p="http://schemas.openxmlformats.org/presentationml/2006/main">
-  <p:cSld>
-    <p:spTree>
-      <p:nvGrpSpPr>
-        <p:cNvPr id="1" name=""/>
-        <p:cNvGrpSpPr/>
-        <p:nvPr/>
-      </p:nvGrpSpPr>
-      <p:grpSpPr>
-        <a:xfrm>
-          <a:off x="0" y="0"/>
-          <a:ext cx="0" cy="0"/>
-          <a:chOff x="0" y="0"/>
-          <a:chExt cx="0" cy="0"/>
-        </a:xfrm>
-      </p:grpSpPr>
-      <p:sp>
-        <p:nvSpPr>
-          <p:cNvPr id="2" name="Title 1">
-            <a:extLst>
-              <a:ext uri="{FF2B5EF4-FFF2-40B4-BE49-F238E27FC236}">
-                <a16:creationId xmlns:a16="http://schemas.microsoft.com/office/drawing/2014/main" id="{F3C8A950-94E2-40F0-A0FD-C9E550F0C4A8}"/>
-              </a:ext>
-            </a:extLst>
-          </p:cNvPr>
-          <p:cNvSpPr>
-            <a:spLocks noGrp="1"/>
-          </p:cNvSpPr>
-          <p:nvPr>
-            <p:ph type="title"/>
-          </p:nvPr>
-        </p:nvSpPr>
-        <p:spPr/>
-        <p:txBody>
-          <a:bodyPr/>
-          <a:lstStyle/>
-          <a:p>
-            <a:pPr algn="l"/>
-            <a:r>
-              <a:rPr lang="en-GB" dirty="0"/>
-              <a:t>The Future</a:t>
-            </a:r>
-          </a:p>
-        </p:txBody>
-      </p:sp>
-      <p:graphicFrame>
-        <p:nvGraphicFramePr>
-          <p:cNvPr id="6" name="Content Placeholder 5">
-            <a:extLst>
-              <a:ext uri="{FF2B5EF4-FFF2-40B4-BE49-F238E27FC236}">
-                <a16:creationId xmlns:a16="http://schemas.microsoft.com/office/drawing/2014/main" id="{4DE19DC6-FA58-4D68-AC15-CEF2E1D8155A}"/>
-              </a:ext>
-            </a:extLst>
-          </p:cNvPr>
-          <p:cNvGraphicFramePr>
-            <a:graphicFrameLocks noGrp="1"/>
-          </p:cNvGraphicFramePr>
-          <p:nvPr>
-            <p:ph idx="1"/>
-            <p:extLst>
-              <p:ext uri="{D42A27DB-BD31-4B8C-83A1-F6EECF244321}">
-                <p14:modId xmlns:p14="http://schemas.microsoft.com/office/powerpoint/2010/main" val="3899576010"/>
-              </p:ext>
-            </p:extLst>
-          </p:nvPr>
-        </p:nvGraphicFramePr>
-        <p:xfrm>
-          <a:off x="914400" y="1731963"/>
-          <a:ext cx="10353675" cy="4059237"/>
-        </p:xfrm>
-        <a:graphic>
-          <a:graphicData uri="http://schemas.openxmlformats.org/drawingml/2006/chart">
-            <c:chart xmlns:c="http://schemas.openxmlformats.org/drawingml/2006/chart" xmlns:r="http://schemas.openxmlformats.org/officeDocument/2006/relationships" r:id="rId3"/>
-          </a:graphicData>
-        </a:graphic>
-      </p:graphicFrame>
-    </p:spTree>
-    <p:extLst>
-      <p:ext uri="{BB962C8B-B14F-4D97-AF65-F5344CB8AC3E}">
-        <p14:creationId xmlns:p14="http://schemas.microsoft.com/office/powerpoint/2010/main" val="1722129062"/>
-      </p:ext>
-    </p:extLst>
-  </p:cSld>
-  <p:clrMapOvr>
-    <a:masterClrMapping/>
-  </p:clrMapOvr>
-</p:sld>
-</file>
-
 <file path=ppt/theme/theme1.xml><?xml version="1.0" encoding="utf-8"?>
 <a:theme xmlns:a="http://schemas.openxmlformats.org/drawingml/2006/main" name="Slate">
   <a:themeElements>

</xml_diff>